<commit_message>
Updated Multiples Variables session missing translation
</commit_message>
<xml_diff>
--- a/translations/portuguese/data-transformation_pt_br.pptx
+++ b/translations/portuguese/data-transformation_pt_br.pptx
@@ -2187,7 +2187,7 @@
           </a:ln>
           <a:extLst>
             <a:ext uri="{C572A759-6A51-4108-AA02-DFA0A04FC94B}">
-              <ma14:wrappingTextBoxFlag xmlns="" xmlns:m="http://schemas.openxmlformats.org/officeDocument/2006/math" xmlns:a14="http://schemas.microsoft.com/office/drawing/2010/main" xmlns:ma14="http://schemas.microsoft.com/office/mac/drawingml/2011/main" val="1"/>
+              <ma14:wrappingTextBoxFlag xmlns:ma14="http://schemas.microsoft.com/office/mac/drawingml/2011/main" xmlns:a14="http://schemas.microsoft.com/office/drawing/2010/main" xmlns:m="http://schemas.openxmlformats.org/officeDocument/2006/math" xmlns="" val="1"/>
             </a:ext>
           </a:extLst>
         </p:spPr>
@@ -2226,7 +2226,7 @@
           </a:ln>
           <a:extLst>
             <a:ext uri="{C572A759-6A51-4108-AA02-DFA0A04FC94B}">
-              <ma14:wrappingTextBoxFlag xmlns="" xmlns:m="http://schemas.openxmlformats.org/officeDocument/2006/math" xmlns:a14="http://schemas.microsoft.com/office/drawing/2010/main" xmlns:ma14="http://schemas.microsoft.com/office/mac/drawingml/2011/main" val="1"/>
+              <ma14:wrappingTextBoxFlag xmlns:ma14="http://schemas.microsoft.com/office/mac/drawingml/2011/main" xmlns:a14="http://schemas.microsoft.com/office/drawing/2010/main" xmlns:m="http://schemas.openxmlformats.org/officeDocument/2006/math" xmlns="" val="1"/>
             </a:ext>
           </a:extLst>
         </p:spPr>
@@ -4713,7 +4713,7 @@
           </a:ln>
           <a:extLst>
             <a:ext uri="{C572A759-6A51-4108-AA02-DFA0A04FC94B}">
-              <ma14:wrappingTextBoxFlag xmlns="" xmlns:m="http://schemas.openxmlformats.org/officeDocument/2006/math" xmlns:a14="http://schemas.microsoft.com/office/drawing/2010/main" xmlns:ma14="http://schemas.microsoft.com/office/mac/drawingml/2011/main" val="1"/>
+              <ma14:wrappingTextBoxFlag xmlns:ma14="http://schemas.microsoft.com/office/mac/drawingml/2011/main" xmlns:a14="http://schemas.microsoft.com/office/drawing/2010/main" xmlns:m="http://schemas.openxmlformats.org/officeDocument/2006/math" xmlns="" val="1"/>
             </a:ext>
           </a:extLst>
         </p:spPr>
@@ -4763,7 +4763,7 @@
           </a:ln>
           <a:extLst>
             <a:ext uri="{C572A759-6A51-4108-AA02-DFA0A04FC94B}">
-              <ma14:wrappingTextBoxFlag xmlns="" xmlns:m="http://schemas.openxmlformats.org/officeDocument/2006/math" xmlns:a14="http://schemas.microsoft.com/office/drawing/2010/main" xmlns:ma14="http://schemas.microsoft.com/office/mac/drawingml/2011/main" val="1"/>
+              <ma14:wrappingTextBoxFlag xmlns:ma14="http://schemas.microsoft.com/office/mac/drawingml/2011/main" xmlns:a14="http://schemas.microsoft.com/office/drawing/2010/main" xmlns:m="http://schemas.openxmlformats.org/officeDocument/2006/math" xmlns="" val="1"/>
             </a:ext>
           </a:extLst>
         </p:spPr>
@@ -4936,7 +4936,7 @@
           </a:ln>
           <a:extLst>
             <a:ext uri="{C572A759-6A51-4108-AA02-DFA0A04FC94B}">
-              <ma14:wrappingTextBoxFlag xmlns="" xmlns:m="http://schemas.openxmlformats.org/officeDocument/2006/math" xmlns:a14="http://schemas.microsoft.com/office/drawing/2010/main" xmlns:ma14="http://schemas.microsoft.com/office/mac/drawingml/2011/main" val="1"/>
+              <ma14:wrappingTextBoxFlag xmlns:ma14="http://schemas.microsoft.com/office/mac/drawingml/2011/main" xmlns:a14="http://schemas.microsoft.com/office/drawing/2010/main" xmlns:m="http://schemas.openxmlformats.org/officeDocument/2006/math" xmlns="" val="1"/>
             </a:ext>
           </a:extLst>
         </p:spPr>
@@ -5047,7 +5047,7 @@
           </a:ln>
           <a:extLst>
             <a:ext uri="{C572A759-6A51-4108-AA02-DFA0A04FC94B}">
-              <ma14:wrappingTextBoxFlag xmlns="" xmlns:m="http://schemas.openxmlformats.org/officeDocument/2006/math" xmlns:a14="http://schemas.microsoft.com/office/drawing/2010/main" xmlns:ma14="http://schemas.microsoft.com/office/mac/drawingml/2011/main" val="1"/>
+              <ma14:wrappingTextBoxFlag xmlns:ma14="http://schemas.microsoft.com/office/mac/drawingml/2011/main" xmlns:a14="http://schemas.microsoft.com/office/drawing/2010/main" xmlns:m="http://schemas.openxmlformats.org/officeDocument/2006/math" xmlns="" val="1"/>
             </a:ext>
           </a:extLst>
         </p:spPr>
@@ -5157,7 +5157,7 @@
           </a:ln>
           <a:extLst>
             <a:ext uri="{C572A759-6A51-4108-AA02-DFA0A04FC94B}">
-              <ma14:wrappingTextBoxFlag xmlns="" xmlns:m="http://schemas.openxmlformats.org/officeDocument/2006/math" xmlns:a14="http://schemas.microsoft.com/office/drawing/2010/main" xmlns:ma14="http://schemas.microsoft.com/office/mac/drawingml/2011/main" val="1"/>
+              <ma14:wrappingTextBoxFlag xmlns:ma14="http://schemas.microsoft.com/office/mac/drawingml/2011/main" xmlns:a14="http://schemas.microsoft.com/office/drawing/2010/main" xmlns:m="http://schemas.openxmlformats.org/officeDocument/2006/math" xmlns="" val="1"/>
             </a:ext>
           </a:extLst>
         </p:spPr>
@@ -5483,7 +5483,7 @@
           </a:ln>
           <a:extLst>
             <a:ext uri="{C572A759-6A51-4108-AA02-DFA0A04FC94B}">
-              <ma14:wrappingTextBoxFlag xmlns="" xmlns:m="http://schemas.openxmlformats.org/officeDocument/2006/math" xmlns:a14="http://schemas.microsoft.com/office/drawing/2010/main" xmlns:ma14="http://schemas.microsoft.com/office/mac/drawingml/2011/main" val="1"/>
+              <ma14:wrappingTextBoxFlag xmlns:ma14="http://schemas.microsoft.com/office/mac/drawingml/2011/main" xmlns:a14="http://schemas.microsoft.com/office/drawing/2010/main" xmlns:m="http://schemas.openxmlformats.org/officeDocument/2006/math" xmlns="" val="1"/>
             </a:ext>
           </a:extLst>
         </p:spPr>
@@ -5616,7 +5616,7 @@
           </a:ln>
           <a:extLst>
             <a:ext uri="{C572A759-6A51-4108-AA02-DFA0A04FC94B}">
-              <ma14:wrappingTextBoxFlag xmlns="" xmlns:m="http://schemas.openxmlformats.org/officeDocument/2006/math" xmlns:a14="http://schemas.microsoft.com/office/drawing/2010/main" xmlns:ma14="http://schemas.microsoft.com/office/mac/drawingml/2011/main" val="1"/>
+              <ma14:wrappingTextBoxFlag xmlns:ma14="http://schemas.microsoft.com/office/mac/drawingml/2011/main" xmlns:a14="http://schemas.microsoft.com/office/drawing/2010/main" xmlns:m="http://schemas.openxmlformats.org/officeDocument/2006/math" xmlns="" val="1"/>
             </a:ext>
           </a:extLst>
         </p:spPr>
@@ -5671,7 +5671,7 @@
           </a:ln>
           <a:extLst>
             <a:ext uri="{C572A759-6A51-4108-AA02-DFA0A04FC94B}">
-              <ma14:wrappingTextBoxFlag xmlns="" xmlns:m="http://schemas.openxmlformats.org/officeDocument/2006/math" xmlns:a14="http://schemas.microsoft.com/office/drawing/2010/main" xmlns:ma14="http://schemas.microsoft.com/office/mac/drawingml/2011/main" val="1"/>
+              <ma14:wrappingTextBoxFlag xmlns:ma14="http://schemas.microsoft.com/office/mac/drawingml/2011/main" xmlns:a14="http://schemas.microsoft.com/office/drawing/2010/main" xmlns:m="http://schemas.openxmlformats.org/officeDocument/2006/math" xmlns="" val="1"/>
             </a:ext>
           </a:extLst>
         </p:spPr>
@@ -5726,7 +5726,7 @@
           </a:ln>
           <a:extLst>
             <a:ext uri="{C572A759-6A51-4108-AA02-DFA0A04FC94B}">
-              <ma14:wrappingTextBoxFlag xmlns="" xmlns:m="http://schemas.openxmlformats.org/officeDocument/2006/math" xmlns:a14="http://schemas.microsoft.com/office/drawing/2010/main" xmlns:ma14="http://schemas.microsoft.com/office/mac/drawingml/2011/main" val="1"/>
+              <ma14:wrappingTextBoxFlag xmlns:ma14="http://schemas.microsoft.com/office/mac/drawingml/2011/main" xmlns:a14="http://schemas.microsoft.com/office/drawing/2010/main" xmlns:m="http://schemas.openxmlformats.org/officeDocument/2006/math" xmlns="" val="1"/>
             </a:ext>
           </a:extLst>
         </p:spPr>
@@ -5774,7 +5774,7 @@
           </a:ln>
           <a:extLst>
             <a:ext uri="{C572A759-6A51-4108-AA02-DFA0A04FC94B}">
-              <ma14:wrappingTextBoxFlag xmlns="" xmlns:m="http://schemas.openxmlformats.org/officeDocument/2006/math" xmlns:a14="http://schemas.microsoft.com/office/drawing/2010/main" xmlns:ma14="http://schemas.microsoft.com/office/mac/drawingml/2011/main" val="1"/>
+              <ma14:wrappingTextBoxFlag xmlns:ma14="http://schemas.microsoft.com/office/mac/drawingml/2011/main" xmlns:a14="http://schemas.microsoft.com/office/drawing/2010/main" xmlns:m="http://schemas.openxmlformats.org/officeDocument/2006/math" xmlns="" val="1"/>
             </a:ext>
           </a:extLst>
         </p:spPr>
@@ -5896,7 +5896,7 @@
           </a:ln>
           <a:extLst>
             <a:ext uri="{C572A759-6A51-4108-AA02-DFA0A04FC94B}">
-              <ma14:wrappingTextBoxFlag xmlns="" xmlns:m="http://schemas.openxmlformats.org/officeDocument/2006/math" xmlns:a14="http://schemas.microsoft.com/office/drawing/2010/main" xmlns:ma14="http://schemas.microsoft.com/office/mac/drawingml/2011/main" val="1"/>
+              <ma14:wrappingTextBoxFlag xmlns:ma14="http://schemas.microsoft.com/office/mac/drawingml/2011/main" xmlns:a14="http://schemas.microsoft.com/office/drawing/2010/main" xmlns:m="http://schemas.openxmlformats.org/officeDocument/2006/math" xmlns="" val="1"/>
             </a:ext>
           </a:extLst>
         </p:spPr>
@@ -5951,7 +5951,7 @@
           </a:ln>
           <a:extLst>
             <a:ext uri="{C572A759-6A51-4108-AA02-DFA0A04FC94B}">
-              <ma14:wrappingTextBoxFlag xmlns="" xmlns:m="http://schemas.openxmlformats.org/officeDocument/2006/math" xmlns:a14="http://schemas.microsoft.com/office/drawing/2010/main" xmlns:ma14="http://schemas.microsoft.com/office/mac/drawingml/2011/main" val="1"/>
+              <ma14:wrappingTextBoxFlag xmlns:ma14="http://schemas.microsoft.com/office/mac/drawingml/2011/main" xmlns:a14="http://schemas.microsoft.com/office/drawing/2010/main" xmlns:m="http://schemas.openxmlformats.org/officeDocument/2006/math" xmlns="" val="1"/>
             </a:ext>
           </a:extLst>
         </p:spPr>
@@ -6088,7 +6088,7 @@
           </a:ln>
           <a:extLst>
             <a:ext uri="{C572A759-6A51-4108-AA02-DFA0A04FC94B}">
-              <ma14:wrappingTextBoxFlag xmlns="" xmlns:m="http://schemas.openxmlformats.org/officeDocument/2006/math" xmlns:a14="http://schemas.microsoft.com/office/drawing/2010/main" xmlns:ma14="http://schemas.microsoft.com/office/mac/drawingml/2011/main" val="1"/>
+              <ma14:wrappingTextBoxFlag xmlns:ma14="http://schemas.microsoft.com/office/mac/drawingml/2011/main" xmlns:a14="http://schemas.microsoft.com/office/drawing/2010/main" xmlns:m="http://schemas.openxmlformats.org/officeDocument/2006/math" xmlns="" val="1"/>
             </a:ext>
           </a:extLst>
         </p:spPr>
@@ -6943,7 +6943,7 @@
           </a:ln>
           <a:extLst>
             <a:ext uri="{C572A759-6A51-4108-AA02-DFA0A04FC94B}">
-              <ma14:wrappingTextBoxFlag xmlns="" xmlns:m="http://schemas.openxmlformats.org/officeDocument/2006/math" xmlns:a14="http://schemas.microsoft.com/office/drawing/2010/main" xmlns:ma14="http://schemas.microsoft.com/office/mac/drawingml/2011/main" val="1"/>
+              <ma14:wrappingTextBoxFlag xmlns:ma14="http://schemas.microsoft.com/office/mac/drawingml/2011/main" xmlns:a14="http://schemas.microsoft.com/office/drawing/2010/main" xmlns:m="http://schemas.openxmlformats.org/officeDocument/2006/math" xmlns="" val="1"/>
             </a:ext>
           </a:extLst>
         </p:spPr>
@@ -6997,7 +6997,7 @@
           </a:ln>
           <a:extLst>
             <a:ext uri="{C572A759-6A51-4108-AA02-DFA0A04FC94B}">
-              <ma14:wrappingTextBoxFlag xmlns="" xmlns:m="http://schemas.openxmlformats.org/officeDocument/2006/math" xmlns:a14="http://schemas.microsoft.com/office/drawing/2010/main" xmlns:ma14="http://schemas.microsoft.com/office/mac/drawingml/2011/main" val="1"/>
+              <ma14:wrappingTextBoxFlag xmlns:ma14="http://schemas.microsoft.com/office/mac/drawingml/2011/main" xmlns:a14="http://schemas.microsoft.com/office/drawing/2010/main" xmlns:m="http://schemas.openxmlformats.org/officeDocument/2006/math" xmlns="" val="1"/>
             </a:ext>
           </a:extLst>
         </p:spPr>
@@ -7088,7 +7088,7 @@
           </a:ln>
           <a:extLst>
             <a:ext uri="{C572A759-6A51-4108-AA02-DFA0A04FC94B}">
-              <ma14:wrappingTextBoxFlag xmlns="" xmlns:m="http://schemas.openxmlformats.org/officeDocument/2006/math" xmlns:a14="http://schemas.microsoft.com/office/drawing/2010/main" xmlns:ma14="http://schemas.microsoft.com/office/mac/drawingml/2011/main" val="1"/>
+              <ma14:wrappingTextBoxFlag xmlns:ma14="http://schemas.microsoft.com/office/mac/drawingml/2011/main" xmlns:a14="http://schemas.microsoft.com/office/drawing/2010/main" xmlns:m="http://schemas.openxmlformats.org/officeDocument/2006/math" xmlns="" val="1"/>
             </a:ext>
           </a:extLst>
         </p:spPr>
@@ -7273,7 +7273,7 @@
           </a:ln>
           <a:extLst>
             <a:ext uri="{C572A759-6A51-4108-AA02-DFA0A04FC94B}">
-              <ma14:wrappingTextBoxFlag xmlns="" xmlns:m="http://schemas.openxmlformats.org/officeDocument/2006/math" xmlns:a14="http://schemas.microsoft.com/office/drawing/2010/main" xmlns:ma14="http://schemas.microsoft.com/office/mac/drawingml/2011/main" val="1"/>
+              <ma14:wrappingTextBoxFlag xmlns:ma14="http://schemas.microsoft.com/office/mac/drawingml/2011/main" xmlns:a14="http://schemas.microsoft.com/office/drawing/2010/main" xmlns:m="http://schemas.openxmlformats.org/officeDocument/2006/math" xmlns="" val="1"/>
             </a:ext>
           </a:extLst>
         </p:spPr>
@@ -7414,7 +7414,7 @@
           </a:ln>
           <a:extLst>
             <a:ext uri="{C572A759-6A51-4108-AA02-DFA0A04FC94B}">
-              <ma14:wrappingTextBoxFlag xmlns="" xmlns:m="http://schemas.openxmlformats.org/officeDocument/2006/math" xmlns:a14="http://schemas.microsoft.com/office/drawing/2010/main" xmlns:ma14="http://schemas.microsoft.com/office/mac/drawingml/2011/main" val="1"/>
+              <ma14:wrappingTextBoxFlag xmlns:ma14="http://schemas.microsoft.com/office/mac/drawingml/2011/main" xmlns:a14="http://schemas.microsoft.com/office/drawing/2010/main" xmlns:m="http://schemas.openxmlformats.org/officeDocument/2006/math" xmlns="" val="1"/>
             </a:ext>
           </a:extLst>
         </p:spPr>
@@ -7464,7 +7464,7 @@
           </a:ln>
           <a:extLst>
             <a:ext uri="{C572A759-6A51-4108-AA02-DFA0A04FC94B}">
-              <ma14:wrappingTextBoxFlag xmlns="" xmlns:m="http://schemas.openxmlformats.org/officeDocument/2006/math" xmlns:a14="http://schemas.microsoft.com/office/drawing/2010/main" xmlns:ma14="http://schemas.microsoft.com/office/mac/drawingml/2011/main" val="1"/>
+              <ma14:wrappingTextBoxFlag xmlns:ma14="http://schemas.microsoft.com/office/mac/drawingml/2011/main" xmlns:a14="http://schemas.microsoft.com/office/drawing/2010/main" xmlns:m="http://schemas.openxmlformats.org/officeDocument/2006/math" xmlns="" val="1"/>
             </a:ext>
           </a:extLst>
         </p:spPr>
@@ -7514,7 +7514,7 @@
           </a:ln>
           <a:extLst>
             <a:ext uri="{C572A759-6A51-4108-AA02-DFA0A04FC94B}">
-              <ma14:wrappingTextBoxFlag xmlns="" xmlns:m="http://schemas.openxmlformats.org/officeDocument/2006/math" xmlns:a14="http://schemas.microsoft.com/office/drawing/2010/main" xmlns:ma14="http://schemas.microsoft.com/office/mac/drawingml/2011/main" val="1"/>
+              <ma14:wrappingTextBoxFlag xmlns:ma14="http://schemas.microsoft.com/office/mac/drawingml/2011/main" xmlns:a14="http://schemas.microsoft.com/office/drawing/2010/main" xmlns:m="http://schemas.openxmlformats.org/officeDocument/2006/math" xmlns="" val="1"/>
             </a:ext>
           </a:extLst>
         </p:spPr>
@@ -7559,7 +7559,7 @@
           </a:ln>
           <a:extLst>
             <a:ext uri="{C572A759-6A51-4108-AA02-DFA0A04FC94B}">
-              <ma14:wrappingTextBoxFlag xmlns="" xmlns:m="http://schemas.openxmlformats.org/officeDocument/2006/math" xmlns:a14="http://schemas.microsoft.com/office/drawing/2010/main" xmlns:ma14="http://schemas.microsoft.com/office/mac/drawingml/2011/main" val="1"/>
+              <ma14:wrappingTextBoxFlag xmlns:ma14="http://schemas.microsoft.com/office/mac/drawingml/2011/main" xmlns:a14="http://schemas.microsoft.com/office/drawing/2010/main" xmlns:m="http://schemas.openxmlformats.org/officeDocument/2006/math" xmlns="" val="1"/>
             </a:ext>
           </a:extLst>
         </p:spPr>
@@ -7614,7 +7614,7 @@
           </a:ln>
           <a:extLst>
             <a:ext uri="{C572A759-6A51-4108-AA02-DFA0A04FC94B}">
-              <ma14:wrappingTextBoxFlag xmlns="" xmlns:m="http://schemas.openxmlformats.org/officeDocument/2006/math" xmlns:a14="http://schemas.microsoft.com/office/drawing/2010/main" xmlns:ma14="http://schemas.microsoft.com/office/mac/drawingml/2011/main" val="1"/>
+              <ma14:wrappingTextBoxFlag xmlns:ma14="http://schemas.microsoft.com/office/mac/drawingml/2011/main" xmlns:a14="http://schemas.microsoft.com/office/drawing/2010/main" xmlns:m="http://schemas.openxmlformats.org/officeDocument/2006/math" xmlns="" val="1"/>
             </a:ext>
           </a:extLst>
         </p:spPr>
@@ -7663,7 +7663,7 @@
           </a:ln>
           <a:extLst>
             <a:ext uri="{C572A759-6A51-4108-AA02-DFA0A04FC94B}">
-              <ma14:wrappingTextBoxFlag xmlns="" xmlns:m="http://schemas.openxmlformats.org/officeDocument/2006/math" xmlns:a14="http://schemas.microsoft.com/office/drawing/2010/main" xmlns:ma14="http://schemas.microsoft.com/office/mac/drawingml/2011/main" val="1"/>
+              <ma14:wrappingTextBoxFlag xmlns:ma14="http://schemas.microsoft.com/office/mac/drawingml/2011/main" xmlns:a14="http://schemas.microsoft.com/office/drawing/2010/main" xmlns:m="http://schemas.openxmlformats.org/officeDocument/2006/math" xmlns="" val="1"/>
             </a:ext>
           </a:extLst>
         </p:spPr>
@@ -7782,7 +7782,7 @@
           </a:ln>
           <a:extLst>
             <a:ext uri="{C572A759-6A51-4108-AA02-DFA0A04FC94B}">
-              <ma14:wrappingTextBoxFlag xmlns="" xmlns:m="http://schemas.openxmlformats.org/officeDocument/2006/math" xmlns:a14="http://schemas.microsoft.com/office/drawing/2010/main" xmlns:ma14="http://schemas.microsoft.com/office/mac/drawingml/2011/main" val="1"/>
+              <ma14:wrappingTextBoxFlag xmlns:ma14="http://schemas.microsoft.com/office/mac/drawingml/2011/main" xmlns:a14="http://schemas.microsoft.com/office/drawing/2010/main" xmlns:m="http://schemas.openxmlformats.org/officeDocument/2006/math" xmlns="" val="1"/>
             </a:ext>
           </a:extLst>
         </p:spPr>
@@ -7836,7 +7836,7 @@
           </a:ln>
           <a:extLst>
             <a:ext uri="{C572A759-6A51-4108-AA02-DFA0A04FC94B}">
-              <ma14:wrappingTextBoxFlag xmlns="" xmlns:m="http://schemas.openxmlformats.org/officeDocument/2006/math" xmlns:a14="http://schemas.microsoft.com/office/drawing/2010/main" xmlns:ma14="http://schemas.microsoft.com/office/mac/drawingml/2011/main" val="1"/>
+              <ma14:wrappingTextBoxFlag xmlns:ma14="http://schemas.microsoft.com/office/mac/drawingml/2011/main" xmlns:a14="http://schemas.microsoft.com/office/drawing/2010/main" xmlns:m="http://schemas.openxmlformats.org/officeDocument/2006/math" xmlns="" val="1"/>
             </a:ext>
           </a:extLst>
         </p:spPr>
@@ -7950,7 +7950,7 @@
           </a:ln>
           <a:extLst>
             <a:ext uri="{C572A759-6A51-4108-AA02-DFA0A04FC94B}">
-              <ma14:wrappingTextBoxFlag xmlns="" xmlns:m="http://schemas.openxmlformats.org/officeDocument/2006/math" xmlns:a14="http://schemas.microsoft.com/office/drawing/2010/main" xmlns:ma14="http://schemas.microsoft.com/office/mac/drawingml/2011/main" val="1"/>
+              <ma14:wrappingTextBoxFlag xmlns:ma14="http://schemas.microsoft.com/office/mac/drawingml/2011/main" xmlns:a14="http://schemas.microsoft.com/office/drawing/2010/main" xmlns:m="http://schemas.openxmlformats.org/officeDocument/2006/math" xmlns="" val="1"/>
             </a:ext>
           </a:extLst>
         </p:spPr>
@@ -8064,7 +8064,7 @@
           </a:ln>
           <a:extLst>
             <a:ext uri="{C572A759-6A51-4108-AA02-DFA0A04FC94B}">
-              <ma14:wrappingTextBoxFlag xmlns="" xmlns:m="http://schemas.openxmlformats.org/officeDocument/2006/math" xmlns:a14="http://schemas.microsoft.com/office/drawing/2010/main" xmlns:ma14="http://schemas.microsoft.com/office/mac/drawingml/2011/main" val="1"/>
+              <ma14:wrappingTextBoxFlag xmlns:ma14="http://schemas.microsoft.com/office/mac/drawingml/2011/main" xmlns:a14="http://schemas.microsoft.com/office/drawing/2010/main" xmlns:m="http://schemas.openxmlformats.org/officeDocument/2006/math" xmlns="" val="1"/>
             </a:ext>
           </a:extLst>
         </p:spPr>
@@ -8190,7 +8190,7 @@
           </a:ln>
           <a:extLst>
             <a:ext uri="{C572A759-6A51-4108-AA02-DFA0A04FC94B}">
-              <ma14:wrappingTextBoxFlag xmlns="" xmlns:m="http://schemas.openxmlformats.org/officeDocument/2006/math" xmlns:a14="http://schemas.microsoft.com/office/drawing/2010/main" xmlns:ma14="http://schemas.microsoft.com/office/mac/drawingml/2011/main" val="1"/>
+              <ma14:wrappingTextBoxFlag xmlns:ma14="http://schemas.microsoft.com/office/mac/drawingml/2011/main" xmlns:a14="http://schemas.microsoft.com/office/drawing/2010/main" xmlns:m="http://schemas.openxmlformats.org/officeDocument/2006/math" xmlns="" val="1"/>
             </a:ext>
           </a:extLst>
         </p:spPr>
@@ -8564,7 +8564,7 @@
           </a:ln>
           <a:extLst>
             <a:ext uri="{C572A759-6A51-4108-AA02-DFA0A04FC94B}">
-              <ma14:wrappingTextBoxFlag xmlns="" xmlns:m="http://schemas.openxmlformats.org/officeDocument/2006/math" xmlns:a14="http://schemas.microsoft.com/office/drawing/2010/main" xmlns:ma14="http://schemas.microsoft.com/office/mac/drawingml/2011/main" val="1"/>
+              <ma14:wrappingTextBoxFlag xmlns:ma14="http://schemas.microsoft.com/office/mac/drawingml/2011/main" xmlns:a14="http://schemas.microsoft.com/office/drawing/2010/main" xmlns:m="http://schemas.openxmlformats.org/officeDocument/2006/math" xmlns="" val="1"/>
             </a:ext>
           </a:extLst>
         </p:spPr>
@@ -8614,7 +8614,7 @@
           </a:ln>
           <a:extLst>
             <a:ext uri="{C572A759-6A51-4108-AA02-DFA0A04FC94B}">
-              <ma14:wrappingTextBoxFlag xmlns="" xmlns:m="http://schemas.openxmlformats.org/officeDocument/2006/math" xmlns:a14="http://schemas.microsoft.com/office/drawing/2010/main" xmlns:ma14="http://schemas.microsoft.com/office/mac/drawingml/2011/main" val="1"/>
+              <ma14:wrappingTextBoxFlag xmlns:ma14="http://schemas.microsoft.com/office/mac/drawingml/2011/main" xmlns:a14="http://schemas.microsoft.com/office/drawing/2010/main" xmlns:m="http://schemas.openxmlformats.org/officeDocument/2006/math" xmlns="" val="1"/>
             </a:ext>
           </a:extLst>
         </p:spPr>
@@ -8722,7 +8722,7 @@
           </a:ln>
           <a:extLst>
             <a:ext uri="{C572A759-6A51-4108-AA02-DFA0A04FC94B}">
-              <ma14:wrappingTextBoxFlag xmlns="" xmlns:m="http://schemas.openxmlformats.org/officeDocument/2006/math" xmlns:a14="http://schemas.microsoft.com/office/drawing/2010/main" xmlns:ma14="http://schemas.microsoft.com/office/mac/drawingml/2011/main" val="1"/>
+              <ma14:wrappingTextBoxFlag xmlns:ma14="http://schemas.microsoft.com/office/mac/drawingml/2011/main" xmlns:a14="http://schemas.microsoft.com/office/drawing/2010/main" xmlns:m="http://schemas.openxmlformats.org/officeDocument/2006/math" xmlns="" val="1"/>
             </a:ext>
           </a:extLst>
         </p:spPr>
@@ -8791,7 +8791,7 @@
           </a:ln>
           <a:extLst>
             <a:ext uri="{C572A759-6A51-4108-AA02-DFA0A04FC94B}">
-              <ma14:wrappingTextBoxFlag xmlns="" xmlns:m="http://schemas.openxmlformats.org/officeDocument/2006/math" xmlns:a14="http://schemas.microsoft.com/office/drawing/2010/main" xmlns:ma14="http://schemas.microsoft.com/office/mac/drawingml/2011/main" val="1"/>
+              <ma14:wrappingTextBoxFlag xmlns:ma14="http://schemas.microsoft.com/office/mac/drawingml/2011/main" xmlns:a14="http://schemas.microsoft.com/office/drawing/2010/main" xmlns:m="http://schemas.openxmlformats.org/officeDocument/2006/math" xmlns="" val="1"/>
             </a:ext>
           </a:extLst>
         </p:spPr>
@@ -9241,7 +9241,7 @@
           </a:ln>
           <a:extLst>
             <a:ext uri="{C572A759-6A51-4108-AA02-DFA0A04FC94B}">
-              <ma14:wrappingTextBoxFlag xmlns="" xmlns:m="http://schemas.openxmlformats.org/officeDocument/2006/math" xmlns:a14="http://schemas.microsoft.com/office/drawing/2010/main" xmlns:ma14="http://schemas.microsoft.com/office/mac/drawingml/2011/main" val="1"/>
+              <ma14:wrappingTextBoxFlag xmlns:ma14="http://schemas.microsoft.com/office/mac/drawingml/2011/main" xmlns:a14="http://schemas.microsoft.com/office/drawing/2010/main" xmlns:m="http://schemas.openxmlformats.org/officeDocument/2006/math" xmlns="" val="1"/>
             </a:ext>
           </a:extLst>
         </p:spPr>
@@ -9286,7 +9286,7 @@
           </a:ln>
           <a:extLst>
             <a:ext uri="{C572A759-6A51-4108-AA02-DFA0A04FC94B}">
-              <ma14:wrappingTextBoxFlag xmlns="" xmlns:m="http://schemas.openxmlformats.org/officeDocument/2006/math" xmlns:a14="http://schemas.microsoft.com/office/drawing/2010/main" xmlns:ma14="http://schemas.microsoft.com/office/mac/drawingml/2011/main" val="1"/>
+              <ma14:wrappingTextBoxFlag xmlns:ma14="http://schemas.microsoft.com/office/mac/drawingml/2011/main" xmlns:a14="http://schemas.microsoft.com/office/drawing/2010/main" xmlns:m="http://schemas.openxmlformats.org/officeDocument/2006/math" xmlns="" val="1"/>
             </a:ext>
           </a:extLst>
         </p:spPr>
@@ -9746,7 +9746,7 @@
           </a:ln>
           <a:extLst>
             <a:ext uri="{C572A759-6A51-4108-AA02-DFA0A04FC94B}">
-              <ma14:wrappingTextBoxFlag xmlns="" xmlns:m="http://schemas.openxmlformats.org/officeDocument/2006/math" xmlns:a14="http://schemas.microsoft.com/office/drawing/2010/main" xmlns:ma14="http://schemas.microsoft.com/office/mac/drawingml/2011/main" val="1"/>
+              <ma14:wrappingTextBoxFlag xmlns:ma14="http://schemas.microsoft.com/office/mac/drawingml/2011/main" xmlns:a14="http://schemas.microsoft.com/office/drawing/2010/main" xmlns:m="http://schemas.openxmlformats.org/officeDocument/2006/math" xmlns="" val="1"/>
             </a:ext>
           </a:extLst>
         </p:spPr>
@@ -9828,7 +9828,7 @@
           </a:ln>
           <a:extLst>
             <a:ext uri="{C572A759-6A51-4108-AA02-DFA0A04FC94B}">
-              <ma14:wrappingTextBoxFlag xmlns="" xmlns:m="http://schemas.openxmlformats.org/officeDocument/2006/math" xmlns:a14="http://schemas.microsoft.com/office/drawing/2010/main" xmlns:ma14="http://schemas.microsoft.com/office/mac/drawingml/2011/main" val="1"/>
+              <ma14:wrappingTextBoxFlag xmlns:ma14="http://schemas.microsoft.com/office/mac/drawingml/2011/main" xmlns:a14="http://schemas.microsoft.com/office/drawing/2010/main" xmlns:m="http://schemas.openxmlformats.org/officeDocument/2006/math" xmlns="" val="1"/>
             </a:ext>
           </a:extLst>
         </p:spPr>
@@ -10284,8 +10284,8 @@
         </p:nvSpPr>
         <p:spPr>
           <a:xfrm>
-            <a:off x="9426688" y="5746748"/>
-            <a:ext cx="2936037" cy="190501"/>
+            <a:off x="9426688" y="5749665"/>
+            <a:ext cx="2827697" cy="184666"/>
           </a:xfrm>
           <a:prstGeom prst="rect">
             <a:avLst/>
@@ -10295,7 +10295,7 @@
           </a:ln>
           <a:extLst>
             <a:ext uri="{C572A759-6A51-4108-AA02-DFA0A04FC94B}">
-              <ma14:wrappingTextBoxFlag xmlns="" xmlns:m="http://schemas.openxmlformats.org/officeDocument/2006/math" xmlns:a14="http://schemas.microsoft.com/office/drawing/2010/main" xmlns:ma14="http://schemas.microsoft.com/office/mac/drawingml/2011/main" val="1"/>
+              <ma14:wrappingTextBoxFlag xmlns:ma14="http://schemas.microsoft.com/office/mac/drawingml/2011/main" xmlns:a14="http://schemas.microsoft.com/office/drawing/2010/main" xmlns:m="http://schemas.openxmlformats.org/officeDocument/2006/math" xmlns="" val="1"/>
             </a:ext>
           </a:extLst>
         </p:spPr>
@@ -10314,8 +10314,14 @@
               </a:defRPr>
             </a:pPr>
             <a:r>
-              <a:t>MANIPULATE MULTIPLE VARIABLES AT ONCE</a:t>
-            </a:r>
+              <a:rPr dirty="0"/>
+              <a:t>MANIPULA</a:t>
+            </a:r>
+            <a:r>
+              <a:rPr lang="pt-BR" dirty="0"/>
+              <a:t>R VÁRIAS VARIÁVEIS DE UMA VEZ</a:t>
+            </a:r>
+            <a:endParaRPr dirty="0"/>
           </a:p>
         </p:txBody>
       </p:sp>
@@ -10328,7 +10334,7 @@
         <p:spPr>
           <a:xfrm>
             <a:off x="10447755" y="5994400"/>
-            <a:ext cx="3319208" cy="1130301"/>
+            <a:ext cx="3319208" cy="1062920"/>
           </a:xfrm>
           <a:prstGeom prst="rect">
             <a:avLst/>
@@ -10338,7 +10344,7 @@
           </a:ln>
           <a:extLst>
             <a:ext uri="{C572A759-6A51-4108-AA02-DFA0A04FC94B}">
-              <ma14:wrappingTextBoxFlag xmlns="" xmlns:m="http://schemas.openxmlformats.org/officeDocument/2006/math" xmlns:a14="http://schemas.microsoft.com/office/drawing/2010/main" xmlns:ma14="http://schemas.microsoft.com/office/mac/drawingml/2011/main" val="1"/>
+              <ma14:wrappingTextBoxFlag xmlns:ma14="http://schemas.microsoft.com/office/mac/drawingml/2011/main" xmlns:a14="http://schemas.microsoft.com/office/drawing/2010/main" xmlns:m="http://schemas.openxmlformats.org/officeDocument/2006/math" xmlns="" val="1"/>
             </a:ext>
           </a:extLst>
         </p:spPr>
@@ -10366,10 +10372,11 @@
               </a:defRPr>
             </a:pPr>
             <a:r>
+              <a:rPr dirty="0"/>
               <a:t>across(</a:t>
             </a:r>
             <a:r>
-              <a:rPr>
+              <a:rPr dirty="0">
                 <a:latin typeface="+mj-lt"/>
                 <a:ea typeface="+mj-ea"/>
                 <a:cs typeface="+mj-cs"/>
@@ -10378,16 +10385,35 @@
               <a:t>.cols, .funs, …, .names = NULL</a:t>
             </a:r>
             <a:r>
+              <a:rPr dirty="0"/>
               <a:t>)</a:t>
             </a:r>
             <a:r>
-              <a:rPr>
+              <a:rPr dirty="0">
                 <a:latin typeface="+mj-lt"/>
                 <a:ea typeface="+mj-ea"/>
                 <a:cs typeface="+mj-cs"/>
                 <a:sym typeface="Source Sans Pro Regular"/>
               </a:rPr>
-              <a:t> Summarise or mutate multiple columns in the same way. </a:t>
+              <a:t> </a:t>
+            </a:r>
+            <a:r>
+              <a:rPr lang="pt-BR" dirty="0">
+                <a:latin typeface="+mj-lt"/>
+                <a:ea typeface="+mj-ea"/>
+                <a:cs typeface="+mj-cs"/>
+                <a:sym typeface="Source Sans Pro Regular"/>
+              </a:rPr>
+              <a:t>Resume ou alterar múltiplas colunas da mesma maneira</a:t>
+            </a:r>
+            <a:r>
+              <a:rPr dirty="0">
+                <a:latin typeface="+mj-lt"/>
+                <a:ea typeface="+mj-ea"/>
+                <a:cs typeface="+mj-cs"/>
+                <a:sym typeface="Source Sans Pro Regular"/>
+              </a:rPr>
+              <a:t>. </a:t>
             </a:r>
           </a:p>
           <a:p>
@@ -10409,7 +10435,20 @@
               </a:defRPr>
             </a:pPr>
             <a:r>
-              <a:t>summarise(mtcars, across(everything(), mean))</a:t>
+              <a:rPr dirty="0" err="1"/>
+              <a:t>summarise</a:t>
+            </a:r>
+            <a:r>
+              <a:rPr dirty="0"/>
+              <a:t>(</a:t>
+            </a:r>
+            <a:r>
+              <a:rPr dirty="0" err="1"/>
+              <a:t>mtcars</a:t>
+            </a:r>
+            <a:r>
+              <a:rPr dirty="0"/>
+              <a:t>, across(everything(), mean))</a:t>
             </a:r>
           </a:p>
           <a:p>
@@ -10426,7 +10465,7 @@
                 </a:solidFill>
               </a:defRPr>
             </a:pPr>
-            <a:endParaRPr/>
+            <a:endParaRPr dirty="0"/>
           </a:p>
           <a:p>
             <a:pPr>
@@ -10447,10 +10486,15 @@
               </a:defRPr>
             </a:pPr>
             <a:r>
-              <a:t>c_across(</a:t>
-            </a:r>
-            <a:r>
-              <a:rPr>
+              <a:rPr dirty="0" err="1"/>
+              <a:t>c_across</a:t>
+            </a:r>
+            <a:r>
+              <a:rPr dirty="0"/>
+              <a:t>(</a:t>
+            </a:r>
+            <a:r>
+              <a:rPr dirty="0">
                 <a:latin typeface="+mj-lt"/>
                 <a:ea typeface="+mj-ea"/>
                 <a:cs typeface="+mj-cs"/>
@@ -10459,34 +10503,57 @@
               <a:t>.cols</a:t>
             </a:r>
             <a:r>
+              <a:rPr dirty="0"/>
               <a:t>)</a:t>
             </a:r>
             <a:r>
-              <a:rPr>
+              <a:rPr dirty="0">
                 <a:latin typeface="+mj-lt"/>
                 <a:ea typeface="+mj-ea"/>
                 <a:cs typeface="+mj-cs"/>
                 <a:sym typeface="Source Sans Pro Regular"/>
               </a:rPr>
-              <a:t> Compute across columns in </a:t>
-            </a:r>
-          </a:p>
-          <a:p>
-            <a:pPr>
-              <a:lnSpc>
-                <a:spcPct val="80000"/>
-              </a:lnSpc>
-              <a:spcBef>
-                <a:spcPts val="0"/>
-              </a:spcBef>
-              <a:defRPr>
-                <a:solidFill>
-                  <a:srgbClr val="000000"/>
-                </a:solidFill>
-              </a:defRPr>
-            </a:pPr>
-            <a:r>
-              <a:t>row-wise data.</a:t>
+              <a:t> </a:t>
+            </a:r>
+            <a:r>
+              <a:rPr dirty="0" err="1">
+                <a:latin typeface="+mj-lt"/>
+                <a:ea typeface="+mj-ea"/>
+                <a:cs typeface="+mj-cs"/>
+                <a:sym typeface="Source Sans Pro Regular"/>
+              </a:rPr>
+              <a:t>Comput</a:t>
+            </a:r>
+            <a:r>
+              <a:rPr lang="pt-BR" dirty="0">
+                <a:latin typeface="+mj-lt"/>
+                <a:ea typeface="+mj-ea"/>
+                <a:cs typeface="+mj-cs"/>
+                <a:sym typeface="Source Sans Pro Regular"/>
+              </a:rPr>
+              <a:t>a</a:t>
+            </a:r>
+            <a:r>
+              <a:rPr dirty="0">
+                <a:latin typeface="+mj-lt"/>
+                <a:ea typeface="+mj-ea"/>
+                <a:cs typeface="+mj-cs"/>
+                <a:sym typeface="Source Sans Pro Regular"/>
+              </a:rPr>
+              <a:t> </a:t>
+            </a:r>
+            <a:r>
+              <a:rPr lang="pt-BR" dirty="0">
+                <a:latin typeface="+mj-lt"/>
+                <a:ea typeface="+mj-ea"/>
+                <a:cs typeface="+mj-cs"/>
+                <a:sym typeface="Source Sans Pro Regular"/>
+              </a:rPr>
+              <a:t>através das colunas os dados linha a linha</a:t>
+            </a:r>
+            <a:r>
+              <a:rPr dirty="0"/>
+              <a:t>.</a:t>
             </a:r>
           </a:p>
           <a:p>
@@ -10508,7 +10575,32 @@
               </a:defRPr>
             </a:pPr>
             <a:r>
-              <a:t>transmute(rowwise(UKgas), total = sum(c_across(1:2)))</a:t>
+              <a:rPr dirty="0"/>
+              <a:t>transmute(</a:t>
+            </a:r>
+            <a:r>
+              <a:rPr dirty="0" err="1"/>
+              <a:t>rowwise</a:t>
+            </a:r>
+            <a:r>
+              <a:rPr dirty="0"/>
+              <a:t>(</a:t>
+            </a:r>
+            <a:r>
+              <a:rPr dirty="0" err="1"/>
+              <a:t>UKgas</a:t>
+            </a:r>
+            <a:r>
+              <a:rPr dirty="0"/>
+              <a:t>), total = sum(</a:t>
+            </a:r>
+            <a:r>
+              <a:rPr dirty="0" err="1"/>
+              <a:t>c_across</a:t>
+            </a:r>
+            <a:r>
+              <a:rPr dirty="0"/>
+              <a:t>(1:2)))</a:t>
             </a:r>
           </a:p>
         </p:txBody>
@@ -10593,7 +10685,7 @@
           </a:ln>
           <a:extLst>
             <a:ext uri="{C572A759-6A51-4108-AA02-DFA0A04FC94B}">
-              <ma14:wrappingTextBoxFlag xmlns="" xmlns:m="http://schemas.openxmlformats.org/officeDocument/2006/math" xmlns:a14="http://schemas.microsoft.com/office/drawing/2010/main" xmlns:ma14="http://schemas.microsoft.com/office/mac/drawingml/2011/main" val="1"/>
+              <ma14:wrappingTextBoxFlag xmlns:ma14="http://schemas.microsoft.com/office/mac/drawingml/2011/main" xmlns:a14="http://schemas.microsoft.com/office/drawing/2010/main" xmlns:m="http://schemas.openxmlformats.org/officeDocument/2006/math" xmlns="" val="1"/>
             </a:ext>
           </a:extLst>
         </p:spPr>
@@ -10869,7 +10961,7 @@
           </a:ln>
           <a:extLst>
             <a:ext uri="{C572A759-6A51-4108-AA02-DFA0A04FC94B}">
-              <ma14:wrappingTextBoxFlag xmlns="" xmlns:m="http://schemas.openxmlformats.org/officeDocument/2006/math" xmlns:a14="http://schemas.microsoft.com/office/drawing/2010/main" xmlns:ma14="http://schemas.microsoft.com/office/mac/drawingml/2011/main" val="1"/>
+              <ma14:wrappingTextBoxFlag xmlns:ma14="http://schemas.microsoft.com/office/mac/drawingml/2011/main" xmlns:a14="http://schemas.microsoft.com/office/drawing/2010/main" xmlns:m="http://schemas.openxmlformats.org/officeDocument/2006/math" xmlns="" val="1"/>
             </a:ext>
           </a:extLst>
         </p:spPr>
@@ -10996,7 +11088,7 @@
           </a:ln>
           <a:extLst>
             <a:ext uri="{C572A759-6A51-4108-AA02-DFA0A04FC94B}">
-              <ma14:wrappingTextBoxFlag xmlns="" xmlns:m="http://schemas.openxmlformats.org/officeDocument/2006/math" xmlns:a14="http://schemas.microsoft.com/office/drawing/2010/main" xmlns:ma14="http://schemas.microsoft.com/office/mac/drawingml/2011/main" val="1"/>
+              <ma14:wrappingTextBoxFlag xmlns:ma14="http://schemas.microsoft.com/office/mac/drawingml/2011/main" xmlns:a14="http://schemas.microsoft.com/office/drawing/2010/main" xmlns:m="http://schemas.openxmlformats.org/officeDocument/2006/math" xmlns="" val="1"/>
             </a:ext>
           </a:extLst>
         </p:spPr>
@@ -22876,7 +22968,7 @@
           </a:ln>
           <a:extLst>
             <a:ext uri="{C572A759-6A51-4108-AA02-DFA0A04FC94B}">
-              <ma14:wrappingTextBoxFlag xmlns="" xmlns:m="http://schemas.openxmlformats.org/officeDocument/2006/math" xmlns:a14="http://schemas.microsoft.com/office/drawing/2010/main" xmlns:ma14="http://schemas.microsoft.com/office/mac/drawingml/2011/main" val="1"/>
+              <ma14:wrappingTextBoxFlag xmlns:ma14="http://schemas.microsoft.com/office/mac/drawingml/2011/main" xmlns:a14="http://schemas.microsoft.com/office/drawing/2010/main" xmlns:m="http://schemas.openxmlformats.org/officeDocument/2006/math" xmlns="" val="1"/>
             </a:ext>
           </a:extLst>
         </p:spPr>
@@ -23785,7 +23877,7 @@
           </a:ln>
           <a:extLst>
             <a:ext uri="{C572A759-6A51-4108-AA02-DFA0A04FC94B}">
-              <ma14:wrappingTextBoxFlag xmlns="" xmlns:m="http://schemas.openxmlformats.org/officeDocument/2006/math" xmlns:a14="http://schemas.microsoft.com/office/drawing/2010/main" xmlns:ma14="http://schemas.microsoft.com/office/mac/drawingml/2011/main" val="1"/>
+              <ma14:wrappingTextBoxFlag xmlns:ma14="http://schemas.microsoft.com/office/mac/drawingml/2011/main" xmlns:a14="http://schemas.microsoft.com/office/drawing/2010/main" xmlns:m="http://schemas.openxmlformats.org/officeDocument/2006/math" xmlns="" val="1"/>
             </a:ext>
           </a:extLst>
         </p:spPr>
@@ -25994,7 +26086,7 @@
           </a:ln>
           <a:extLst>
             <a:ext uri="{C572A759-6A51-4108-AA02-DFA0A04FC94B}">
-              <ma14:wrappingTextBoxFlag xmlns="" xmlns:m="http://schemas.openxmlformats.org/officeDocument/2006/math" xmlns:a14="http://schemas.microsoft.com/office/drawing/2010/main" xmlns:ma14="http://schemas.microsoft.com/office/mac/drawingml/2011/main" val="1"/>
+              <ma14:wrappingTextBoxFlag xmlns:ma14="http://schemas.microsoft.com/office/mac/drawingml/2011/main" xmlns:a14="http://schemas.microsoft.com/office/drawing/2010/main" xmlns:m="http://schemas.openxmlformats.org/officeDocument/2006/math" xmlns="" val="1"/>
             </a:ext>
           </a:extLst>
         </p:spPr>
@@ -26123,7 +26215,7 @@
           </a:ln>
           <a:extLst>
             <a:ext uri="{C572A759-6A51-4108-AA02-DFA0A04FC94B}">
-              <ma14:wrappingTextBoxFlag xmlns="" xmlns:m="http://schemas.openxmlformats.org/officeDocument/2006/math" xmlns:a14="http://schemas.microsoft.com/office/drawing/2010/main" xmlns:ma14="http://schemas.microsoft.com/office/mac/drawingml/2011/main" val="1"/>
+              <ma14:wrappingTextBoxFlag xmlns:ma14="http://schemas.microsoft.com/office/mac/drawingml/2011/main" xmlns:a14="http://schemas.microsoft.com/office/drawing/2010/main" xmlns:m="http://schemas.openxmlformats.org/officeDocument/2006/math" xmlns="" val="1"/>
             </a:ext>
           </a:extLst>
         </p:spPr>
@@ -26173,7 +26265,7 @@
           </a:ln>
           <a:extLst>
             <a:ext uri="{C572A759-6A51-4108-AA02-DFA0A04FC94B}">
-              <ma14:wrappingTextBoxFlag xmlns="" xmlns:m="http://schemas.openxmlformats.org/officeDocument/2006/math" xmlns:a14="http://schemas.microsoft.com/office/drawing/2010/main" xmlns:ma14="http://schemas.microsoft.com/office/mac/drawingml/2011/main" val="1"/>
+              <ma14:wrappingTextBoxFlag xmlns:ma14="http://schemas.microsoft.com/office/mac/drawingml/2011/main" xmlns:a14="http://schemas.microsoft.com/office/drawing/2010/main" xmlns:m="http://schemas.openxmlformats.org/officeDocument/2006/math" xmlns="" val="1"/>
             </a:ext>
           </a:extLst>
         </p:spPr>
@@ -26300,7 +26392,7 @@
             <a:effectLst/>
             <a:extLst>
               <a:ext uri="{C572A759-6A51-4108-AA02-DFA0A04FC94B}">
-                <ma14:wrappingTextBoxFlag xmlns="" xmlns:m="http://schemas.openxmlformats.org/officeDocument/2006/math" xmlns:a14="http://schemas.microsoft.com/office/drawing/2010/main" xmlns:ma14="http://schemas.microsoft.com/office/mac/drawingml/2011/main" val="1"/>
+                <ma14:wrappingTextBoxFlag xmlns:ma14="http://schemas.microsoft.com/office/mac/drawingml/2011/main" xmlns:a14="http://schemas.microsoft.com/office/drawing/2010/main" xmlns:m="http://schemas.openxmlformats.org/officeDocument/2006/math" xmlns="" val="1"/>
               </a:ext>
             </a:extLst>
           </p:spPr>
@@ -26356,7 +26448,7 @@
           </a:ln>
           <a:extLst>
             <a:ext uri="{C572A759-6A51-4108-AA02-DFA0A04FC94B}">
-              <ma14:wrappingTextBoxFlag xmlns="" xmlns:m="http://schemas.openxmlformats.org/officeDocument/2006/math" xmlns:a14="http://schemas.microsoft.com/office/drawing/2010/main" xmlns:ma14="http://schemas.microsoft.com/office/mac/drawingml/2011/main" val="1"/>
+              <ma14:wrappingTextBoxFlag xmlns:ma14="http://schemas.microsoft.com/office/mac/drawingml/2011/main" xmlns:a14="http://schemas.microsoft.com/office/drawing/2010/main" xmlns:m="http://schemas.openxmlformats.org/officeDocument/2006/math" xmlns="" val="1"/>
             </a:ext>
           </a:extLst>
         </p:spPr>
@@ -26435,7 +26527,7 @@
           </a:ln>
           <a:extLst>
             <a:ext uri="{C572A759-6A51-4108-AA02-DFA0A04FC94B}">
-              <ma14:wrappingTextBoxFlag xmlns="" xmlns:m="http://schemas.openxmlformats.org/officeDocument/2006/math" xmlns:a14="http://schemas.microsoft.com/office/drawing/2010/main" xmlns:ma14="http://schemas.microsoft.com/office/mac/drawingml/2011/main" val="1"/>
+              <ma14:wrappingTextBoxFlag xmlns:ma14="http://schemas.microsoft.com/office/mac/drawingml/2011/main" xmlns:a14="http://schemas.microsoft.com/office/drawing/2010/main" xmlns:m="http://schemas.openxmlformats.org/officeDocument/2006/math" xmlns="" val="1"/>
             </a:ext>
           </a:extLst>
         </p:spPr>
@@ -26483,7 +26575,7 @@
           </a:ln>
           <a:extLst>
             <a:ext uri="{C572A759-6A51-4108-AA02-DFA0A04FC94B}">
-              <ma14:wrappingTextBoxFlag xmlns="" xmlns:m="http://schemas.openxmlformats.org/officeDocument/2006/math" xmlns:a14="http://schemas.microsoft.com/office/drawing/2010/main" xmlns:ma14="http://schemas.microsoft.com/office/mac/drawingml/2011/main" val="1"/>
+              <ma14:wrappingTextBoxFlag xmlns:ma14="http://schemas.microsoft.com/office/mac/drawingml/2011/main" xmlns:a14="http://schemas.microsoft.com/office/drawing/2010/main" xmlns:m="http://schemas.openxmlformats.org/officeDocument/2006/math" xmlns="" val="1"/>
             </a:ext>
           </a:extLst>
         </p:spPr>
@@ -26580,7 +26672,7 @@
           </a:ln>
           <a:extLst>
             <a:ext uri="{C572A759-6A51-4108-AA02-DFA0A04FC94B}">
-              <ma14:wrappingTextBoxFlag xmlns="" xmlns:m="http://schemas.openxmlformats.org/officeDocument/2006/math" xmlns:a14="http://schemas.microsoft.com/office/drawing/2010/main" xmlns:ma14="http://schemas.microsoft.com/office/mac/drawingml/2011/main" val="1"/>
+              <ma14:wrappingTextBoxFlag xmlns:ma14="http://schemas.microsoft.com/office/mac/drawingml/2011/main" xmlns:a14="http://schemas.microsoft.com/office/drawing/2010/main" xmlns:m="http://schemas.openxmlformats.org/officeDocument/2006/math" xmlns="" val="1"/>
             </a:ext>
           </a:extLst>
         </p:spPr>
@@ -27987,7 +28079,7 @@
           </a:ln>
           <a:extLst>
             <a:ext uri="{C572A759-6A51-4108-AA02-DFA0A04FC94B}">
-              <ma14:wrappingTextBoxFlag xmlns="" xmlns:m="http://schemas.openxmlformats.org/officeDocument/2006/math" xmlns:a14="http://schemas.microsoft.com/office/drawing/2010/main" xmlns:ma14="http://schemas.microsoft.com/office/mac/drawingml/2011/main" val="1"/>
+              <ma14:wrappingTextBoxFlag xmlns:ma14="http://schemas.microsoft.com/office/mac/drawingml/2011/main" xmlns:a14="http://schemas.microsoft.com/office/drawing/2010/main" xmlns:m="http://schemas.openxmlformats.org/officeDocument/2006/math" xmlns="" val="1"/>
             </a:ext>
           </a:extLst>
         </p:spPr>
@@ -28066,7 +28158,7 @@
           </a:ln>
           <a:extLst>
             <a:ext uri="{C572A759-6A51-4108-AA02-DFA0A04FC94B}">
-              <ma14:wrappingTextBoxFlag xmlns="" xmlns:m="http://schemas.openxmlformats.org/officeDocument/2006/math" xmlns:a14="http://schemas.microsoft.com/office/drawing/2010/main" xmlns:ma14="http://schemas.microsoft.com/office/mac/drawingml/2011/main" val="1"/>
+              <ma14:wrappingTextBoxFlag xmlns:ma14="http://schemas.microsoft.com/office/mac/drawingml/2011/main" xmlns:a14="http://schemas.microsoft.com/office/drawing/2010/main" xmlns:m="http://schemas.openxmlformats.org/officeDocument/2006/math" xmlns="" val="1"/>
             </a:ext>
           </a:extLst>
         </p:spPr>
@@ -28136,7 +28228,7 @@
           </a:ln>
           <a:extLst>
             <a:ext uri="{C572A759-6A51-4108-AA02-DFA0A04FC94B}">
-              <ma14:wrappingTextBoxFlag xmlns="" xmlns:m="http://schemas.openxmlformats.org/officeDocument/2006/math" xmlns:a14="http://schemas.microsoft.com/office/drawing/2010/main" xmlns:ma14="http://schemas.microsoft.com/office/mac/drawingml/2011/main" val="1"/>
+              <ma14:wrappingTextBoxFlag xmlns:ma14="http://schemas.microsoft.com/office/mac/drawingml/2011/main" xmlns:a14="http://schemas.microsoft.com/office/drawing/2010/main" xmlns:m="http://schemas.openxmlformats.org/officeDocument/2006/math" xmlns="" val="1"/>
             </a:ext>
           </a:extLst>
         </p:spPr>
@@ -28285,7 +28377,7 @@
           </a:ln>
           <a:extLst>
             <a:ext uri="{C572A759-6A51-4108-AA02-DFA0A04FC94B}">
-              <ma14:wrappingTextBoxFlag xmlns="" xmlns:m="http://schemas.openxmlformats.org/officeDocument/2006/math" xmlns:a14="http://schemas.microsoft.com/office/drawing/2010/main" xmlns:ma14="http://schemas.microsoft.com/office/mac/drawingml/2011/main" val="1"/>
+              <ma14:wrappingTextBoxFlag xmlns:ma14="http://schemas.microsoft.com/office/mac/drawingml/2011/main" xmlns:a14="http://schemas.microsoft.com/office/drawing/2010/main" xmlns:m="http://schemas.openxmlformats.org/officeDocument/2006/math" xmlns="" val="1"/>
             </a:ext>
           </a:extLst>
         </p:spPr>
@@ -28652,7 +28744,7 @@
             <a:effectLst/>
             <a:extLst>
               <a:ext uri="{C572A759-6A51-4108-AA02-DFA0A04FC94B}">
-                <ma14:wrappingTextBoxFlag xmlns="" xmlns:m="http://schemas.openxmlformats.org/officeDocument/2006/math" xmlns:a14="http://schemas.microsoft.com/office/drawing/2010/main" xmlns:ma14="http://schemas.microsoft.com/office/mac/drawingml/2011/main" val="1"/>
+                <ma14:wrappingTextBoxFlag xmlns:ma14="http://schemas.microsoft.com/office/mac/drawingml/2011/main" xmlns:a14="http://schemas.microsoft.com/office/drawing/2010/main" xmlns:m="http://schemas.openxmlformats.org/officeDocument/2006/math" xmlns="" val="1"/>
               </a:ext>
             </a:extLst>
           </p:spPr>
@@ -28708,7 +28800,7 @@
           </a:ln>
           <a:extLst>
             <a:ext uri="{C572A759-6A51-4108-AA02-DFA0A04FC94B}">
-              <ma14:wrappingTextBoxFlag xmlns="" xmlns:m="http://schemas.openxmlformats.org/officeDocument/2006/math" xmlns:a14="http://schemas.microsoft.com/office/drawing/2010/main" xmlns:ma14="http://schemas.microsoft.com/office/mac/drawingml/2011/main" val="1"/>
+              <ma14:wrappingTextBoxFlag xmlns:ma14="http://schemas.microsoft.com/office/mac/drawingml/2011/main" xmlns:a14="http://schemas.microsoft.com/office/drawing/2010/main" xmlns:m="http://schemas.openxmlformats.org/officeDocument/2006/math" xmlns="" val="1"/>
             </a:ext>
           </a:extLst>
         </p:spPr>
@@ -28844,7 +28936,7 @@
           </a:ln>
           <a:extLst>
             <a:ext uri="{C572A759-6A51-4108-AA02-DFA0A04FC94B}">
-              <ma14:wrappingTextBoxFlag xmlns="" xmlns:m="http://schemas.openxmlformats.org/officeDocument/2006/math" xmlns:a14="http://schemas.microsoft.com/office/drawing/2010/main" xmlns:ma14="http://schemas.microsoft.com/office/mac/drawingml/2011/main" val="1"/>
+              <ma14:wrappingTextBoxFlag xmlns:ma14="http://schemas.microsoft.com/office/mac/drawingml/2011/main" xmlns:a14="http://schemas.microsoft.com/office/drawing/2010/main" xmlns:m="http://schemas.openxmlformats.org/officeDocument/2006/math" xmlns="" val="1"/>
             </a:ext>
           </a:extLst>
         </p:spPr>
@@ -28923,7 +29015,7 @@
           </a:ln>
           <a:extLst>
             <a:ext uri="{C572A759-6A51-4108-AA02-DFA0A04FC94B}">
-              <ma14:wrappingTextBoxFlag xmlns="" xmlns:m="http://schemas.openxmlformats.org/officeDocument/2006/math" xmlns:a14="http://schemas.microsoft.com/office/drawing/2010/main" xmlns:ma14="http://schemas.microsoft.com/office/mac/drawingml/2011/main" val="1"/>
+              <ma14:wrappingTextBoxFlag xmlns:ma14="http://schemas.microsoft.com/office/mac/drawingml/2011/main" xmlns:a14="http://schemas.microsoft.com/office/drawing/2010/main" xmlns:m="http://schemas.openxmlformats.org/officeDocument/2006/math" xmlns="" val="1"/>
             </a:ext>
           </a:extLst>
         </p:spPr>
@@ -28968,7 +29060,7 @@
           </a:ln>
           <a:extLst>
             <a:ext uri="{C572A759-6A51-4108-AA02-DFA0A04FC94B}">
-              <ma14:wrappingTextBoxFlag xmlns="" xmlns:m="http://schemas.openxmlformats.org/officeDocument/2006/math" xmlns:a14="http://schemas.microsoft.com/office/drawing/2010/main" xmlns:ma14="http://schemas.microsoft.com/office/mac/drawingml/2011/main" val="1"/>
+              <ma14:wrappingTextBoxFlag xmlns:ma14="http://schemas.microsoft.com/office/mac/drawingml/2011/main" xmlns:a14="http://schemas.microsoft.com/office/drawing/2010/main" xmlns:m="http://schemas.openxmlformats.org/officeDocument/2006/math" xmlns="" val="1"/>
             </a:ext>
           </a:extLst>
         </p:spPr>
@@ -29013,7 +29105,7 @@
           </a:ln>
           <a:extLst>
             <a:ext uri="{C572A759-6A51-4108-AA02-DFA0A04FC94B}">
-              <ma14:wrappingTextBoxFlag xmlns="" xmlns:m="http://schemas.openxmlformats.org/officeDocument/2006/math" xmlns:a14="http://schemas.microsoft.com/office/drawing/2010/main" xmlns:ma14="http://schemas.microsoft.com/office/mac/drawingml/2011/main" val="1"/>
+              <ma14:wrappingTextBoxFlag xmlns:ma14="http://schemas.microsoft.com/office/mac/drawingml/2011/main" xmlns:a14="http://schemas.microsoft.com/office/drawing/2010/main" xmlns:m="http://schemas.openxmlformats.org/officeDocument/2006/math" xmlns="" val="1"/>
             </a:ext>
           </a:extLst>
         </p:spPr>
@@ -29182,7 +29274,7 @@
           </a:ln>
           <a:extLst>
             <a:ext uri="{C572A759-6A51-4108-AA02-DFA0A04FC94B}">
-              <ma14:wrappingTextBoxFlag xmlns="" xmlns:m="http://schemas.openxmlformats.org/officeDocument/2006/math" xmlns:a14="http://schemas.microsoft.com/office/drawing/2010/main" xmlns:ma14="http://schemas.microsoft.com/office/mac/drawingml/2011/main" val="1"/>
+              <ma14:wrappingTextBoxFlag xmlns:ma14="http://schemas.microsoft.com/office/mac/drawingml/2011/main" xmlns:a14="http://schemas.microsoft.com/office/drawing/2010/main" xmlns:m="http://schemas.openxmlformats.org/officeDocument/2006/math" xmlns="" val="1"/>
             </a:ext>
           </a:extLst>
         </p:spPr>
@@ -29676,7 +29768,7 @@
           </a:ln>
           <a:extLst>
             <a:ext uri="{C572A759-6A51-4108-AA02-DFA0A04FC94B}">
-              <ma14:wrappingTextBoxFlag xmlns="" xmlns:m="http://schemas.openxmlformats.org/officeDocument/2006/math" xmlns:a14="http://schemas.microsoft.com/office/drawing/2010/main" xmlns:ma14="http://schemas.microsoft.com/office/mac/drawingml/2011/main" val="1"/>
+              <ma14:wrappingTextBoxFlag xmlns:ma14="http://schemas.microsoft.com/office/mac/drawingml/2011/main" xmlns:a14="http://schemas.microsoft.com/office/drawing/2010/main" xmlns:m="http://schemas.openxmlformats.org/officeDocument/2006/math" xmlns="" val="1"/>
             </a:ext>
           </a:extLst>
         </p:spPr>
@@ -30016,7 +30108,7 @@
           </a:ln>
           <a:extLst>
             <a:ext uri="{C572A759-6A51-4108-AA02-DFA0A04FC94B}">
-              <ma14:wrappingTextBoxFlag xmlns="" xmlns:m="http://schemas.openxmlformats.org/officeDocument/2006/math" xmlns:a14="http://schemas.microsoft.com/office/drawing/2010/main" xmlns:ma14="http://schemas.microsoft.com/office/mac/drawingml/2011/main" val="1"/>
+              <ma14:wrappingTextBoxFlag xmlns:ma14="http://schemas.microsoft.com/office/mac/drawingml/2011/main" xmlns:a14="http://schemas.microsoft.com/office/drawing/2010/main" xmlns:m="http://schemas.openxmlformats.org/officeDocument/2006/math" xmlns="" val="1"/>
             </a:ext>
           </a:extLst>
         </p:spPr>
@@ -30091,7 +30183,7 @@
           </a:ln>
           <a:extLst>
             <a:ext uri="{C572A759-6A51-4108-AA02-DFA0A04FC94B}">
-              <ma14:wrappingTextBoxFlag xmlns="" xmlns:m="http://schemas.openxmlformats.org/officeDocument/2006/math" xmlns:a14="http://schemas.microsoft.com/office/drawing/2010/main" xmlns:ma14="http://schemas.microsoft.com/office/mac/drawingml/2011/main" val="1"/>
+              <ma14:wrappingTextBoxFlag xmlns:ma14="http://schemas.microsoft.com/office/mac/drawingml/2011/main" xmlns:a14="http://schemas.microsoft.com/office/drawing/2010/main" xmlns:m="http://schemas.openxmlformats.org/officeDocument/2006/math" xmlns="" val="1"/>
             </a:ext>
           </a:extLst>
         </p:spPr>
@@ -31953,7 +32045,7 @@
             <a:effectLst/>
             <a:extLst>
               <a:ext uri="{C572A759-6A51-4108-AA02-DFA0A04FC94B}">
-                <ma14:wrappingTextBoxFlag xmlns="" xmlns:m="http://schemas.openxmlformats.org/officeDocument/2006/math" xmlns:a14="http://schemas.microsoft.com/office/drawing/2010/main" xmlns:ma14="http://schemas.microsoft.com/office/mac/drawingml/2011/main" val="1"/>
+                <ma14:wrappingTextBoxFlag xmlns:ma14="http://schemas.microsoft.com/office/mac/drawingml/2011/main" xmlns:a14="http://schemas.microsoft.com/office/drawing/2010/main" xmlns:m="http://schemas.openxmlformats.org/officeDocument/2006/math" xmlns="" val="1"/>
               </a:ext>
             </a:extLst>
           </p:spPr>
@@ -32005,7 +32097,7 @@
             <a:effectLst/>
             <a:extLst>
               <a:ext uri="{C572A759-6A51-4108-AA02-DFA0A04FC94B}">
-                <ma14:wrappingTextBoxFlag xmlns="" xmlns:m="http://schemas.openxmlformats.org/officeDocument/2006/math" xmlns:a14="http://schemas.microsoft.com/office/drawing/2010/main" xmlns:ma14="http://schemas.microsoft.com/office/mac/drawingml/2011/main" val="1"/>
+                <ma14:wrappingTextBoxFlag xmlns:ma14="http://schemas.microsoft.com/office/mac/drawingml/2011/main" xmlns:a14="http://schemas.microsoft.com/office/drawing/2010/main" xmlns:m="http://schemas.openxmlformats.org/officeDocument/2006/math" xmlns="" val="1"/>
               </a:ext>
             </a:extLst>
           </p:spPr>
@@ -32769,7 +32861,7 @@
             <a:effectLst/>
             <a:extLst>
               <a:ext uri="{C572A759-6A51-4108-AA02-DFA0A04FC94B}">
-                <ma14:wrappingTextBoxFlag xmlns="" xmlns:m="http://schemas.openxmlformats.org/officeDocument/2006/math" xmlns:a14="http://schemas.microsoft.com/office/drawing/2010/main" xmlns:ma14="http://schemas.microsoft.com/office/mac/drawingml/2011/main" val="1"/>
+                <ma14:wrappingTextBoxFlag xmlns:ma14="http://schemas.microsoft.com/office/mac/drawingml/2011/main" xmlns:a14="http://schemas.microsoft.com/office/drawing/2010/main" xmlns:m="http://schemas.openxmlformats.org/officeDocument/2006/math" xmlns="" val="1"/>
               </a:ext>
             </a:extLst>
           </p:spPr>
@@ -32825,7 +32917,7 @@
             <a:effectLst/>
             <a:extLst>
               <a:ext uri="{C572A759-6A51-4108-AA02-DFA0A04FC94B}">
-                <ma14:wrappingTextBoxFlag xmlns="" xmlns:m="http://schemas.openxmlformats.org/officeDocument/2006/math" xmlns:a14="http://schemas.microsoft.com/office/drawing/2010/main" xmlns:ma14="http://schemas.microsoft.com/office/mac/drawingml/2011/main" val="1"/>
+                <ma14:wrappingTextBoxFlag xmlns:ma14="http://schemas.microsoft.com/office/mac/drawingml/2011/main" xmlns:a14="http://schemas.microsoft.com/office/drawing/2010/main" xmlns:m="http://schemas.openxmlformats.org/officeDocument/2006/math" xmlns="" val="1"/>
               </a:ext>
             </a:extLst>
           </p:spPr>
@@ -36784,7 +36876,7 @@
             <a:effectLst/>
             <a:extLst>
               <a:ext uri="{C572A759-6A51-4108-AA02-DFA0A04FC94B}">
-                <ma14:wrappingTextBoxFlag xmlns="" xmlns:m="http://schemas.openxmlformats.org/officeDocument/2006/math" xmlns:a14="http://schemas.microsoft.com/office/drawing/2010/main" xmlns:ma14="http://schemas.microsoft.com/office/mac/drawingml/2011/main" val="1"/>
+                <ma14:wrappingTextBoxFlag xmlns:ma14="http://schemas.microsoft.com/office/mac/drawingml/2011/main" xmlns:a14="http://schemas.microsoft.com/office/drawing/2010/main" xmlns:m="http://schemas.openxmlformats.org/officeDocument/2006/math" xmlns="" val="1"/>
               </a:ext>
             </a:extLst>
           </p:spPr>
@@ -36836,7 +36928,7 @@
             <a:effectLst/>
             <a:extLst>
               <a:ext uri="{C572A759-6A51-4108-AA02-DFA0A04FC94B}">
-                <ma14:wrappingTextBoxFlag xmlns="" xmlns:m="http://schemas.openxmlformats.org/officeDocument/2006/math" xmlns:a14="http://schemas.microsoft.com/office/drawing/2010/main" xmlns:ma14="http://schemas.microsoft.com/office/mac/drawingml/2011/main" val="1"/>
+                <ma14:wrappingTextBoxFlag xmlns:ma14="http://schemas.microsoft.com/office/mac/drawingml/2011/main" xmlns:a14="http://schemas.microsoft.com/office/drawing/2010/main" xmlns:m="http://schemas.openxmlformats.org/officeDocument/2006/math" xmlns="" val="1"/>
               </a:ext>
             </a:extLst>
           </p:spPr>
@@ -37460,7 +37552,7 @@
             <a:effectLst/>
             <a:extLst>
               <a:ext uri="{C572A759-6A51-4108-AA02-DFA0A04FC94B}">
-                <ma14:wrappingTextBoxFlag xmlns="" xmlns:m="http://schemas.openxmlformats.org/officeDocument/2006/math" xmlns:a14="http://schemas.microsoft.com/office/drawing/2010/main" xmlns:ma14="http://schemas.microsoft.com/office/mac/drawingml/2011/main" val="1"/>
+                <ma14:wrappingTextBoxFlag xmlns:ma14="http://schemas.microsoft.com/office/mac/drawingml/2011/main" xmlns:a14="http://schemas.microsoft.com/office/drawing/2010/main" xmlns:m="http://schemas.openxmlformats.org/officeDocument/2006/math" xmlns="" val="1"/>
               </a:ext>
             </a:extLst>
           </p:spPr>
@@ -38089,7 +38181,7 @@
           </a:ln>
           <a:extLst>
             <a:ext uri="{C572A759-6A51-4108-AA02-DFA0A04FC94B}">
-              <ma14:wrappingTextBoxFlag xmlns="" xmlns:m="http://schemas.openxmlformats.org/officeDocument/2006/math" xmlns:a14="http://schemas.microsoft.com/office/drawing/2010/main" xmlns:ma14="http://schemas.microsoft.com/office/mac/drawingml/2011/main" val="1"/>
+              <ma14:wrappingTextBoxFlag xmlns:ma14="http://schemas.microsoft.com/office/mac/drawingml/2011/main" xmlns:a14="http://schemas.microsoft.com/office/drawing/2010/main" xmlns:m="http://schemas.openxmlformats.org/officeDocument/2006/math" xmlns="" val="1"/>
             </a:ext>
           </a:extLst>
         </p:spPr>
@@ -38168,7 +38260,7 @@
           </a:ln>
           <a:extLst>
             <a:ext uri="{C572A759-6A51-4108-AA02-DFA0A04FC94B}">
-              <ma14:wrappingTextBoxFlag xmlns="" xmlns:m="http://schemas.openxmlformats.org/officeDocument/2006/math" xmlns:a14="http://schemas.microsoft.com/office/drawing/2010/main" xmlns:ma14="http://schemas.microsoft.com/office/mac/drawingml/2011/main" val="1"/>
+              <ma14:wrappingTextBoxFlag xmlns:ma14="http://schemas.microsoft.com/office/mac/drawingml/2011/main" xmlns:a14="http://schemas.microsoft.com/office/drawing/2010/main" xmlns:m="http://schemas.openxmlformats.org/officeDocument/2006/math" xmlns="" val="1"/>
             </a:ext>
           </a:extLst>
         </p:spPr>
@@ -39356,7 +39448,7 @@
             <a:effectLst/>
             <a:extLst>
               <a:ext uri="{C572A759-6A51-4108-AA02-DFA0A04FC94B}">
-                <ma14:wrappingTextBoxFlag xmlns="" xmlns:m="http://schemas.openxmlformats.org/officeDocument/2006/math" xmlns:a14="http://schemas.microsoft.com/office/drawing/2010/main" xmlns:ma14="http://schemas.microsoft.com/office/mac/drawingml/2011/main" val="1"/>
+                <ma14:wrappingTextBoxFlag xmlns:ma14="http://schemas.microsoft.com/office/mac/drawingml/2011/main" xmlns:a14="http://schemas.microsoft.com/office/drawing/2010/main" xmlns:m="http://schemas.openxmlformats.org/officeDocument/2006/math" xmlns="" val="1"/>
               </a:ext>
             </a:extLst>
           </p:spPr>
@@ -39408,7 +39500,7 @@
             <a:effectLst/>
             <a:extLst>
               <a:ext uri="{C572A759-6A51-4108-AA02-DFA0A04FC94B}">
-                <ma14:wrappingTextBoxFlag xmlns="" xmlns:m="http://schemas.openxmlformats.org/officeDocument/2006/math" xmlns:a14="http://schemas.microsoft.com/office/drawing/2010/main" xmlns:ma14="http://schemas.microsoft.com/office/mac/drawingml/2011/main" val="1"/>
+                <ma14:wrappingTextBoxFlag xmlns:ma14="http://schemas.microsoft.com/office/mac/drawingml/2011/main" xmlns:a14="http://schemas.microsoft.com/office/drawing/2010/main" xmlns:m="http://schemas.openxmlformats.org/officeDocument/2006/math" xmlns="" val="1"/>
               </a:ext>
             </a:extLst>
           </p:spPr>
@@ -40172,7 +40264,7 @@
             <a:effectLst/>
             <a:extLst>
               <a:ext uri="{C572A759-6A51-4108-AA02-DFA0A04FC94B}">
-                <ma14:wrappingTextBoxFlag xmlns="" xmlns:m="http://schemas.openxmlformats.org/officeDocument/2006/math" xmlns:a14="http://schemas.microsoft.com/office/drawing/2010/main" xmlns:ma14="http://schemas.microsoft.com/office/mac/drawingml/2011/main" val="1"/>
+                <ma14:wrappingTextBoxFlag xmlns:ma14="http://schemas.microsoft.com/office/mac/drawingml/2011/main" xmlns:a14="http://schemas.microsoft.com/office/drawing/2010/main" xmlns:m="http://schemas.openxmlformats.org/officeDocument/2006/math" xmlns="" val="1"/>
               </a:ext>
             </a:extLst>
           </p:spPr>
@@ -40229,7 +40321,7 @@
             <a:effectLst/>
             <a:extLst>
               <a:ext uri="{C572A759-6A51-4108-AA02-DFA0A04FC94B}">
-                <ma14:wrappingTextBoxFlag xmlns="" xmlns:m="http://schemas.openxmlformats.org/officeDocument/2006/math" xmlns:a14="http://schemas.microsoft.com/office/drawing/2010/main" xmlns:ma14="http://schemas.microsoft.com/office/mac/drawingml/2011/main" val="1"/>
+                <ma14:wrappingTextBoxFlag xmlns:ma14="http://schemas.microsoft.com/office/mac/drawingml/2011/main" xmlns:a14="http://schemas.microsoft.com/office/drawing/2010/main" xmlns:m="http://schemas.openxmlformats.org/officeDocument/2006/math" xmlns="" val="1"/>
               </a:ext>
             </a:extLst>
           </p:spPr>
@@ -40775,7 +40867,7 @@
           </a:ln>
           <a:extLst>
             <a:ext uri="{C572A759-6A51-4108-AA02-DFA0A04FC94B}">
-              <ma14:wrappingTextBoxFlag xmlns="" xmlns:m="http://schemas.openxmlformats.org/officeDocument/2006/math" xmlns:a14="http://schemas.microsoft.com/office/drawing/2010/main" xmlns:ma14="http://schemas.microsoft.com/office/mac/drawingml/2011/main" val="1"/>
+              <ma14:wrappingTextBoxFlag xmlns:ma14="http://schemas.microsoft.com/office/mac/drawingml/2011/main" xmlns:a14="http://schemas.microsoft.com/office/drawing/2010/main" xmlns:m="http://schemas.openxmlformats.org/officeDocument/2006/math" xmlns="" val="1"/>
             </a:ext>
           </a:extLst>
         </p:spPr>
@@ -40872,7 +40964,7 @@
           </a:ln>
           <a:extLst>
             <a:ext uri="{C572A759-6A51-4108-AA02-DFA0A04FC94B}">
-              <ma14:wrappingTextBoxFlag xmlns="" xmlns:m="http://schemas.openxmlformats.org/officeDocument/2006/math" xmlns:a14="http://schemas.microsoft.com/office/drawing/2010/main" xmlns:ma14="http://schemas.microsoft.com/office/mac/drawingml/2011/main" val="1"/>
+              <ma14:wrappingTextBoxFlag xmlns:ma14="http://schemas.microsoft.com/office/mac/drawingml/2011/main" xmlns:a14="http://schemas.microsoft.com/office/drawing/2010/main" xmlns:m="http://schemas.openxmlformats.org/officeDocument/2006/math" xmlns="" val="1"/>
             </a:ext>
           </a:extLst>
         </p:spPr>
@@ -40915,7 +41007,7 @@
           </a:ln>
           <a:extLst>
             <a:ext uri="{C572A759-6A51-4108-AA02-DFA0A04FC94B}">
-              <ma14:wrappingTextBoxFlag xmlns="" xmlns:m="http://schemas.openxmlformats.org/officeDocument/2006/math" xmlns:a14="http://schemas.microsoft.com/office/drawing/2010/main" xmlns:ma14="http://schemas.microsoft.com/office/mac/drawingml/2011/main" val="1"/>
+              <ma14:wrappingTextBoxFlag xmlns:ma14="http://schemas.microsoft.com/office/mac/drawingml/2011/main" xmlns:a14="http://schemas.microsoft.com/office/drawing/2010/main" xmlns:m="http://schemas.openxmlformats.org/officeDocument/2006/math" xmlns="" val="1"/>
             </a:ext>
           </a:extLst>
         </p:spPr>
@@ -41032,7 +41124,7 @@
           </a:ln>
           <a:extLst>
             <a:ext uri="{C572A759-6A51-4108-AA02-DFA0A04FC94B}">
-              <ma14:wrappingTextBoxFlag xmlns="" xmlns:m="http://schemas.openxmlformats.org/officeDocument/2006/math" xmlns:a14="http://schemas.microsoft.com/office/drawing/2010/main" xmlns:ma14="http://schemas.microsoft.com/office/mac/drawingml/2011/main" val="1"/>
+              <ma14:wrappingTextBoxFlag xmlns:ma14="http://schemas.microsoft.com/office/mac/drawingml/2011/main" xmlns:a14="http://schemas.microsoft.com/office/drawing/2010/main" xmlns:m="http://schemas.openxmlformats.org/officeDocument/2006/math" xmlns="" val="1"/>
             </a:ext>
           </a:extLst>
         </p:spPr>
@@ -41108,7 +41200,7 @@
           </a:ln>
           <a:extLst>
             <a:ext uri="{C572A759-6A51-4108-AA02-DFA0A04FC94B}">
-              <ma14:wrappingTextBoxFlag xmlns="" xmlns:m="http://schemas.openxmlformats.org/officeDocument/2006/math" xmlns:a14="http://schemas.microsoft.com/office/drawing/2010/main" xmlns:ma14="http://schemas.microsoft.com/office/mac/drawingml/2011/main" val="1"/>
+              <ma14:wrappingTextBoxFlag xmlns:ma14="http://schemas.microsoft.com/office/mac/drawingml/2011/main" xmlns:a14="http://schemas.microsoft.com/office/drawing/2010/main" xmlns:m="http://schemas.openxmlformats.org/officeDocument/2006/math" xmlns="" val="1"/>
             </a:ext>
           </a:extLst>
         </p:spPr>
@@ -41153,7 +41245,7 @@
           </a:ln>
           <a:extLst>
             <a:ext uri="{C572A759-6A51-4108-AA02-DFA0A04FC94B}">
-              <ma14:wrappingTextBoxFlag xmlns="" xmlns:m="http://schemas.openxmlformats.org/officeDocument/2006/math" xmlns:a14="http://schemas.microsoft.com/office/drawing/2010/main" xmlns:ma14="http://schemas.microsoft.com/office/mac/drawingml/2011/main" val="1"/>
+              <ma14:wrappingTextBoxFlag xmlns:ma14="http://schemas.microsoft.com/office/mac/drawingml/2011/main" xmlns:a14="http://schemas.microsoft.com/office/drawing/2010/main" xmlns:m="http://schemas.openxmlformats.org/officeDocument/2006/math" xmlns="" val="1"/>
             </a:ext>
           </a:extLst>
         </p:spPr>
@@ -41638,7 +41730,7 @@
           </a:ln>
           <a:extLst>
             <a:ext uri="{C572A759-6A51-4108-AA02-DFA0A04FC94B}">
-              <ma14:wrappingTextBoxFlag xmlns="" xmlns:m="http://schemas.openxmlformats.org/officeDocument/2006/math" xmlns:a14="http://schemas.microsoft.com/office/drawing/2010/main" xmlns:ma14="http://schemas.microsoft.com/office/mac/drawingml/2011/main" val="1"/>
+              <ma14:wrappingTextBoxFlag xmlns:ma14="http://schemas.microsoft.com/office/mac/drawingml/2011/main" xmlns:a14="http://schemas.microsoft.com/office/drawing/2010/main" xmlns:m="http://schemas.openxmlformats.org/officeDocument/2006/math" xmlns="" val="1"/>
             </a:ext>
           </a:extLst>
         </p:spPr>
@@ -41786,7 +41878,7 @@
           </a:ln>
           <a:extLst>
             <a:ext uri="{C572A759-6A51-4108-AA02-DFA0A04FC94B}">
-              <ma14:wrappingTextBoxFlag xmlns="" xmlns:m="http://schemas.openxmlformats.org/officeDocument/2006/math" xmlns:a14="http://schemas.microsoft.com/office/drawing/2010/main" xmlns:ma14="http://schemas.microsoft.com/office/mac/drawingml/2011/main" val="1"/>
+              <ma14:wrappingTextBoxFlag xmlns:ma14="http://schemas.microsoft.com/office/mac/drawingml/2011/main" xmlns:a14="http://schemas.microsoft.com/office/drawing/2010/main" xmlns:m="http://schemas.openxmlformats.org/officeDocument/2006/math" xmlns="" val="1"/>
             </a:ext>
           </a:extLst>
         </p:spPr>

</xml_diff>

<commit_message>
Fixed typo on back side first section title and translate Math subtitle
</commit_message>
<xml_diff>
--- a/translations/portuguese/data-transformation_pt_br.pptx
+++ b/translations/portuguese/data-transformation_pt_br.pptx
@@ -2187,7 +2187,7 @@
           </a:ln>
           <a:extLst>
             <a:ext uri="{C572A759-6A51-4108-AA02-DFA0A04FC94B}">
-              <ma14:wrappingTextBoxFlag xmlns:ma14="http://schemas.microsoft.com/office/mac/drawingml/2011/main" xmlns:a14="http://schemas.microsoft.com/office/drawing/2010/main" xmlns:m="http://schemas.openxmlformats.org/officeDocument/2006/math" xmlns="" val="1"/>
+              <ma14:wrappingTextBoxFlag xmlns="" xmlns:m="http://schemas.openxmlformats.org/officeDocument/2006/math" xmlns:a14="http://schemas.microsoft.com/office/drawing/2010/main" xmlns:ma14="http://schemas.microsoft.com/office/mac/drawingml/2011/main" val="1"/>
             </a:ext>
           </a:extLst>
         </p:spPr>
@@ -2226,7 +2226,7 @@
           </a:ln>
           <a:extLst>
             <a:ext uri="{C572A759-6A51-4108-AA02-DFA0A04FC94B}">
-              <ma14:wrappingTextBoxFlag xmlns:ma14="http://schemas.microsoft.com/office/mac/drawingml/2011/main" xmlns:a14="http://schemas.microsoft.com/office/drawing/2010/main" xmlns:m="http://schemas.openxmlformats.org/officeDocument/2006/math" xmlns="" val="1"/>
+              <ma14:wrappingTextBoxFlag xmlns="" xmlns:m="http://schemas.openxmlformats.org/officeDocument/2006/math" xmlns:a14="http://schemas.microsoft.com/office/drawing/2010/main" xmlns:ma14="http://schemas.microsoft.com/office/mac/drawingml/2011/main" val="1"/>
             </a:ext>
           </a:extLst>
         </p:spPr>
@@ -4713,7 +4713,7 @@
           </a:ln>
           <a:extLst>
             <a:ext uri="{C572A759-6A51-4108-AA02-DFA0A04FC94B}">
-              <ma14:wrappingTextBoxFlag xmlns:ma14="http://schemas.microsoft.com/office/mac/drawingml/2011/main" xmlns:a14="http://schemas.microsoft.com/office/drawing/2010/main" xmlns:m="http://schemas.openxmlformats.org/officeDocument/2006/math" xmlns="" val="1"/>
+              <ma14:wrappingTextBoxFlag xmlns="" xmlns:m="http://schemas.openxmlformats.org/officeDocument/2006/math" xmlns:a14="http://schemas.microsoft.com/office/drawing/2010/main" xmlns:ma14="http://schemas.microsoft.com/office/mac/drawingml/2011/main" val="1"/>
             </a:ext>
           </a:extLst>
         </p:spPr>
@@ -4763,7 +4763,7 @@
           </a:ln>
           <a:extLst>
             <a:ext uri="{C572A759-6A51-4108-AA02-DFA0A04FC94B}">
-              <ma14:wrappingTextBoxFlag xmlns:ma14="http://schemas.microsoft.com/office/mac/drawingml/2011/main" xmlns:a14="http://schemas.microsoft.com/office/drawing/2010/main" xmlns:m="http://schemas.openxmlformats.org/officeDocument/2006/math" xmlns="" val="1"/>
+              <ma14:wrappingTextBoxFlag xmlns="" xmlns:m="http://schemas.openxmlformats.org/officeDocument/2006/math" xmlns:a14="http://schemas.microsoft.com/office/drawing/2010/main" xmlns:ma14="http://schemas.microsoft.com/office/mac/drawingml/2011/main" val="1"/>
             </a:ext>
           </a:extLst>
         </p:spPr>
@@ -4936,7 +4936,7 @@
           </a:ln>
           <a:extLst>
             <a:ext uri="{C572A759-6A51-4108-AA02-DFA0A04FC94B}">
-              <ma14:wrappingTextBoxFlag xmlns:ma14="http://schemas.microsoft.com/office/mac/drawingml/2011/main" xmlns:a14="http://schemas.microsoft.com/office/drawing/2010/main" xmlns:m="http://schemas.openxmlformats.org/officeDocument/2006/math" xmlns="" val="1"/>
+              <ma14:wrappingTextBoxFlag xmlns="" xmlns:m="http://schemas.openxmlformats.org/officeDocument/2006/math" xmlns:a14="http://schemas.microsoft.com/office/drawing/2010/main" xmlns:ma14="http://schemas.microsoft.com/office/mac/drawingml/2011/main" val="1"/>
             </a:ext>
           </a:extLst>
         </p:spPr>
@@ -5047,7 +5047,7 @@
           </a:ln>
           <a:extLst>
             <a:ext uri="{C572A759-6A51-4108-AA02-DFA0A04FC94B}">
-              <ma14:wrappingTextBoxFlag xmlns:ma14="http://schemas.microsoft.com/office/mac/drawingml/2011/main" xmlns:a14="http://schemas.microsoft.com/office/drawing/2010/main" xmlns:m="http://schemas.openxmlformats.org/officeDocument/2006/math" xmlns="" val="1"/>
+              <ma14:wrappingTextBoxFlag xmlns="" xmlns:m="http://schemas.openxmlformats.org/officeDocument/2006/math" xmlns:a14="http://schemas.microsoft.com/office/drawing/2010/main" xmlns:ma14="http://schemas.microsoft.com/office/mac/drawingml/2011/main" val="1"/>
             </a:ext>
           </a:extLst>
         </p:spPr>
@@ -5157,7 +5157,7 @@
           </a:ln>
           <a:extLst>
             <a:ext uri="{C572A759-6A51-4108-AA02-DFA0A04FC94B}">
-              <ma14:wrappingTextBoxFlag xmlns:ma14="http://schemas.microsoft.com/office/mac/drawingml/2011/main" xmlns:a14="http://schemas.microsoft.com/office/drawing/2010/main" xmlns:m="http://schemas.openxmlformats.org/officeDocument/2006/math" xmlns="" val="1"/>
+              <ma14:wrappingTextBoxFlag xmlns="" xmlns:m="http://schemas.openxmlformats.org/officeDocument/2006/math" xmlns:a14="http://schemas.microsoft.com/office/drawing/2010/main" xmlns:ma14="http://schemas.microsoft.com/office/mac/drawingml/2011/main" val="1"/>
             </a:ext>
           </a:extLst>
         </p:spPr>
@@ -5483,7 +5483,7 @@
           </a:ln>
           <a:extLst>
             <a:ext uri="{C572A759-6A51-4108-AA02-DFA0A04FC94B}">
-              <ma14:wrappingTextBoxFlag xmlns:ma14="http://schemas.microsoft.com/office/mac/drawingml/2011/main" xmlns:a14="http://schemas.microsoft.com/office/drawing/2010/main" xmlns:m="http://schemas.openxmlformats.org/officeDocument/2006/math" xmlns="" val="1"/>
+              <ma14:wrappingTextBoxFlag xmlns="" xmlns:m="http://schemas.openxmlformats.org/officeDocument/2006/math" xmlns:a14="http://schemas.microsoft.com/office/drawing/2010/main" xmlns:ma14="http://schemas.microsoft.com/office/mac/drawingml/2011/main" val="1"/>
             </a:ext>
           </a:extLst>
         </p:spPr>
@@ -5616,7 +5616,7 @@
           </a:ln>
           <a:extLst>
             <a:ext uri="{C572A759-6A51-4108-AA02-DFA0A04FC94B}">
-              <ma14:wrappingTextBoxFlag xmlns:ma14="http://schemas.microsoft.com/office/mac/drawingml/2011/main" xmlns:a14="http://schemas.microsoft.com/office/drawing/2010/main" xmlns:m="http://schemas.openxmlformats.org/officeDocument/2006/math" xmlns="" val="1"/>
+              <ma14:wrappingTextBoxFlag xmlns="" xmlns:m="http://schemas.openxmlformats.org/officeDocument/2006/math" xmlns:a14="http://schemas.microsoft.com/office/drawing/2010/main" xmlns:ma14="http://schemas.microsoft.com/office/mac/drawingml/2011/main" val="1"/>
             </a:ext>
           </a:extLst>
         </p:spPr>
@@ -5671,7 +5671,7 @@
           </a:ln>
           <a:extLst>
             <a:ext uri="{C572A759-6A51-4108-AA02-DFA0A04FC94B}">
-              <ma14:wrappingTextBoxFlag xmlns:ma14="http://schemas.microsoft.com/office/mac/drawingml/2011/main" xmlns:a14="http://schemas.microsoft.com/office/drawing/2010/main" xmlns:m="http://schemas.openxmlformats.org/officeDocument/2006/math" xmlns="" val="1"/>
+              <ma14:wrappingTextBoxFlag xmlns="" xmlns:m="http://schemas.openxmlformats.org/officeDocument/2006/math" xmlns:a14="http://schemas.microsoft.com/office/drawing/2010/main" xmlns:ma14="http://schemas.microsoft.com/office/mac/drawingml/2011/main" val="1"/>
             </a:ext>
           </a:extLst>
         </p:spPr>
@@ -5726,7 +5726,7 @@
           </a:ln>
           <a:extLst>
             <a:ext uri="{C572A759-6A51-4108-AA02-DFA0A04FC94B}">
-              <ma14:wrappingTextBoxFlag xmlns:ma14="http://schemas.microsoft.com/office/mac/drawingml/2011/main" xmlns:a14="http://schemas.microsoft.com/office/drawing/2010/main" xmlns:m="http://schemas.openxmlformats.org/officeDocument/2006/math" xmlns="" val="1"/>
+              <ma14:wrappingTextBoxFlag xmlns="" xmlns:m="http://schemas.openxmlformats.org/officeDocument/2006/math" xmlns:a14="http://schemas.microsoft.com/office/drawing/2010/main" xmlns:ma14="http://schemas.microsoft.com/office/mac/drawingml/2011/main" val="1"/>
             </a:ext>
           </a:extLst>
         </p:spPr>
@@ -5774,7 +5774,7 @@
           </a:ln>
           <a:extLst>
             <a:ext uri="{C572A759-6A51-4108-AA02-DFA0A04FC94B}">
-              <ma14:wrappingTextBoxFlag xmlns:ma14="http://schemas.microsoft.com/office/mac/drawingml/2011/main" xmlns:a14="http://schemas.microsoft.com/office/drawing/2010/main" xmlns:m="http://schemas.openxmlformats.org/officeDocument/2006/math" xmlns="" val="1"/>
+              <ma14:wrappingTextBoxFlag xmlns="" xmlns:m="http://schemas.openxmlformats.org/officeDocument/2006/math" xmlns:a14="http://schemas.microsoft.com/office/drawing/2010/main" xmlns:ma14="http://schemas.microsoft.com/office/mac/drawingml/2011/main" val="1"/>
             </a:ext>
           </a:extLst>
         </p:spPr>
@@ -5896,7 +5896,7 @@
           </a:ln>
           <a:extLst>
             <a:ext uri="{C572A759-6A51-4108-AA02-DFA0A04FC94B}">
-              <ma14:wrappingTextBoxFlag xmlns:ma14="http://schemas.microsoft.com/office/mac/drawingml/2011/main" xmlns:a14="http://schemas.microsoft.com/office/drawing/2010/main" xmlns:m="http://schemas.openxmlformats.org/officeDocument/2006/math" xmlns="" val="1"/>
+              <ma14:wrappingTextBoxFlag xmlns="" xmlns:m="http://schemas.openxmlformats.org/officeDocument/2006/math" xmlns:a14="http://schemas.microsoft.com/office/drawing/2010/main" xmlns:ma14="http://schemas.microsoft.com/office/mac/drawingml/2011/main" val="1"/>
             </a:ext>
           </a:extLst>
         </p:spPr>
@@ -5951,7 +5951,7 @@
           </a:ln>
           <a:extLst>
             <a:ext uri="{C572A759-6A51-4108-AA02-DFA0A04FC94B}">
-              <ma14:wrappingTextBoxFlag xmlns:ma14="http://schemas.microsoft.com/office/mac/drawingml/2011/main" xmlns:a14="http://schemas.microsoft.com/office/drawing/2010/main" xmlns:m="http://schemas.openxmlformats.org/officeDocument/2006/math" xmlns="" val="1"/>
+              <ma14:wrappingTextBoxFlag xmlns="" xmlns:m="http://schemas.openxmlformats.org/officeDocument/2006/math" xmlns:a14="http://schemas.microsoft.com/office/drawing/2010/main" xmlns:ma14="http://schemas.microsoft.com/office/mac/drawingml/2011/main" val="1"/>
             </a:ext>
           </a:extLst>
         </p:spPr>
@@ -6088,7 +6088,7 @@
           </a:ln>
           <a:extLst>
             <a:ext uri="{C572A759-6A51-4108-AA02-DFA0A04FC94B}">
-              <ma14:wrappingTextBoxFlag xmlns:ma14="http://schemas.microsoft.com/office/mac/drawingml/2011/main" xmlns:a14="http://schemas.microsoft.com/office/drawing/2010/main" xmlns:m="http://schemas.openxmlformats.org/officeDocument/2006/math" xmlns="" val="1"/>
+              <ma14:wrappingTextBoxFlag xmlns="" xmlns:m="http://schemas.openxmlformats.org/officeDocument/2006/math" xmlns:a14="http://schemas.microsoft.com/office/drawing/2010/main" xmlns:ma14="http://schemas.microsoft.com/office/mac/drawingml/2011/main" val="1"/>
             </a:ext>
           </a:extLst>
         </p:spPr>
@@ -6943,7 +6943,7 @@
           </a:ln>
           <a:extLst>
             <a:ext uri="{C572A759-6A51-4108-AA02-DFA0A04FC94B}">
-              <ma14:wrappingTextBoxFlag xmlns:ma14="http://schemas.microsoft.com/office/mac/drawingml/2011/main" xmlns:a14="http://schemas.microsoft.com/office/drawing/2010/main" xmlns:m="http://schemas.openxmlformats.org/officeDocument/2006/math" xmlns="" val="1"/>
+              <ma14:wrappingTextBoxFlag xmlns="" xmlns:m="http://schemas.openxmlformats.org/officeDocument/2006/math" xmlns:a14="http://schemas.microsoft.com/office/drawing/2010/main" xmlns:ma14="http://schemas.microsoft.com/office/mac/drawingml/2011/main" val="1"/>
             </a:ext>
           </a:extLst>
         </p:spPr>
@@ -6997,7 +6997,7 @@
           </a:ln>
           <a:extLst>
             <a:ext uri="{C572A759-6A51-4108-AA02-DFA0A04FC94B}">
-              <ma14:wrappingTextBoxFlag xmlns:ma14="http://schemas.microsoft.com/office/mac/drawingml/2011/main" xmlns:a14="http://schemas.microsoft.com/office/drawing/2010/main" xmlns:m="http://schemas.openxmlformats.org/officeDocument/2006/math" xmlns="" val="1"/>
+              <ma14:wrappingTextBoxFlag xmlns="" xmlns:m="http://schemas.openxmlformats.org/officeDocument/2006/math" xmlns:a14="http://schemas.microsoft.com/office/drawing/2010/main" xmlns:ma14="http://schemas.microsoft.com/office/mac/drawingml/2011/main" val="1"/>
             </a:ext>
           </a:extLst>
         </p:spPr>
@@ -7088,7 +7088,7 @@
           </a:ln>
           <a:extLst>
             <a:ext uri="{C572A759-6A51-4108-AA02-DFA0A04FC94B}">
-              <ma14:wrappingTextBoxFlag xmlns:ma14="http://schemas.microsoft.com/office/mac/drawingml/2011/main" xmlns:a14="http://schemas.microsoft.com/office/drawing/2010/main" xmlns:m="http://schemas.openxmlformats.org/officeDocument/2006/math" xmlns="" val="1"/>
+              <ma14:wrappingTextBoxFlag xmlns="" xmlns:m="http://schemas.openxmlformats.org/officeDocument/2006/math" xmlns:a14="http://schemas.microsoft.com/office/drawing/2010/main" xmlns:ma14="http://schemas.microsoft.com/office/mac/drawingml/2011/main" val="1"/>
             </a:ext>
           </a:extLst>
         </p:spPr>
@@ -7273,7 +7273,7 @@
           </a:ln>
           <a:extLst>
             <a:ext uri="{C572A759-6A51-4108-AA02-DFA0A04FC94B}">
-              <ma14:wrappingTextBoxFlag xmlns:ma14="http://schemas.microsoft.com/office/mac/drawingml/2011/main" xmlns:a14="http://schemas.microsoft.com/office/drawing/2010/main" xmlns:m="http://schemas.openxmlformats.org/officeDocument/2006/math" xmlns="" val="1"/>
+              <ma14:wrappingTextBoxFlag xmlns="" xmlns:m="http://schemas.openxmlformats.org/officeDocument/2006/math" xmlns:a14="http://schemas.microsoft.com/office/drawing/2010/main" xmlns:ma14="http://schemas.microsoft.com/office/mac/drawingml/2011/main" val="1"/>
             </a:ext>
           </a:extLst>
         </p:spPr>
@@ -7414,7 +7414,7 @@
           </a:ln>
           <a:extLst>
             <a:ext uri="{C572A759-6A51-4108-AA02-DFA0A04FC94B}">
-              <ma14:wrappingTextBoxFlag xmlns:ma14="http://schemas.microsoft.com/office/mac/drawingml/2011/main" xmlns:a14="http://schemas.microsoft.com/office/drawing/2010/main" xmlns:m="http://schemas.openxmlformats.org/officeDocument/2006/math" xmlns="" val="1"/>
+              <ma14:wrappingTextBoxFlag xmlns="" xmlns:m="http://schemas.openxmlformats.org/officeDocument/2006/math" xmlns:a14="http://schemas.microsoft.com/office/drawing/2010/main" xmlns:ma14="http://schemas.microsoft.com/office/mac/drawingml/2011/main" val="1"/>
             </a:ext>
           </a:extLst>
         </p:spPr>
@@ -7464,7 +7464,7 @@
           </a:ln>
           <a:extLst>
             <a:ext uri="{C572A759-6A51-4108-AA02-DFA0A04FC94B}">
-              <ma14:wrappingTextBoxFlag xmlns:ma14="http://schemas.microsoft.com/office/mac/drawingml/2011/main" xmlns:a14="http://schemas.microsoft.com/office/drawing/2010/main" xmlns:m="http://schemas.openxmlformats.org/officeDocument/2006/math" xmlns="" val="1"/>
+              <ma14:wrappingTextBoxFlag xmlns="" xmlns:m="http://schemas.openxmlformats.org/officeDocument/2006/math" xmlns:a14="http://schemas.microsoft.com/office/drawing/2010/main" xmlns:ma14="http://schemas.microsoft.com/office/mac/drawingml/2011/main" val="1"/>
             </a:ext>
           </a:extLst>
         </p:spPr>
@@ -7514,7 +7514,7 @@
           </a:ln>
           <a:extLst>
             <a:ext uri="{C572A759-6A51-4108-AA02-DFA0A04FC94B}">
-              <ma14:wrappingTextBoxFlag xmlns:ma14="http://schemas.microsoft.com/office/mac/drawingml/2011/main" xmlns:a14="http://schemas.microsoft.com/office/drawing/2010/main" xmlns:m="http://schemas.openxmlformats.org/officeDocument/2006/math" xmlns="" val="1"/>
+              <ma14:wrappingTextBoxFlag xmlns="" xmlns:m="http://schemas.openxmlformats.org/officeDocument/2006/math" xmlns:a14="http://schemas.microsoft.com/office/drawing/2010/main" xmlns:ma14="http://schemas.microsoft.com/office/mac/drawingml/2011/main" val="1"/>
             </a:ext>
           </a:extLst>
         </p:spPr>
@@ -7559,7 +7559,7 @@
           </a:ln>
           <a:extLst>
             <a:ext uri="{C572A759-6A51-4108-AA02-DFA0A04FC94B}">
-              <ma14:wrappingTextBoxFlag xmlns:ma14="http://schemas.microsoft.com/office/mac/drawingml/2011/main" xmlns:a14="http://schemas.microsoft.com/office/drawing/2010/main" xmlns:m="http://schemas.openxmlformats.org/officeDocument/2006/math" xmlns="" val="1"/>
+              <ma14:wrappingTextBoxFlag xmlns="" xmlns:m="http://schemas.openxmlformats.org/officeDocument/2006/math" xmlns:a14="http://schemas.microsoft.com/office/drawing/2010/main" xmlns:ma14="http://schemas.microsoft.com/office/mac/drawingml/2011/main" val="1"/>
             </a:ext>
           </a:extLst>
         </p:spPr>
@@ -7614,7 +7614,7 @@
           </a:ln>
           <a:extLst>
             <a:ext uri="{C572A759-6A51-4108-AA02-DFA0A04FC94B}">
-              <ma14:wrappingTextBoxFlag xmlns:ma14="http://schemas.microsoft.com/office/mac/drawingml/2011/main" xmlns:a14="http://schemas.microsoft.com/office/drawing/2010/main" xmlns:m="http://schemas.openxmlformats.org/officeDocument/2006/math" xmlns="" val="1"/>
+              <ma14:wrappingTextBoxFlag xmlns="" xmlns:m="http://schemas.openxmlformats.org/officeDocument/2006/math" xmlns:a14="http://schemas.microsoft.com/office/drawing/2010/main" xmlns:ma14="http://schemas.microsoft.com/office/mac/drawingml/2011/main" val="1"/>
             </a:ext>
           </a:extLst>
         </p:spPr>
@@ -7663,7 +7663,7 @@
           </a:ln>
           <a:extLst>
             <a:ext uri="{C572A759-6A51-4108-AA02-DFA0A04FC94B}">
-              <ma14:wrappingTextBoxFlag xmlns:ma14="http://schemas.microsoft.com/office/mac/drawingml/2011/main" xmlns:a14="http://schemas.microsoft.com/office/drawing/2010/main" xmlns:m="http://schemas.openxmlformats.org/officeDocument/2006/math" xmlns="" val="1"/>
+              <ma14:wrappingTextBoxFlag xmlns="" xmlns:m="http://schemas.openxmlformats.org/officeDocument/2006/math" xmlns:a14="http://schemas.microsoft.com/office/drawing/2010/main" xmlns:ma14="http://schemas.microsoft.com/office/mac/drawingml/2011/main" val="1"/>
             </a:ext>
           </a:extLst>
         </p:spPr>
@@ -7782,7 +7782,7 @@
           </a:ln>
           <a:extLst>
             <a:ext uri="{C572A759-6A51-4108-AA02-DFA0A04FC94B}">
-              <ma14:wrappingTextBoxFlag xmlns:ma14="http://schemas.microsoft.com/office/mac/drawingml/2011/main" xmlns:a14="http://schemas.microsoft.com/office/drawing/2010/main" xmlns:m="http://schemas.openxmlformats.org/officeDocument/2006/math" xmlns="" val="1"/>
+              <ma14:wrappingTextBoxFlag xmlns="" xmlns:m="http://schemas.openxmlformats.org/officeDocument/2006/math" xmlns:a14="http://schemas.microsoft.com/office/drawing/2010/main" xmlns:ma14="http://schemas.microsoft.com/office/mac/drawingml/2011/main" val="1"/>
             </a:ext>
           </a:extLst>
         </p:spPr>
@@ -7836,7 +7836,7 @@
           </a:ln>
           <a:extLst>
             <a:ext uri="{C572A759-6A51-4108-AA02-DFA0A04FC94B}">
-              <ma14:wrappingTextBoxFlag xmlns:ma14="http://schemas.microsoft.com/office/mac/drawingml/2011/main" xmlns:a14="http://schemas.microsoft.com/office/drawing/2010/main" xmlns:m="http://schemas.openxmlformats.org/officeDocument/2006/math" xmlns="" val="1"/>
+              <ma14:wrappingTextBoxFlag xmlns="" xmlns:m="http://schemas.openxmlformats.org/officeDocument/2006/math" xmlns:a14="http://schemas.microsoft.com/office/drawing/2010/main" xmlns:ma14="http://schemas.microsoft.com/office/mac/drawingml/2011/main" val="1"/>
             </a:ext>
           </a:extLst>
         </p:spPr>
@@ -7950,7 +7950,7 @@
           </a:ln>
           <a:extLst>
             <a:ext uri="{C572A759-6A51-4108-AA02-DFA0A04FC94B}">
-              <ma14:wrappingTextBoxFlag xmlns:ma14="http://schemas.microsoft.com/office/mac/drawingml/2011/main" xmlns:a14="http://schemas.microsoft.com/office/drawing/2010/main" xmlns:m="http://schemas.openxmlformats.org/officeDocument/2006/math" xmlns="" val="1"/>
+              <ma14:wrappingTextBoxFlag xmlns="" xmlns:m="http://schemas.openxmlformats.org/officeDocument/2006/math" xmlns:a14="http://schemas.microsoft.com/office/drawing/2010/main" xmlns:ma14="http://schemas.microsoft.com/office/mac/drawingml/2011/main" val="1"/>
             </a:ext>
           </a:extLst>
         </p:spPr>
@@ -8064,7 +8064,7 @@
           </a:ln>
           <a:extLst>
             <a:ext uri="{C572A759-6A51-4108-AA02-DFA0A04FC94B}">
-              <ma14:wrappingTextBoxFlag xmlns:ma14="http://schemas.microsoft.com/office/mac/drawingml/2011/main" xmlns:a14="http://schemas.microsoft.com/office/drawing/2010/main" xmlns:m="http://schemas.openxmlformats.org/officeDocument/2006/math" xmlns="" val="1"/>
+              <ma14:wrappingTextBoxFlag xmlns="" xmlns:m="http://schemas.openxmlformats.org/officeDocument/2006/math" xmlns:a14="http://schemas.microsoft.com/office/drawing/2010/main" xmlns:ma14="http://schemas.microsoft.com/office/mac/drawingml/2011/main" val="1"/>
             </a:ext>
           </a:extLst>
         </p:spPr>
@@ -8190,7 +8190,7 @@
           </a:ln>
           <a:extLst>
             <a:ext uri="{C572A759-6A51-4108-AA02-DFA0A04FC94B}">
-              <ma14:wrappingTextBoxFlag xmlns:ma14="http://schemas.microsoft.com/office/mac/drawingml/2011/main" xmlns:a14="http://schemas.microsoft.com/office/drawing/2010/main" xmlns:m="http://schemas.openxmlformats.org/officeDocument/2006/math" xmlns="" val="1"/>
+              <ma14:wrappingTextBoxFlag xmlns="" xmlns:m="http://schemas.openxmlformats.org/officeDocument/2006/math" xmlns:a14="http://schemas.microsoft.com/office/drawing/2010/main" xmlns:ma14="http://schemas.microsoft.com/office/mac/drawingml/2011/main" val="1"/>
             </a:ext>
           </a:extLst>
         </p:spPr>
@@ -8564,7 +8564,7 @@
           </a:ln>
           <a:extLst>
             <a:ext uri="{C572A759-6A51-4108-AA02-DFA0A04FC94B}">
-              <ma14:wrappingTextBoxFlag xmlns:ma14="http://schemas.microsoft.com/office/mac/drawingml/2011/main" xmlns:a14="http://schemas.microsoft.com/office/drawing/2010/main" xmlns:m="http://schemas.openxmlformats.org/officeDocument/2006/math" xmlns="" val="1"/>
+              <ma14:wrappingTextBoxFlag xmlns="" xmlns:m="http://schemas.openxmlformats.org/officeDocument/2006/math" xmlns:a14="http://schemas.microsoft.com/office/drawing/2010/main" xmlns:ma14="http://schemas.microsoft.com/office/mac/drawingml/2011/main" val="1"/>
             </a:ext>
           </a:extLst>
         </p:spPr>
@@ -8614,7 +8614,7 @@
           </a:ln>
           <a:extLst>
             <a:ext uri="{C572A759-6A51-4108-AA02-DFA0A04FC94B}">
-              <ma14:wrappingTextBoxFlag xmlns:ma14="http://schemas.microsoft.com/office/mac/drawingml/2011/main" xmlns:a14="http://schemas.microsoft.com/office/drawing/2010/main" xmlns:m="http://schemas.openxmlformats.org/officeDocument/2006/math" xmlns="" val="1"/>
+              <ma14:wrappingTextBoxFlag xmlns="" xmlns:m="http://schemas.openxmlformats.org/officeDocument/2006/math" xmlns:a14="http://schemas.microsoft.com/office/drawing/2010/main" xmlns:ma14="http://schemas.microsoft.com/office/mac/drawingml/2011/main" val="1"/>
             </a:ext>
           </a:extLst>
         </p:spPr>
@@ -8722,7 +8722,7 @@
           </a:ln>
           <a:extLst>
             <a:ext uri="{C572A759-6A51-4108-AA02-DFA0A04FC94B}">
-              <ma14:wrappingTextBoxFlag xmlns:ma14="http://schemas.microsoft.com/office/mac/drawingml/2011/main" xmlns:a14="http://schemas.microsoft.com/office/drawing/2010/main" xmlns:m="http://schemas.openxmlformats.org/officeDocument/2006/math" xmlns="" val="1"/>
+              <ma14:wrappingTextBoxFlag xmlns="" xmlns:m="http://schemas.openxmlformats.org/officeDocument/2006/math" xmlns:a14="http://schemas.microsoft.com/office/drawing/2010/main" xmlns:ma14="http://schemas.microsoft.com/office/mac/drawingml/2011/main" val="1"/>
             </a:ext>
           </a:extLst>
         </p:spPr>
@@ -8791,7 +8791,7 @@
           </a:ln>
           <a:extLst>
             <a:ext uri="{C572A759-6A51-4108-AA02-DFA0A04FC94B}">
-              <ma14:wrappingTextBoxFlag xmlns:ma14="http://schemas.microsoft.com/office/mac/drawingml/2011/main" xmlns:a14="http://schemas.microsoft.com/office/drawing/2010/main" xmlns:m="http://schemas.openxmlformats.org/officeDocument/2006/math" xmlns="" val="1"/>
+              <ma14:wrappingTextBoxFlag xmlns="" xmlns:m="http://schemas.openxmlformats.org/officeDocument/2006/math" xmlns:a14="http://schemas.microsoft.com/office/drawing/2010/main" xmlns:ma14="http://schemas.microsoft.com/office/mac/drawingml/2011/main" val="1"/>
             </a:ext>
           </a:extLst>
         </p:spPr>
@@ -9241,7 +9241,7 @@
           </a:ln>
           <a:extLst>
             <a:ext uri="{C572A759-6A51-4108-AA02-DFA0A04FC94B}">
-              <ma14:wrappingTextBoxFlag xmlns:ma14="http://schemas.microsoft.com/office/mac/drawingml/2011/main" xmlns:a14="http://schemas.microsoft.com/office/drawing/2010/main" xmlns:m="http://schemas.openxmlformats.org/officeDocument/2006/math" xmlns="" val="1"/>
+              <ma14:wrappingTextBoxFlag xmlns="" xmlns:m="http://schemas.openxmlformats.org/officeDocument/2006/math" xmlns:a14="http://schemas.microsoft.com/office/drawing/2010/main" xmlns:ma14="http://schemas.microsoft.com/office/mac/drawingml/2011/main" val="1"/>
             </a:ext>
           </a:extLst>
         </p:spPr>
@@ -9286,7 +9286,7 @@
           </a:ln>
           <a:extLst>
             <a:ext uri="{C572A759-6A51-4108-AA02-DFA0A04FC94B}">
-              <ma14:wrappingTextBoxFlag xmlns:ma14="http://schemas.microsoft.com/office/mac/drawingml/2011/main" xmlns:a14="http://schemas.microsoft.com/office/drawing/2010/main" xmlns:m="http://schemas.openxmlformats.org/officeDocument/2006/math" xmlns="" val="1"/>
+              <ma14:wrappingTextBoxFlag xmlns="" xmlns:m="http://schemas.openxmlformats.org/officeDocument/2006/math" xmlns:a14="http://schemas.microsoft.com/office/drawing/2010/main" xmlns:ma14="http://schemas.microsoft.com/office/mac/drawingml/2011/main" val="1"/>
             </a:ext>
           </a:extLst>
         </p:spPr>
@@ -9746,7 +9746,7 @@
           </a:ln>
           <a:extLst>
             <a:ext uri="{C572A759-6A51-4108-AA02-DFA0A04FC94B}">
-              <ma14:wrappingTextBoxFlag xmlns:ma14="http://schemas.microsoft.com/office/mac/drawingml/2011/main" xmlns:a14="http://schemas.microsoft.com/office/drawing/2010/main" xmlns:m="http://schemas.openxmlformats.org/officeDocument/2006/math" xmlns="" val="1"/>
+              <ma14:wrappingTextBoxFlag xmlns="" xmlns:m="http://schemas.openxmlformats.org/officeDocument/2006/math" xmlns:a14="http://schemas.microsoft.com/office/drawing/2010/main" xmlns:ma14="http://schemas.microsoft.com/office/mac/drawingml/2011/main" val="1"/>
             </a:ext>
           </a:extLst>
         </p:spPr>
@@ -9828,7 +9828,7 @@
           </a:ln>
           <a:extLst>
             <a:ext uri="{C572A759-6A51-4108-AA02-DFA0A04FC94B}">
-              <ma14:wrappingTextBoxFlag xmlns:ma14="http://schemas.microsoft.com/office/mac/drawingml/2011/main" xmlns:a14="http://schemas.microsoft.com/office/drawing/2010/main" xmlns:m="http://schemas.openxmlformats.org/officeDocument/2006/math" xmlns="" val="1"/>
+              <ma14:wrappingTextBoxFlag xmlns="" xmlns:m="http://schemas.openxmlformats.org/officeDocument/2006/math" xmlns:a14="http://schemas.microsoft.com/office/drawing/2010/main" xmlns:ma14="http://schemas.microsoft.com/office/mac/drawingml/2011/main" val="1"/>
             </a:ext>
           </a:extLst>
         </p:spPr>
@@ -10295,7 +10295,7 @@
           </a:ln>
           <a:extLst>
             <a:ext uri="{C572A759-6A51-4108-AA02-DFA0A04FC94B}">
-              <ma14:wrappingTextBoxFlag xmlns:ma14="http://schemas.microsoft.com/office/mac/drawingml/2011/main" xmlns:a14="http://schemas.microsoft.com/office/drawing/2010/main" xmlns:m="http://schemas.openxmlformats.org/officeDocument/2006/math" xmlns="" val="1"/>
+              <ma14:wrappingTextBoxFlag xmlns="" xmlns:m="http://schemas.openxmlformats.org/officeDocument/2006/math" xmlns:a14="http://schemas.microsoft.com/office/drawing/2010/main" xmlns:ma14="http://schemas.microsoft.com/office/mac/drawingml/2011/main" val="1"/>
             </a:ext>
           </a:extLst>
         </p:spPr>
@@ -10344,7 +10344,7 @@
           </a:ln>
           <a:extLst>
             <a:ext uri="{C572A759-6A51-4108-AA02-DFA0A04FC94B}">
-              <ma14:wrappingTextBoxFlag xmlns:ma14="http://schemas.microsoft.com/office/mac/drawingml/2011/main" xmlns:a14="http://schemas.microsoft.com/office/drawing/2010/main" xmlns:m="http://schemas.openxmlformats.org/officeDocument/2006/math" xmlns="" val="1"/>
+              <ma14:wrappingTextBoxFlag xmlns="" xmlns:m="http://schemas.openxmlformats.org/officeDocument/2006/math" xmlns:a14="http://schemas.microsoft.com/office/drawing/2010/main" xmlns:ma14="http://schemas.microsoft.com/office/mac/drawingml/2011/main" val="1"/>
             </a:ext>
           </a:extLst>
         </p:spPr>
@@ -10685,7 +10685,7 @@
           </a:ln>
           <a:extLst>
             <a:ext uri="{C572A759-6A51-4108-AA02-DFA0A04FC94B}">
-              <ma14:wrappingTextBoxFlag xmlns:ma14="http://schemas.microsoft.com/office/mac/drawingml/2011/main" xmlns:a14="http://schemas.microsoft.com/office/drawing/2010/main" xmlns:m="http://schemas.openxmlformats.org/officeDocument/2006/math" xmlns="" val="1"/>
+              <ma14:wrappingTextBoxFlag xmlns="" xmlns:m="http://schemas.openxmlformats.org/officeDocument/2006/math" xmlns:a14="http://schemas.microsoft.com/office/drawing/2010/main" xmlns:ma14="http://schemas.microsoft.com/office/mac/drawingml/2011/main" val="1"/>
             </a:ext>
           </a:extLst>
         </p:spPr>
@@ -10961,7 +10961,7 @@
           </a:ln>
           <a:extLst>
             <a:ext uri="{C572A759-6A51-4108-AA02-DFA0A04FC94B}">
-              <ma14:wrappingTextBoxFlag xmlns:ma14="http://schemas.microsoft.com/office/mac/drawingml/2011/main" xmlns:a14="http://schemas.microsoft.com/office/drawing/2010/main" xmlns:m="http://schemas.openxmlformats.org/officeDocument/2006/math" xmlns="" val="1"/>
+              <ma14:wrappingTextBoxFlag xmlns="" xmlns:m="http://schemas.openxmlformats.org/officeDocument/2006/math" xmlns:a14="http://schemas.microsoft.com/office/drawing/2010/main" xmlns:ma14="http://schemas.microsoft.com/office/mac/drawingml/2011/main" val="1"/>
             </a:ext>
           </a:extLst>
         </p:spPr>
@@ -11088,7 +11088,7 @@
           </a:ln>
           <a:extLst>
             <a:ext uri="{C572A759-6A51-4108-AA02-DFA0A04FC94B}">
-              <ma14:wrappingTextBoxFlag xmlns:ma14="http://schemas.microsoft.com/office/mac/drawingml/2011/main" xmlns:a14="http://schemas.microsoft.com/office/drawing/2010/main" xmlns:m="http://schemas.openxmlformats.org/officeDocument/2006/math" xmlns="" val="1"/>
+              <ma14:wrappingTextBoxFlag xmlns="" xmlns:m="http://schemas.openxmlformats.org/officeDocument/2006/math" xmlns:a14="http://schemas.microsoft.com/office/drawing/2010/main" xmlns:ma14="http://schemas.microsoft.com/office/mac/drawingml/2011/main" val="1"/>
             </a:ext>
           </a:extLst>
         </p:spPr>
@@ -22968,7 +22968,7 @@
           </a:ln>
           <a:extLst>
             <a:ext uri="{C572A759-6A51-4108-AA02-DFA0A04FC94B}">
-              <ma14:wrappingTextBoxFlag xmlns:ma14="http://schemas.microsoft.com/office/mac/drawingml/2011/main" xmlns:a14="http://schemas.microsoft.com/office/drawing/2010/main" xmlns:m="http://schemas.openxmlformats.org/officeDocument/2006/math" xmlns="" val="1"/>
+              <ma14:wrappingTextBoxFlag xmlns="" xmlns:m="http://schemas.openxmlformats.org/officeDocument/2006/math" xmlns:a14="http://schemas.microsoft.com/office/drawing/2010/main" xmlns:ma14="http://schemas.microsoft.com/office/mac/drawingml/2011/main" val="1"/>
             </a:ext>
           </a:extLst>
         </p:spPr>
@@ -23877,7 +23877,7 @@
           </a:ln>
           <a:extLst>
             <a:ext uri="{C572A759-6A51-4108-AA02-DFA0A04FC94B}">
-              <ma14:wrappingTextBoxFlag xmlns:ma14="http://schemas.microsoft.com/office/mac/drawingml/2011/main" xmlns:a14="http://schemas.microsoft.com/office/drawing/2010/main" xmlns:m="http://schemas.openxmlformats.org/officeDocument/2006/math" xmlns="" val="1"/>
+              <ma14:wrappingTextBoxFlag xmlns="" xmlns:m="http://schemas.openxmlformats.org/officeDocument/2006/math" xmlns:a14="http://schemas.microsoft.com/office/drawing/2010/main" xmlns:ma14="http://schemas.microsoft.com/office/mac/drawingml/2011/main" val="1"/>
             </a:ext>
           </a:extLst>
         </p:spPr>
@@ -25230,9 +25230,10 @@
               </a:defRPr>
             </a:pPr>
             <a:r>
-              <a:rPr dirty="0"/>
-              <a:t>MATH</a:t>
-            </a:r>
+              <a:rPr lang="pt-BR" dirty="0"/>
+              <a:t>MATEMÁTICA</a:t>
+            </a:r>
+            <a:endParaRPr dirty="0"/>
           </a:p>
           <a:p>
             <a:pPr>
@@ -26086,7 +26087,7 @@
           </a:ln>
           <a:extLst>
             <a:ext uri="{C572A759-6A51-4108-AA02-DFA0A04FC94B}">
-              <ma14:wrappingTextBoxFlag xmlns:ma14="http://schemas.microsoft.com/office/mac/drawingml/2011/main" xmlns:a14="http://schemas.microsoft.com/office/drawing/2010/main" xmlns:m="http://schemas.openxmlformats.org/officeDocument/2006/math" xmlns="" val="1"/>
+              <ma14:wrappingTextBoxFlag xmlns="" xmlns:m="http://schemas.openxmlformats.org/officeDocument/2006/math" xmlns:a14="http://schemas.microsoft.com/office/drawing/2010/main" xmlns:ma14="http://schemas.microsoft.com/office/mac/drawingml/2011/main" val="1"/>
             </a:ext>
           </a:extLst>
         </p:spPr>
@@ -26215,7 +26216,7 @@
           </a:ln>
           <a:extLst>
             <a:ext uri="{C572A759-6A51-4108-AA02-DFA0A04FC94B}">
-              <ma14:wrappingTextBoxFlag xmlns:ma14="http://schemas.microsoft.com/office/mac/drawingml/2011/main" xmlns:a14="http://schemas.microsoft.com/office/drawing/2010/main" xmlns:m="http://schemas.openxmlformats.org/officeDocument/2006/math" xmlns="" val="1"/>
+              <ma14:wrappingTextBoxFlag xmlns="" xmlns:m="http://schemas.openxmlformats.org/officeDocument/2006/math" xmlns:a14="http://schemas.microsoft.com/office/drawing/2010/main" xmlns:ma14="http://schemas.microsoft.com/office/mac/drawingml/2011/main" val="1"/>
             </a:ext>
           </a:extLst>
         </p:spPr>
@@ -26255,7 +26256,7 @@
         <p:spPr>
           <a:xfrm>
             <a:off x="323996" y="1203306"/>
-            <a:ext cx="1864293" cy="184666"/>
+            <a:ext cx="1752083" cy="184666"/>
           </a:xfrm>
           <a:prstGeom prst="rect">
             <a:avLst/>
@@ -26265,7 +26266,7 @@
           </a:ln>
           <a:extLst>
             <a:ext uri="{C572A759-6A51-4108-AA02-DFA0A04FC94B}">
-              <ma14:wrappingTextBoxFlag xmlns:ma14="http://schemas.microsoft.com/office/mac/drawingml/2011/main" xmlns:a14="http://schemas.microsoft.com/office/drawing/2010/main" xmlns:m="http://schemas.openxmlformats.org/officeDocument/2006/math" xmlns="" val="1"/>
+              <ma14:wrappingTextBoxFlag xmlns="" xmlns:m="http://schemas.openxmlformats.org/officeDocument/2006/math" xmlns:a14="http://schemas.microsoft.com/office/drawing/2010/main" xmlns:ma14="http://schemas.microsoft.com/office/mac/drawingml/2011/main" val="1"/>
             </a:ext>
           </a:extLst>
         </p:spPr>
@@ -26283,10 +26284,6 @@
                 <a:sym typeface="Source Sans Pro Bold"/>
               </a:defRPr>
             </a:pPr>
-            <a:r>
-              <a:rPr dirty="0"/>
-              <a:t>T</a:t>
-            </a:r>
             <a:r>
               <a:rPr lang="pt-BR" dirty="0"/>
               <a:t>PARA USAR COM </a:t>
@@ -26392,7 +26389,7 @@
             <a:effectLst/>
             <a:extLst>
               <a:ext uri="{C572A759-6A51-4108-AA02-DFA0A04FC94B}">
-                <ma14:wrappingTextBoxFlag xmlns:ma14="http://schemas.microsoft.com/office/mac/drawingml/2011/main" xmlns:a14="http://schemas.microsoft.com/office/drawing/2010/main" xmlns:m="http://schemas.openxmlformats.org/officeDocument/2006/math" xmlns="" val="1"/>
+                <ma14:wrappingTextBoxFlag xmlns="" xmlns:m="http://schemas.openxmlformats.org/officeDocument/2006/math" xmlns:a14="http://schemas.microsoft.com/office/drawing/2010/main" xmlns:ma14="http://schemas.microsoft.com/office/mac/drawingml/2011/main" val="1"/>
               </a:ext>
             </a:extLst>
           </p:spPr>
@@ -26448,7 +26445,7 @@
           </a:ln>
           <a:extLst>
             <a:ext uri="{C572A759-6A51-4108-AA02-DFA0A04FC94B}">
-              <ma14:wrappingTextBoxFlag xmlns:ma14="http://schemas.microsoft.com/office/mac/drawingml/2011/main" xmlns:a14="http://schemas.microsoft.com/office/drawing/2010/main" xmlns:m="http://schemas.openxmlformats.org/officeDocument/2006/math" xmlns="" val="1"/>
+              <ma14:wrappingTextBoxFlag xmlns="" xmlns:m="http://schemas.openxmlformats.org/officeDocument/2006/math" xmlns:a14="http://schemas.microsoft.com/office/drawing/2010/main" xmlns:ma14="http://schemas.microsoft.com/office/mac/drawingml/2011/main" val="1"/>
             </a:ext>
           </a:extLst>
         </p:spPr>
@@ -26527,7 +26524,7 @@
           </a:ln>
           <a:extLst>
             <a:ext uri="{C572A759-6A51-4108-AA02-DFA0A04FC94B}">
-              <ma14:wrappingTextBoxFlag xmlns:ma14="http://schemas.microsoft.com/office/mac/drawingml/2011/main" xmlns:a14="http://schemas.microsoft.com/office/drawing/2010/main" xmlns:m="http://schemas.openxmlformats.org/officeDocument/2006/math" xmlns="" val="1"/>
+              <ma14:wrappingTextBoxFlag xmlns="" xmlns:m="http://schemas.openxmlformats.org/officeDocument/2006/math" xmlns:a14="http://schemas.microsoft.com/office/drawing/2010/main" xmlns:ma14="http://schemas.microsoft.com/office/mac/drawingml/2011/main" val="1"/>
             </a:ext>
           </a:extLst>
         </p:spPr>
@@ -26575,7 +26572,7 @@
           </a:ln>
           <a:extLst>
             <a:ext uri="{C572A759-6A51-4108-AA02-DFA0A04FC94B}">
-              <ma14:wrappingTextBoxFlag xmlns:ma14="http://schemas.microsoft.com/office/mac/drawingml/2011/main" xmlns:a14="http://schemas.microsoft.com/office/drawing/2010/main" xmlns:m="http://schemas.openxmlformats.org/officeDocument/2006/math" xmlns="" val="1"/>
+              <ma14:wrappingTextBoxFlag xmlns="" xmlns:m="http://schemas.openxmlformats.org/officeDocument/2006/math" xmlns:a14="http://schemas.microsoft.com/office/drawing/2010/main" xmlns:ma14="http://schemas.microsoft.com/office/mac/drawingml/2011/main" val="1"/>
             </a:ext>
           </a:extLst>
         </p:spPr>
@@ -26672,7 +26669,7 @@
           </a:ln>
           <a:extLst>
             <a:ext uri="{C572A759-6A51-4108-AA02-DFA0A04FC94B}">
-              <ma14:wrappingTextBoxFlag xmlns:ma14="http://schemas.microsoft.com/office/mac/drawingml/2011/main" xmlns:a14="http://schemas.microsoft.com/office/drawing/2010/main" xmlns:m="http://schemas.openxmlformats.org/officeDocument/2006/math" xmlns="" val="1"/>
+              <ma14:wrappingTextBoxFlag xmlns="" xmlns:m="http://schemas.openxmlformats.org/officeDocument/2006/math" xmlns:a14="http://schemas.microsoft.com/office/drawing/2010/main" xmlns:ma14="http://schemas.microsoft.com/office/mac/drawingml/2011/main" val="1"/>
             </a:ext>
           </a:extLst>
         </p:spPr>
@@ -28079,7 +28076,7 @@
           </a:ln>
           <a:extLst>
             <a:ext uri="{C572A759-6A51-4108-AA02-DFA0A04FC94B}">
-              <ma14:wrappingTextBoxFlag xmlns:ma14="http://schemas.microsoft.com/office/mac/drawingml/2011/main" xmlns:a14="http://schemas.microsoft.com/office/drawing/2010/main" xmlns:m="http://schemas.openxmlformats.org/officeDocument/2006/math" xmlns="" val="1"/>
+              <ma14:wrappingTextBoxFlag xmlns="" xmlns:m="http://schemas.openxmlformats.org/officeDocument/2006/math" xmlns:a14="http://schemas.microsoft.com/office/drawing/2010/main" xmlns:ma14="http://schemas.microsoft.com/office/mac/drawingml/2011/main" val="1"/>
             </a:ext>
           </a:extLst>
         </p:spPr>
@@ -28158,7 +28155,7 @@
           </a:ln>
           <a:extLst>
             <a:ext uri="{C572A759-6A51-4108-AA02-DFA0A04FC94B}">
-              <ma14:wrappingTextBoxFlag xmlns:ma14="http://schemas.microsoft.com/office/mac/drawingml/2011/main" xmlns:a14="http://schemas.microsoft.com/office/drawing/2010/main" xmlns:m="http://schemas.openxmlformats.org/officeDocument/2006/math" xmlns="" val="1"/>
+              <ma14:wrappingTextBoxFlag xmlns="" xmlns:m="http://schemas.openxmlformats.org/officeDocument/2006/math" xmlns:a14="http://schemas.microsoft.com/office/drawing/2010/main" xmlns:ma14="http://schemas.microsoft.com/office/mac/drawingml/2011/main" val="1"/>
             </a:ext>
           </a:extLst>
         </p:spPr>
@@ -28228,7 +28225,7 @@
           </a:ln>
           <a:extLst>
             <a:ext uri="{C572A759-6A51-4108-AA02-DFA0A04FC94B}">
-              <ma14:wrappingTextBoxFlag xmlns:ma14="http://schemas.microsoft.com/office/mac/drawingml/2011/main" xmlns:a14="http://schemas.microsoft.com/office/drawing/2010/main" xmlns:m="http://schemas.openxmlformats.org/officeDocument/2006/math" xmlns="" val="1"/>
+              <ma14:wrappingTextBoxFlag xmlns="" xmlns:m="http://schemas.openxmlformats.org/officeDocument/2006/math" xmlns:a14="http://schemas.microsoft.com/office/drawing/2010/main" xmlns:ma14="http://schemas.microsoft.com/office/mac/drawingml/2011/main" val="1"/>
             </a:ext>
           </a:extLst>
         </p:spPr>
@@ -28377,7 +28374,7 @@
           </a:ln>
           <a:extLst>
             <a:ext uri="{C572A759-6A51-4108-AA02-DFA0A04FC94B}">
-              <ma14:wrappingTextBoxFlag xmlns:ma14="http://schemas.microsoft.com/office/mac/drawingml/2011/main" xmlns:a14="http://schemas.microsoft.com/office/drawing/2010/main" xmlns:m="http://schemas.openxmlformats.org/officeDocument/2006/math" xmlns="" val="1"/>
+              <ma14:wrappingTextBoxFlag xmlns="" xmlns:m="http://schemas.openxmlformats.org/officeDocument/2006/math" xmlns:a14="http://schemas.microsoft.com/office/drawing/2010/main" xmlns:ma14="http://schemas.microsoft.com/office/mac/drawingml/2011/main" val="1"/>
             </a:ext>
           </a:extLst>
         </p:spPr>
@@ -28744,7 +28741,7 @@
             <a:effectLst/>
             <a:extLst>
               <a:ext uri="{C572A759-6A51-4108-AA02-DFA0A04FC94B}">
-                <ma14:wrappingTextBoxFlag xmlns:ma14="http://schemas.microsoft.com/office/mac/drawingml/2011/main" xmlns:a14="http://schemas.microsoft.com/office/drawing/2010/main" xmlns:m="http://schemas.openxmlformats.org/officeDocument/2006/math" xmlns="" val="1"/>
+                <ma14:wrappingTextBoxFlag xmlns="" xmlns:m="http://schemas.openxmlformats.org/officeDocument/2006/math" xmlns:a14="http://schemas.microsoft.com/office/drawing/2010/main" xmlns:ma14="http://schemas.microsoft.com/office/mac/drawingml/2011/main" val="1"/>
               </a:ext>
             </a:extLst>
           </p:spPr>
@@ -28800,7 +28797,7 @@
           </a:ln>
           <a:extLst>
             <a:ext uri="{C572A759-6A51-4108-AA02-DFA0A04FC94B}">
-              <ma14:wrappingTextBoxFlag xmlns:ma14="http://schemas.microsoft.com/office/mac/drawingml/2011/main" xmlns:a14="http://schemas.microsoft.com/office/drawing/2010/main" xmlns:m="http://schemas.openxmlformats.org/officeDocument/2006/math" xmlns="" val="1"/>
+              <ma14:wrappingTextBoxFlag xmlns="" xmlns:m="http://schemas.openxmlformats.org/officeDocument/2006/math" xmlns:a14="http://schemas.microsoft.com/office/drawing/2010/main" xmlns:ma14="http://schemas.microsoft.com/office/mac/drawingml/2011/main" val="1"/>
             </a:ext>
           </a:extLst>
         </p:spPr>
@@ -28936,7 +28933,7 @@
           </a:ln>
           <a:extLst>
             <a:ext uri="{C572A759-6A51-4108-AA02-DFA0A04FC94B}">
-              <ma14:wrappingTextBoxFlag xmlns:ma14="http://schemas.microsoft.com/office/mac/drawingml/2011/main" xmlns:a14="http://schemas.microsoft.com/office/drawing/2010/main" xmlns:m="http://schemas.openxmlformats.org/officeDocument/2006/math" xmlns="" val="1"/>
+              <ma14:wrappingTextBoxFlag xmlns="" xmlns:m="http://schemas.openxmlformats.org/officeDocument/2006/math" xmlns:a14="http://schemas.microsoft.com/office/drawing/2010/main" xmlns:ma14="http://schemas.microsoft.com/office/mac/drawingml/2011/main" val="1"/>
             </a:ext>
           </a:extLst>
         </p:spPr>
@@ -29015,7 +29012,7 @@
           </a:ln>
           <a:extLst>
             <a:ext uri="{C572A759-6A51-4108-AA02-DFA0A04FC94B}">
-              <ma14:wrappingTextBoxFlag xmlns:ma14="http://schemas.microsoft.com/office/mac/drawingml/2011/main" xmlns:a14="http://schemas.microsoft.com/office/drawing/2010/main" xmlns:m="http://schemas.openxmlformats.org/officeDocument/2006/math" xmlns="" val="1"/>
+              <ma14:wrappingTextBoxFlag xmlns="" xmlns:m="http://schemas.openxmlformats.org/officeDocument/2006/math" xmlns:a14="http://schemas.microsoft.com/office/drawing/2010/main" xmlns:ma14="http://schemas.microsoft.com/office/mac/drawingml/2011/main" val="1"/>
             </a:ext>
           </a:extLst>
         </p:spPr>
@@ -29060,7 +29057,7 @@
           </a:ln>
           <a:extLst>
             <a:ext uri="{C572A759-6A51-4108-AA02-DFA0A04FC94B}">
-              <ma14:wrappingTextBoxFlag xmlns:ma14="http://schemas.microsoft.com/office/mac/drawingml/2011/main" xmlns:a14="http://schemas.microsoft.com/office/drawing/2010/main" xmlns:m="http://schemas.openxmlformats.org/officeDocument/2006/math" xmlns="" val="1"/>
+              <ma14:wrappingTextBoxFlag xmlns="" xmlns:m="http://schemas.openxmlformats.org/officeDocument/2006/math" xmlns:a14="http://schemas.microsoft.com/office/drawing/2010/main" xmlns:ma14="http://schemas.microsoft.com/office/mac/drawingml/2011/main" val="1"/>
             </a:ext>
           </a:extLst>
         </p:spPr>
@@ -29105,7 +29102,7 @@
           </a:ln>
           <a:extLst>
             <a:ext uri="{C572A759-6A51-4108-AA02-DFA0A04FC94B}">
-              <ma14:wrappingTextBoxFlag xmlns:ma14="http://schemas.microsoft.com/office/mac/drawingml/2011/main" xmlns:a14="http://schemas.microsoft.com/office/drawing/2010/main" xmlns:m="http://schemas.openxmlformats.org/officeDocument/2006/math" xmlns="" val="1"/>
+              <ma14:wrappingTextBoxFlag xmlns="" xmlns:m="http://schemas.openxmlformats.org/officeDocument/2006/math" xmlns:a14="http://schemas.microsoft.com/office/drawing/2010/main" xmlns:ma14="http://schemas.microsoft.com/office/mac/drawingml/2011/main" val="1"/>
             </a:ext>
           </a:extLst>
         </p:spPr>
@@ -29274,7 +29271,7 @@
           </a:ln>
           <a:extLst>
             <a:ext uri="{C572A759-6A51-4108-AA02-DFA0A04FC94B}">
-              <ma14:wrappingTextBoxFlag xmlns:ma14="http://schemas.microsoft.com/office/mac/drawingml/2011/main" xmlns:a14="http://schemas.microsoft.com/office/drawing/2010/main" xmlns:m="http://schemas.openxmlformats.org/officeDocument/2006/math" xmlns="" val="1"/>
+              <ma14:wrappingTextBoxFlag xmlns="" xmlns:m="http://schemas.openxmlformats.org/officeDocument/2006/math" xmlns:a14="http://schemas.microsoft.com/office/drawing/2010/main" xmlns:ma14="http://schemas.microsoft.com/office/mac/drawingml/2011/main" val="1"/>
             </a:ext>
           </a:extLst>
         </p:spPr>
@@ -29768,7 +29765,7 @@
           </a:ln>
           <a:extLst>
             <a:ext uri="{C572A759-6A51-4108-AA02-DFA0A04FC94B}">
-              <ma14:wrappingTextBoxFlag xmlns:ma14="http://schemas.microsoft.com/office/mac/drawingml/2011/main" xmlns:a14="http://schemas.microsoft.com/office/drawing/2010/main" xmlns:m="http://schemas.openxmlformats.org/officeDocument/2006/math" xmlns="" val="1"/>
+              <ma14:wrappingTextBoxFlag xmlns="" xmlns:m="http://schemas.openxmlformats.org/officeDocument/2006/math" xmlns:a14="http://schemas.microsoft.com/office/drawing/2010/main" xmlns:ma14="http://schemas.microsoft.com/office/mac/drawingml/2011/main" val="1"/>
             </a:ext>
           </a:extLst>
         </p:spPr>
@@ -30108,7 +30105,7 @@
           </a:ln>
           <a:extLst>
             <a:ext uri="{C572A759-6A51-4108-AA02-DFA0A04FC94B}">
-              <ma14:wrappingTextBoxFlag xmlns:ma14="http://schemas.microsoft.com/office/mac/drawingml/2011/main" xmlns:a14="http://schemas.microsoft.com/office/drawing/2010/main" xmlns:m="http://schemas.openxmlformats.org/officeDocument/2006/math" xmlns="" val="1"/>
+              <ma14:wrappingTextBoxFlag xmlns="" xmlns:m="http://schemas.openxmlformats.org/officeDocument/2006/math" xmlns:a14="http://schemas.microsoft.com/office/drawing/2010/main" xmlns:ma14="http://schemas.microsoft.com/office/mac/drawingml/2011/main" val="1"/>
             </a:ext>
           </a:extLst>
         </p:spPr>
@@ -30183,7 +30180,7 @@
           </a:ln>
           <a:extLst>
             <a:ext uri="{C572A759-6A51-4108-AA02-DFA0A04FC94B}">
-              <ma14:wrappingTextBoxFlag xmlns:ma14="http://schemas.microsoft.com/office/mac/drawingml/2011/main" xmlns:a14="http://schemas.microsoft.com/office/drawing/2010/main" xmlns:m="http://schemas.openxmlformats.org/officeDocument/2006/math" xmlns="" val="1"/>
+              <ma14:wrappingTextBoxFlag xmlns="" xmlns:m="http://schemas.openxmlformats.org/officeDocument/2006/math" xmlns:a14="http://schemas.microsoft.com/office/drawing/2010/main" xmlns:ma14="http://schemas.microsoft.com/office/mac/drawingml/2011/main" val="1"/>
             </a:ext>
           </a:extLst>
         </p:spPr>
@@ -32045,7 +32042,7 @@
             <a:effectLst/>
             <a:extLst>
               <a:ext uri="{C572A759-6A51-4108-AA02-DFA0A04FC94B}">
-                <ma14:wrappingTextBoxFlag xmlns:ma14="http://schemas.microsoft.com/office/mac/drawingml/2011/main" xmlns:a14="http://schemas.microsoft.com/office/drawing/2010/main" xmlns:m="http://schemas.openxmlformats.org/officeDocument/2006/math" xmlns="" val="1"/>
+                <ma14:wrappingTextBoxFlag xmlns="" xmlns:m="http://schemas.openxmlformats.org/officeDocument/2006/math" xmlns:a14="http://schemas.microsoft.com/office/drawing/2010/main" xmlns:ma14="http://schemas.microsoft.com/office/mac/drawingml/2011/main" val="1"/>
               </a:ext>
             </a:extLst>
           </p:spPr>
@@ -32097,7 +32094,7 @@
             <a:effectLst/>
             <a:extLst>
               <a:ext uri="{C572A759-6A51-4108-AA02-DFA0A04FC94B}">
-                <ma14:wrappingTextBoxFlag xmlns:ma14="http://schemas.microsoft.com/office/mac/drawingml/2011/main" xmlns:a14="http://schemas.microsoft.com/office/drawing/2010/main" xmlns:m="http://schemas.openxmlformats.org/officeDocument/2006/math" xmlns="" val="1"/>
+                <ma14:wrappingTextBoxFlag xmlns="" xmlns:m="http://schemas.openxmlformats.org/officeDocument/2006/math" xmlns:a14="http://schemas.microsoft.com/office/drawing/2010/main" xmlns:ma14="http://schemas.microsoft.com/office/mac/drawingml/2011/main" val="1"/>
               </a:ext>
             </a:extLst>
           </p:spPr>
@@ -32861,7 +32858,7 @@
             <a:effectLst/>
             <a:extLst>
               <a:ext uri="{C572A759-6A51-4108-AA02-DFA0A04FC94B}">
-                <ma14:wrappingTextBoxFlag xmlns:ma14="http://schemas.microsoft.com/office/mac/drawingml/2011/main" xmlns:a14="http://schemas.microsoft.com/office/drawing/2010/main" xmlns:m="http://schemas.openxmlformats.org/officeDocument/2006/math" xmlns="" val="1"/>
+                <ma14:wrappingTextBoxFlag xmlns="" xmlns:m="http://schemas.openxmlformats.org/officeDocument/2006/math" xmlns:a14="http://schemas.microsoft.com/office/drawing/2010/main" xmlns:ma14="http://schemas.microsoft.com/office/mac/drawingml/2011/main" val="1"/>
               </a:ext>
             </a:extLst>
           </p:spPr>
@@ -32917,7 +32914,7 @@
             <a:effectLst/>
             <a:extLst>
               <a:ext uri="{C572A759-6A51-4108-AA02-DFA0A04FC94B}">
-                <ma14:wrappingTextBoxFlag xmlns:ma14="http://schemas.microsoft.com/office/mac/drawingml/2011/main" xmlns:a14="http://schemas.microsoft.com/office/drawing/2010/main" xmlns:m="http://schemas.openxmlformats.org/officeDocument/2006/math" xmlns="" val="1"/>
+                <ma14:wrappingTextBoxFlag xmlns="" xmlns:m="http://schemas.openxmlformats.org/officeDocument/2006/math" xmlns:a14="http://schemas.microsoft.com/office/drawing/2010/main" xmlns:ma14="http://schemas.microsoft.com/office/mac/drawingml/2011/main" val="1"/>
               </a:ext>
             </a:extLst>
           </p:spPr>
@@ -36876,7 +36873,7 @@
             <a:effectLst/>
             <a:extLst>
               <a:ext uri="{C572A759-6A51-4108-AA02-DFA0A04FC94B}">
-                <ma14:wrappingTextBoxFlag xmlns:ma14="http://schemas.microsoft.com/office/mac/drawingml/2011/main" xmlns:a14="http://schemas.microsoft.com/office/drawing/2010/main" xmlns:m="http://schemas.openxmlformats.org/officeDocument/2006/math" xmlns="" val="1"/>
+                <ma14:wrappingTextBoxFlag xmlns="" xmlns:m="http://schemas.openxmlformats.org/officeDocument/2006/math" xmlns:a14="http://schemas.microsoft.com/office/drawing/2010/main" xmlns:ma14="http://schemas.microsoft.com/office/mac/drawingml/2011/main" val="1"/>
               </a:ext>
             </a:extLst>
           </p:spPr>
@@ -36928,7 +36925,7 @@
             <a:effectLst/>
             <a:extLst>
               <a:ext uri="{C572A759-6A51-4108-AA02-DFA0A04FC94B}">
-                <ma14:wrappingTextBoxFlag xmlns:ma14="http://schemas.microsoft.com/office/mac/drawingml/2011/main" xmlns:a14="http://schemas.microsoft.com/office/drawing/2010/main" xmlns:m="http://schemas.openxmlformats.org/officeDocument/2006/math" xmlns="" val="1"/>
+                <ma14:wrappingTextBoxFlag xmlns="" xmlns:m="http://schemas.openxmlformats.org/officeDocument/2006/math" xmlns:a14="http://schemas.microsoft.com/office/drawing/2010/main" xmlns:ma14="http://schemas.microsoft.com/office/mac/drawingml/2011/main" val="1"/>
               </a:ext>
             </a:extLst>
           </p:spPr>
@@ -37552,7 +37549,7 @@
             <a:effectLst/>
             <a:extLst>
               <a:ext uri="{C572A759-6A51-4108-AA02-DFA0A04FC94B}">
-                <ma14:wrappingTextBoxFlag xmlns:ma14="http://schemas.microsoft.com/office/mac/drawingml/2011/main" xmlns:a14="http://schemas.microsoft.com/office/drawing/2010/main" xmlns:m="http://schemas.openxmlformats.org/officeDocument/2006/math" xmlns="" val="1"/>
+                <ma14:wrappingTextBoxFlag xmlns="" xmlns:m="http://schemas.openxmlformats.org/officeDocument/2006/math" xmlns:a14="http://schemas.microsoft.com/office/drawing/2010/main" xmlns:ma14="http://schemas.microsoft.com/office/mac/drawingml/2011/main" val="1"/>
               </a:ext>
             </a:extLst>
           </p:spPr>
@@ -38181,7 +38178,7 @@
           </a:ln>
           <a:extLst>
             <a:ext uri="{C572A759-6A51-4108-AA02-DFA0A04FC94B}">
-              <ma14:wrappingTextBoxFlag xmlns:ma14="http://schemas.microsoft.com/office/mac/drawingml/2011/main" xmlns:a14="http://schemas.microsoft.com/office/drawing/2010/main" xmlns:m="http://schemas.openxmlformats.org/officeDocument/2006/math" xmlns="" val="1"/>
+              <ma14:wrappingTextBoxFlag xmlns="" xmlns:m="http://schemas.openxmlformats.org/officeDocument/2006/math" xmlns:a14="http://schemas.microsoft.com/office/drawing/2010/main" xmlns:ma14="http://schemas.microsoft.com/office/mac/drawingml/2011/main" val="1"/>
             </a:ext>
           </a:extLst>
         </p:spPr>
@@ -38260,7 +38257,7 @@
           </a:ln>
           <a:extLst>
             <a:ext uri="{C572A759-6A51-4108-AA02-DFA0A04FC94B}">
-              <ma14:wrappingTextBoxFlag xmlns:ma14="http://schemas.microsoft.com/office/mac/drawingml/2011/main" xmlns:a14="http://schemas.microsoft.com/office/drawing/2010/main" xmlns:m="http://schemas.openxmlformats.org/officeDocument/2006/math" xmlns="" val="1"/>
+              <ma14:wrappingTextBoxFlag xmlns="" xmlns:m="http://schemas.openxmlformats.org/officeDocument/2006/math" xmlns:a14="http://schemas.microsoft.com/office/drawing/2010/main" xmlns:ma14="http://schemas.microsoft.com/office/mac/drawingml/2011/main" val="1"/>
             </a:ext>
           </a:extLst>
         </p:spPr>
@@ -39448,7 +39445,7 @@
             <a:effectLst/>
             <a:extLst>
               <a:ext uri="{C572A759-6A51-4108-AA02-DFA0A04FC94B}">
-                <ma14:wrappingTextBoxFlag xmlns:ma14="http://schemas.microsoft.com/office/mac/drawingml/2011/main" xmlns:a14="http://schemas.microsoft.com/office/drawing/2010/main" xmlns:m="http://schemas.openxmlformats.org/officeDocument/2006/math" xmlns="" val="1"/>
+                <ma14:wrappingTextBoxFlag xmlns="" xmlns:m="http://schemas.openxmlformats.org/officeDocument/2006/math" xmlns:a14="http://schemas.microsoft.com/office/drawing/2010/main" xmlns:ma14="http://schemas.microsoft.com/office/mac/drawingml/2011/main" val="1"/>
               </a:ext>
             </a:extLst>
           </p:spPr>
@@ -39500,7 +39497,7 @@
             <a:effectLst/>
             <a:extLst>
               <a:ext uri="{C572A759-6A51-4108-AA02-DFA0A04FC94B}">
-                <ma14:wrappingTextBoxFlag xmlns:ma14="http://schemas.microsoft.com/office/mac/drawingml/2011/main" xmlns:a14="http://schemas.microsoft.com/office/drawing/2010/main" xmlns:m="http://schemas.openxmlformats.org/officeDocument/2006/math" xmlns="" val="1"/>
+                <ma14:wrappingTextBoxFlag xmlns="" xmlns:m="http://schemas.openxmlformats.org/officeDocument/2006/math" xmlns:a14="http://schemas.microsoft.com/office/drawing/2010/main" xmlns:ma14="http://schemas.microsoft.com/office/mac/drawingml/2011/main" val="1"/>
               </a:ext>
             </a:extLst>
           </p:spPr>
@@ -40264,7 +40261,7 @@
             <a:effectLst/>
             <a:extLst>
               <a:ext uri="{C572A759-6A51-4108-AA02-DFA0A04FC94B}">
-                <ma14:wrappingTextBoxFlag xmlns:ma14="http://schemas.microsoft.com/office/mac/drawingml/2011/main" xmlns:a14="http://schemas.microsoft.com/office/drawing/2010/main" xmlns:m="http://schemas.openxmlformats.org/officeDocument/2006/math" xmlns="" val="1"/>
+                <ma14:wrappingTextBoxFlag xmlns="" xmlns:m="http://schemas.openxmlformats.org/officeDocument/2006/math" xmlns:a14="http://schemas.microsoft.com/office/drawing/2010/main" xmlns:ma14="http://schemas.microsoft.com/office/mac/drawingml/2011/main" val="1"/>
               </a:ext>
             </a:extLst>
           </p:spPr>
@@ -40321,7 +40318,7 @@
             <a:effectLst/>
             <a:extLst>
               <a:ext uri="{C572A759-6A51-4108-AA02-DFA0A04FC94B}">
-                <ma14:wrappingTextBoxFlag xmlns:ma14="http://schemas.microsoft.com/office/mac/drawingml/2011/main" xmlns:a14="http://schemas.microsoft.com/office/drawing/2010/main" xmlns:m="http://schemas.openxmlformats.org/officeDocument/2006/math" xmlns="" val="1"/>
+                <ma14:wrappingTextBoxFlag xmlns="" xmlns:m="http://schemas.openxmlformats.org/officeDocument/2006/math" xmlns:a14="http://schemas.microsoft.com/office/drawing/2010/main" xmlns:ma14="http://schemas.microsoft.com/office/mac/drawingml/2011/main" val="1"/>
               </a:ext>
             </a:extLst>
           </p:spPr>
@@ -40867,7 +40864,7 @@
           </a:ln>
           <a:extLst>
             <a:ext uri="{C572A759-6A51-4108-AA02-DFA0A04FC94B}">
-              <ma14:wrappingTextBoxFlag xmlns:ma14="http://schemas.microsoft.com/office/mac/drawingml/2011/main" xmlns:a14="http://schemas.microsoft.com/office/drawing/2010/main" xmlns:m="http://schemas.openxmlformats.org/officeDocument/2006/math" xmlns="" val="1"/>
+              <ma14:wrappingTextBoxFlag xmlns="" xmlns:m="http://schemas.openxmlformats.org/officeDocument/2006/math" xmlns:a14="http://schemas.microsoft.com/office/drawing/2010/main" xmlns:ma14="http://schemas.microsoft.com/office/mac/drawingml/2011/main" val="1"/>
             </a:ext>
           </a:extLst>
         </p:spPr>
@@ -40964,7 +40961,7 @@
           </a:ln>
           <a:extLst>
             <a:ext uri="{C572A759-6A51-4108-AA02-DFA0A04FC94B}">
-              <ma14:wrappingTextBoxFlag xmlns:ma14="http://schemas.microsoft.com/office/mac/drawingml/2011/main" xmlns:a14="http://schemas.microsoft.com/office/drawing/2010/main" xmlns:m="http://schemas.openxmlformats.org/officeDocument/2006/math" xmlns="" val="1"/>
+              <ma14:wrappingTextBoxFlag xmlns="" xmlns:m="http://schemas.openxmlformats.org/officeDocument/2006/math" xmlns:a14="http://schemas.microsoft.com/office/drawing/2010/main" xmlns:ma14="http://schemas.microsoft.com/office/mac/drawingml/2011/main" val="1"/>
             </a:ext>
           </a:extLst>
         </p:spPr>
@@ -41007,7 +41004,7 @@
           </a:ln>
           <a:extLst>
             <a:ext uri="{C572A759-6A51-4108-AA02-DFA0A04FC94B}">
-              <ma14:wrappingTextBoxFlag xmlns:ma14="http://schemas.microsoft.com/office/mac/drawingml/2011/main" xmlns:a14="http://schemas.microsoft.com/office/drawing/2010/main" xmlns:m="http://schemas.openxmlformats.org/officeDocument/2006/math" xmlns="" val="1"/>
+              <ma14:wrappingTextBoxFlag xmlns="" xmlns:m="http://schemas.openxmlformats.org/officeDocument/2006/math" xmlns:a14="http://schemas.microsoft.com/office/drawing/2010/main" xmlns:ma14="http://schemas.microsoft.com/office/mac/drawingml/2011/main" val="1"/>
             </a:ext>
           </a:extLst>
         </p:spPr>
@@ -41124,7 +41121,7 @@
           </a:ln>
           <a:extLst>
             <a:ext uri="{C572A759-6A51-4108-AA02-DFA0A04FC94B}">
-              <ma14:wrappingTextBoxFlag xmlns:ma14="http://schemas.microsoft.com/office/mac/drawingml/2011/main" xmlns:a14="http://schemas.microsoft.com/office/drawing/2010/main" xmlns:m="http://schemas.openxmlformats.org/officeDocument/2006/math" xmlns="" val="1"/>
+              <ma14:wrappingTextBoxFlag xmlns="" xmlns:m="http://schemas.openxmlformats.org/officeDocument/2006/math" xmlns:a14="http://schemas.microsoft.com/office/drawing/2010/main" xmlns:ma14="http://schemas.microsoft.com/office/mac/drawingml/2011/main" val="1"/>
             </a:ext>
           </a:extLst>
         </p:spPr>
@@ -41200,7 +41197,7 @@
           </a:ln>
           <a:extLst>
             <a:ext uri="{C572A759-6A51-4108-AA02-DFA0A04FC94B}">
-              <ma14:wrappingTextBoxFlag xmlns:ma14="http://schemas.microsoft.com/office/mac/drawingml/2011/main" xmlns:a14="http://schemas.microsoft.com/office/drawing/2010/main" xmlns:m="http://schemas.openxmlformats.org/officeDocument/2006/math" xmlns="" val="1"/>
+              <ma14:wrappingTextBoxFlag xmlns="" xmlns:m="http://schemas.openxmlformats.org/officeDocument/2006/math" xmlns:a14="http://schemas.microsoft.com/office/drawing/2010/main" xmlns:ma14="http://schemas.microsoft.com/office/mac/drawingml/2011/main" val="1"/>
             </a:ext>
           </a:extLst>
         </p:spPr>
@@ -41245,7 +41242,7 @@
           </a:ln>
           <a:extLst>
             <a:ext uri="{C572A759-6A51-4108-AA02-DFA0A04FC94B}">
-              <ma14:wrappingTextBoxFlag xmlns:ma14="http://schemas.microsoft.com/office/mac/drawingml/2011/main" xmlns:a14="http://schemas.microsoft.com/office/drawing/2010/main" xmlns:m="http://schemas.openxmlformats.org/officeDocument/2006/math" xmlns="" val="1"/>
+              <ma14:wrappingTextBoxFlag xmlns="" xmlns:m="http://schemas.openxmlformats.org/officeDocument/2006/math" xmlns:a14="http://schemas.microsoft.com/office/drawing/2010/main" xmlns:ma14="http://schemas.microsoft.com/office/mac/drawingml/2011/main" val="1"/>
             </a:ext>
           </a:extLst>
         </p:spPr>
@@ -41730,7 +41727,7 @@
           </a:ln>
           <a:extLst>
             <a:ext uri="{C572A759-6A51-4108-AA02-DFA0A04FC94B}">
-              <ma14:wrappingTextBoxFlag xmlns:ma14="http://schemas.microsoft.com/office/mac/drawingml/2011/main" xmlns:a14="http://schemas.microsoft.com/office/drawing/2010/main" xmlns:m="http://schemas.openxmlformats.org/officeDocument/2006/math" xmlns="" val="1"/>
+              <ma14:wrappingTextBoxFlag xmlns="" xmlns:m="http://schemas.openxmlformats.org/officeDocument/2006/math" xmlns:a14="http://schemas.microsoft.com/office/drawing/2010/main" xmlns:ma14="http://schemas.microsoft.com/office/mac/drawingml/2011/main" val="1"/>
             </a:ext>
           </a:extLst>
         </p:spPr>
@@ -41878,7 +41875,7 @@
           </a:ln>
           <a:extLst>
             <a:ext uri="{C572A759-6A51-4108-AA02-DFA0A04FC94B}">
-              <ma14:wrappingTextBoxFlag xmlns:ma14="http://schemas.microsoft.com/office/mac/drawingml/2011/main" xmlns:a14="http://schemas.microsoft.com/office/drawing/2010/main" xmlns:m="http://schemas.openxmlformats.org/officeDocument/2006/math" xmlns="" val="1"/>
+              <ma14:wrappingTextBoxFlag xmlns="" xmlns:m="http://schemas.openxmlformats.org/officeDocument/2006/math" xmlns:a14="http://schemas.microsoft.com/office/drawing/2010/main" xmlns:ma14="http://schemas.microsoft.com/office/mac/drawingml/2011/main" val="1"/>
             </a:ext>
           </a:extLst>
         </p:spPr>

</xml_diff>

<commit_message>
Fixed typo on back side first section title
</commit_message>
<xml_diff>
--- a/translations/portuguese/data-transformation_pt_br.pptx
+++ b/translations/portuguese/data-transformation_pt_br.pptx
@@ -2187,7 +2187,7 @@
           </a:ln>
           <a:extLst>
             <a:ext uri="{C572A759-6A51-4108-AA02-DFA0A04FC94B}">
-              <ma14:wrappingTextBoxFlag xmlns:ma14="http://schemas.microsoft.com/office/mac/drawingml/2011/main" xmlns:a14="http://schemas.microsoft.com/office/drawing/2010/main" xmlns:m="http://schemas.openxmlformats.org/officeDocument/2006/math" xmlns="" val="1"/>
+              <ma14:wrappingTextBoxFlag xmlns="" xmlns:m="http://schemas.openxmlformats.org/officeDocument/2006/math" xmlns:a14="http://schemas.microsoft.com/office/drawing/2010/main" xmlns:ma14="http://schemas.microsoft.com/office/mac/drawingml/2011/main" val="1"/>
             </a:ext>
           </a:extLst>
         </p:spPr>
@@ -2226,7 +2226,7 @@
           </a:ln>
           <a:extLst>
             <a:ext uri="{C572A759-6A51-4108-AA02-DFA0A04FC94B}">
-              <ma14:wrappingTextBoxFlag xmlns:ma14="http://schemas.microsoft.com/office/mac/drawingml/2011/main" xmlns:a14="http://schemas.microsoft.com/office/drawing/2010/main" xmlns:m="http://schemas.openxmlformats.org/officeDocument/2006/math" xmlns="" val="1"/>
+              <ma14:wrappingTextBoxFlag xmlns="" xmlns:m="http://schemas.openxmlformats.org/officeDocument/2006/math" xmlns:a14="http://schemas.microsoft.com/office/drawing/2010/main" xmlns:ma14="http://schemas.microsoft.com/office/mac/drawingml/2011/main" val="1"/>
             </a:ext>
           </a:extLst>
         </p:spPr>
@@ -4713,7 +4713,7 @@
           </a:ln>
           <a:extLst>
             <a:ext uri="{C572A759-6A51-4108-AA02-DFA0A04FC94B}">
-              <ma14:wrappingTextBoxFlag xmlns:ma14="http://schemas.microsoft.com/office/mac/drawingml/2011/main" xmlns:a14="http://schemas.microsoft.com/office/drawing/2010/main" xmlns:m="http://schemas.openxmlformats.org/officeDocument/2006/math" xmlns="" val="1"/>
+              <ma14:wrappingTextBoxFlag xmlns="" xmlns:m="http://schemas.openxmlformats.org/officeDocument/2006/math" xmlns:a14="http://schemas.microsoft.com/office/drawing/2010/main" xmlns:ma14="http://schemas.microsoft.com/office/mac/drawingml/2011/main" val="1"/>
             </a:ext>
           </a:extLst>
         </p:spPr>
@@ -4763,7 +4763,7 @@
           </a:ln>
           <a:extLst>
             <a:ext uri="{C572A759-6A51-4108-AA02-DFA0A04FC94B}">
-              <ma14:wrappingTextBoxFlag xmlns:ma14="http://schemas.microsoft.com/office/mac/drawingml/2011/main" xmlns:a14="http://schemas.microsoft.com/office/drawing/2010/main" xmlns:m="http://schemas.openxmlformats.org/officeDocument/2006/math" xmlns="" val="1"/>
+              <ma14:wrappingTextBoxFlag xmlns="" xmlns:m="http://schemas.openxmlformats.org/officeDocument/2006/math" xmlns:a14="http://schemas.microsoft.com/office/drawing/2010/main" xmlns:ma14="http://schemas.microsoft.com/office/mac/drawingml/2011/main" val="1"/>
             </a:ext>
           </a:extLst>
         </p:spPr>
@@ -4936,7 +4936,7 @@
           </a:ln>
           <a:extLst>
             <a:ext uri="{C572A759-6A51-4108-AA02-DFA0A04FC94B}">
-              <ma14:wrappingTextBoxFlag xmlns:ma14="http://schemas.microsoft.com/office/mac/drawingml/2011/main" xmlns:a14="http://schemas.microsoft.com/office/drawing/2010/main" xmlns:m="http://schemas.openxmlformats.org/officeDocument/2006/math" xmlns="" val="1"/>
+              <ma14:wrappingTextBoxFlag xmlns="" xmlns:m="http://schemas.openxmlformats.org/officeDocument/2006/math" xmlns:a14="http://schemas.microsoft.com/office/drawing/2010/main" xmlns:ma14="http://schemas.microsoft.com/office/mac/drawingml/2011/main" val="1"/>
             </a:ext>
           </a:extLst>
         </p:spPr>
@@ -5047,7 +5047,7 @@
           </a:ln>
           <a:extLst>
             <a:ext uri="{C572A759-6A51-4108-AA02-DFA0A04FC94B}">
-              <ma14:wrappingTextBoxFlag xmlns:ma14="http://schemas.microsoft.com/office/mac/drawingml/2011/main" xmlns:a14="http://schemas.microsoft.com/office/drawing/2010/main" xmlns:m="http://schemas.openxmlformats.org/officeDocument/2006/math" xmlns="" val="1"/>
+              <ma14:wrappingTextBoxFlag xmlns="" xmlns:m="http://schemas.openxmlformats.org/officeDocument/2006/math" xmlns:a14="http://schemas.microsoft.com/office/drawing/2010/main" xmlns:ma14="http://schemas.microsoft.com/office/mac/drawingml/2011/main" val="1"/>
             </a:ext>
           </a:extLst>
         </p:spPr>
@@ -5157,7 +5157,7 @@
           </a:ln>
           <a:extLst>
             <a:ext uri="{C572A759-6A51-4108-AA02-DFA0A04FC94B}">
-              <ma14:wrappingTextBoxFlag xmlns:ma14="http://schemas.microsoft.com/office/mac/drawingml/2011/main" xmlns:a14="http://schemas.microsoft.com/office/drawing/2010/main" xmlns:m="http://schemas.openxmlformats.org/officeDocument/2006/math" xmlns="" val="1"/>
+              <ma14:wrappingTextBoxFlag xmlns="" xmlns:m="http://schemas.openxmlformats.org/officeDocument/2006/math" xmlns:a14="http://schemas.microsoft.com/office/drawing/2010/main" xmlns:ma14="http://schemas.microsoft.com/office/mac/drawingml/2011/main" val="1"/>
             </a:ext>
           </a:extLst>
         </p:spPr>
@@ -5483,7 +5483,7 @@
           </a:ln>
           <a:extLst>
             <a:ext uri="{C572A759-6A51-4108-AA02-DFA0A04FC94B}">
-              <ma14:wrappingTextBoxFlag xmlns:ma14="http://schemas.microsoft.com/office/mac/drawingml/2011/main" xmlns:a14="http://schemas.microsoft.com/office/drawing/2010/main" xmlns:m="http://schemas.openxmlformats.org/officeDocument/2006/math" xmlns="" val="1"/>
+              <ma14:wrappingTextBoxFlag xmlns="" xmlns:m="http://schemas.openxmlformats.org/officeDocument/2006/math" xmlns:a14="http://schemas.microsoft.com/office/drawing/2010/main" xmlns:ma14="http://schemas.microsoft.com/office/mac/drawingml/2011/main" val="1"/>
             </a:ext>
           </a:extLst>
         </p:spPr>
@@ -5616,7 +5616,7 @@
           </a:ln>
           <a:extLst>
             <a:ext uri="{C572A759-6A51-4108-AA02-DFA0A04FC94B}">
-              <ma14:wrappingTextBoxFlag xmlns:ma14="http://schemas.microsoft.com/office/mac/drawingml/2011/main" xmlns:a14="http://schemas.microsoft.com/office/drawing/2010/main" xmlns:m="http://schemas.openxmlformats.org/officeDocument/2006/math" xmlns="" val="1"/>
+              <ma14:wrappingTextBoxFlag xmlns="" xmlns:m="http://schemas.openxmlformats.org/officeDocument/2006/math" xmlns:a14="http://schemas.microsoft.com/office/drawing/2010/main" xmlns:ma14="http://schemas.microsoft.com/office/mac/drawingml/2011/main" val="1"/>
             </a:ext>
           </a:extLst>
         </p:spPr>
@@ -5671,7 +5671,7 @@
           </a:ln>
           <a:extLst>
             <a:ext uri="{C572A759-6A51-4108-AA02-DFA0A04FC94B}">
-              <ma14:wrappingTextBoxFlag xmlns:ma14="http://schemas.microsoft.com/office/mac/drawingml/2011/main" xmlns:a14="http://schemas.microsoft.com/office/drawing/2010/main" xmlns:m="http://schemas.openxmlformats.org/officeDocument/2006/math" xmlns="" val="1"/>
+              <ma14:wrappingTextBoxFlag xmlns="" xmlns:m="http://schemas.openxmlformats.org/officeDocument/2006/math" xmlns:a14="http://schemas.microsoft.com/office/drawing/2010/main" xmlns:ma14="http://schemas.microsoft.com/office/mac/drawingml/2011/main" val="1"/>
             </a:ext>
           </a:extLst>
         </p:spPr>
@@ -5726,7 +5726,7 @@
           </a:ln>
           <a:extLst>
             <a:ext uri="{C572A759-6A51-4108-AA02-DFA0A04FC94B}">
-              <ma14:wrappingTextBoxFlag xmlns:ma14="http://schemas.microsoft.com/office/mac/drawingml/2011/main" xmlns:a14="http://schemas.microsoft.com/office/drawing/2010/main" xmlns:m="http://schemas.openxmlformats.org/officeDocument/2006/math" xmlns="" val="1"/>
+              <ma14:wrappingTextBoxFlag xmlns="" xmlns:m="http://schemas.openxmlformats.org/officeDocument/2006/math" xmlns:a14="http://schemas.microsoft.com/office/drawing/2010/main" xmlns:ma14="http://schemas.microsoft.com/office/mac/drawingml/2011/main" val="1"/>
             </a:ext>
           </a:extLst>
         </p:spPr>
@@ -5774,7 +5774,7 @@
           </a:ln>
           <a:extLst>
             <a:ext uri="{C572A759-6A51-4108-AA02-DFA0A04FC94B}">
-              <ma14:wrappingTextBoxFlag xmlns:ma14="http://schemas.microsoft.com/office/mac/drawingml/2011/main" xmlns:a14="http://schemas.microsoft.com/office/drawing/2010/main" xmlns:m="http://schemas.openxmlformats.org/officeDocument/2006/math" xmlns="" val="1"/>
+              <ma14:wrappingTextBoxFlag xmlns="" xmlns:m="http://schemas.openxmlformats.org/officeDocument/2006/math" xmlns:a14="http://schemas.microsoft.com/office/drawing/2010/main" xmlns:ma14="http://schemas.microsoft.com/office/mac/drawingml/2011/main" val="1"/>
             </a:ext>
           </a:extLst>
         </p:spPr>
@@ -5896,7 +5896,7 @@
           </a:ln>
           <a:extLst>
             <a:ext uri="{C572A759-6A51-4108-AA02-DFA0A04FC94B}">
-              <ma14:wrappingTextBoxFlag xmlns:ma14="http://schemas.microsoft.com/office/mac/drawingml/2011/main" xmlns:a14="http://schemas.microsoft.com/office/drawing/2010/main" xmlns:m="http://schemas.openxmlformats.org/officeDocument/2006/math" xmlns="" val="1"/>
+              <ma14:wrappingTextBoxFlag xmlns="" xmlns:m="http://schemas.openxmlformats.org/officeDocument/2006/math" xmlns:a14="http://schemas.microsoft.com/office/drawing/2010/main" xmlns:ma14="http://schemas.microsoft.com/office/mac/drawingml/2011/main" val="1"/>
             </a:ext>
           </a:extLst>
         </p:spPr>
@@ -5951,7 +5951,7 @@
           </a:ln>
           <a:extLst>
             <a:ext uri="{C572A759-6A51-4108-AA02-DFA0A04FC94B}">
-              <ma14:wrappingTextBoxFlag xmlns:ma14="http://schemas.microsoft.com/office/mac/drawingml/2011/main" xmlns:a14="http://schemas.microsoft.com/office/drawing/2010/main" xmlns:m="http://schemas.openxmlformats.org/officeDocument/2006/math" xmlns="" val="1"/>
+              <ma14:wrappingTextBoxFlag xmlns="" xmlns:m="http://schemas.openxmlformats.org/officeDocument/2006/math" xmlns:a14="http://schemas.microsoft.com/office/drawing/2010/main" xmlns:ma14="http://schemas.microsoft.com/office/mac/drawingml/2011/main" val="1"/>
             </a:ext>
           </a:extLst>
         </p:spPr>
@@ -6088,7 +6088,7 @@
           </a:ln>
           <a:extLst>
             <a:ext uri="{C572A759-6A51-4108-AA02-DFA0A04FC94B}">
-              <ma14:wrappingTextBoxFlag xmlns:ma14="http://schemas.microsoft.com/office/mac/drawingml/2011/main" xmlns:a14="http://schemas.microsoft.com/office/drawing/2010/main" xmlns:m="http://schemas.openxmlformats.org/officeDocument/2006/math" xmlns="" val="1"/>
+              <ma14:wrappingTextBoxFlag xmlns="" xmlns:m="http://schemas.openxmlformats.org/officeDocument/2006/math" xmlns:a14="http://schemas.microsoft.com/office/drawing/2010/main" xmlns:ma14="http://schemas.microsoft.com/office/mac/drawingml/2011/main" val="1"/>
             </a:ext>
           </a:extLst>
         </p:spPr>
@@ -6943,7 +6943,7 @@
           </a:ln>
           <a:extLst>
             <a:ext uri="{C572A759-6A51-4108-AA02-DFA0A04FC94B}">
-              <ma14:wrappingTextBoxFlag xmlns:ma14="http://schemas.microsoft.com/office/mac/drawingml/2011/main" xmlns:a14="http://schemas.microsoft.com/office/drawing/2010/main" xmlns:m="http://schemas.openxmlformats.org/officeDocument/2006/math" xmlns="" val="1"/>
+              <ma14:wrappingTextBoxFlag xmlns="" xmlns:m="http://schemas.openxmlformats.org/officeDocument/2006/math" xmlns:a14="http://schemas.microsoft.com/office/drawing/2010/main" xmlns:ma14="http://schemas.microsoft.com/office/mac/drawingml/2011/main" val="1"/>
             </a:ext>
           </a:extLst>
         </p:spPr>
@@ -6997,7 +6997,7 @@
           </a:ln>
           <a:extLst>
             <a:ext uri="{C572A759-6A51-4108-AA02-DFA0A04FC94B}">
-              <ma14:wrappingTextBoxFlag xmlns:ma14="http://schemas.microsoft.com/office/mac/drawingml/2011/main" xmlns:a14="http://schemas.microsoft.com/office/drawing/2010/main" xmlns:m="http://schemas.openxmlformats.org/officeDocument/2006/math" xmlns="" val="1"/>
+              <ma14:wrappingTextBoxFlag xmlns="" xmlns:m="http://schemas.openxmlformats.org/officeDocument/2006/math" xmlns:a14="http://schemas.microsoft.com/office/drawing/2010/main" xmlns:ma14="http://schemas.microsoft.com/office/mac/drawingml/2011/main" val="1"/>
             </a:ext>
           </a:extLst>
         </p:spPr>
@@ -7088,7 +7088,7 @@
           </a:ln>
           <a:extLst>
             <a:ext uri="{C572A759-6A51-4108-AA02-DFA0A04FC94B}">
-              <ma14:wrappingTextBoxFlag xmlns:ma14="http://schemas.microsoft.com/office/mac/drawingml/2011/main" xmlns:a14="http://schemas.microsoft.com/office/drawing/2010/main" xmlns:m="http://schemas.openxmlformats.org/officeDocument/2006/math" xmlns="" val="1"/>
+              <ma14:wrappingTextBoxFlag xmlns="" xmlns:m="http://schemas.openxmlformats.org/officeDocument/2006/math" xmlns:a14="http://schemas.microsoft.com/office/drawing/2010/main" xmlns:ma14="http://schemas.microsoft.com/office/mac/drawingml/2011/main" val="1"/>
             </a:ext>
           </a:extLst>
         </p:spPr>
@@ -7273,7 +7273,7 @@
           </a:ln>
           <a:extLst>
             <a:ext uri="{C572A759-6A51-4108-AA02-DFA0A04FC94B}">
-              <ma14:wrappingTextBoxFlag xmlns:ma14="http://schemas.microsoft.com/office/mac/drawingml/2011/main" xmlns:a14="http://schemas.microsoft.com/office/drawing/2010/main" xmlns:m="http://schemas.openxmlformats.org/officeDocument/2006/math" xmlns="" val="1"/>
+              <ma14:wrappingTextBoxFlag xmlns="" xmlns:m="http://schemas.openxmlformats.org/officeDocument/2006/math" xmlns:a14="http://schemas.microsoft.com/office/drawing/2010/main" xmlns:ma14="http://schemas.microsoft.com/office/mac/drawingml/2011/main" val="1"/>
             </a:ext>
           </a:extLst>
         </p:spPr>
@@ -7414,7 +7414,7 @@
           </a:ln>
           <a:extLst>
             <a:ext uri="{C572A759-6A51-4108-AA02-DFA0A04FC94B}">
-              <ma14:wrappingTextBoxFlag xmlns:ma14="http://schemas.microsoft.com/office/mac/drawingml/2011/main" xmlns:a14="http://schemas.microsoft.com/office/drawing/2010/main" xmlns:m="http://schemas.openxmlformats.org/officeDocument/2006/math" xmlns="" val="1"/>
+              <ma14:wrappingTextBoxFlag xmlns="" xmlns:m="http://schemas.openxmlformats.org/officeDocument/2006/math" xmlns:a14="http://schemas.microsoft.com/office/drawing/2010/main" xmlns:ma14="http://schemas.microsoft.com/office/mac/drawingml/2011/main" val="1"/>
             </a:ext>
           </a:extLst>
         </p:spPr>
@@ -7464,7 +7464,7 @@
           </a:ln>
           <a:extLst>
             <a:ext uri="{C572A759-6A51-4108-AA02-DFA0A04FC94B}">
-              <ma14:wrappingTextBoxFlag xmlns:ma14="http://schemas.microsoft.com/office/mac/drawingml/2011/main" xmlns:a14="http://schemas.microsoft.com/office/drawing/2010/main" xmlns:m="http://schemas.openxmlformats.org/officeDocument/2006/math" xmlns="" val="1"/>
+              <ma14:wrappingTextBoxFlag xmlns="" xmlns:m="http://schemas.openxmlformats.org/officeDocument/2006/math" xmlns:a14="http://schemas.microsoft.com/office/drawing/2010/main" xmlns:ma14="http://schemas.microsoft.com/office/mac/drawingml/2011/main" val="1"/>
             </a:ext>
           </a:extLst>
         </p:spPr>
@@ -7514,7 +7514,7 @@
           </a:ln>
           <a:extLst>
             <a:ext uri="{C572A759-6A51-4108-AA02-DFA0A04FC94B}">
-              <ma14:wrappingTextBoxFlag xmlns:ma14="http://schemas.microsoft.com/office/mac/drawingml/2011/main" xmlns:a14="http://schemas.microsoft.com/office/drawing/2010/main" xmlns:m="http://schemas.openxmlformats.org/officeDocument/2006/math" xmlns="" val="1"/>
+              <ma14:wrappingTextBoxFlag xmlns="" xmlns:m="http://schemas.openxmlformats.org/officeDocument/2006/math" xmlns:a14="http://schemas.microsoft.com/office/drawing/2010/main" xmlns:ma14="http://schemas.microsoft.com/office/mac/drawingml/2011/main" val="1"/>
             </a:ext>
           </a:extLst>
         </p:spPr>
@@ -7559,7 +7559,7 @@
           </a:ln>
           <a:extLst>
             <a:ext uri="{C572A759-6A51-4108-AA02-DFA0A04FC94B}">
-              <ma14:wrappingTextBoxFlag xmlns:ma14="http://schemas.microsoft.com/office/mac/drawingml/2011/main" xmlns:a14="http://schemas.microsoft.com/office/drawing/2010/main" xmlns:m="http://schemas.openxmlformats.org/officeDocument/2006/math" xmlns="" val="1"/>
+              <ma14:wrappingTextBoxFlag xmlns="" xmlns:m="http://schemas.openxmlformats.org/officeDocument/2006/math" xmlns:a14="http://schemas.microsoft.com/office/drawing/2010/main" xmlns:ma14="http://schemas.microsoft.com/office/mac/drawingml/2011/main" val="1"/>
             </a:ext>
           </a:extLst>
         </p:spPr>
@@ -7614,7 +7614,7 @@
           </a:ln>
           <a:extLst>
             <a:ext uri="{C572A759-6A51-4108-AA02-DFA0A04FC94B}">
-              <ma14:wrappingTextBoxFlag xmlns:ma14="http://schemas.microsoft.com/office/mac/drawingml/2011/main" xmlns:a14="http://schemas.microsoft.com/office/drawing/2010/main" xmlns:m="http://schemas.openxmlformats.org/officeDocument/2006/math" xmlns="" val="1"/>
+              <ma14:wrappingTextBoxFlag xmlns="" xmlns:m="http://schemas.openxmlformats.org/officeDocument/2006/math" xmlns:a14="http://schemas.microsoft.com/office/drawing/2010/main" xmlns:ma14="http://schemas.microsoft.com/office/mac/drawingml/2011/main" val="1"/>
             </a:ext>
           </a:extLst>
         </p:spPr>
@@ -7663,7 +7663,7 @@
           </a:ln>
           <a:extLst>
             <a:ext uri="{C572A759-6A51-4108-AA02-DFA0A04FC94B}">
-              <ma14:wrappingTextBoxFlag xmlns:ma14="http://schemas.microsoft.com/office/mac/drawingml/2011/main" xmlns:a14="http://schemas.microsoft.com/office/drawing/2010/main" xmlns:m="http://schemas.openxmlformats.org/officeDocument/2006/math" xmlns="" val="1"/>
+              <ma14:wrappingTextBoxFlag xmlns="" xmlns:m="http://schemas.openxmlformats.org/officeDocument/2006/math" xmlns:a14="http://schemas.microsoft.com/office/drawing/2010/main" xmlns:ma14="http://schemas.microsoft.com/office/mac/drawingml/2011/main" val="1"/>
             </a:ext>
           </a:extLst>
         </p:spPr>
@@ -7782,7 +7782,7 @@
           </a:ln>
           <a:extLst>
             <a:ext uri="{C572A759-6A51-4108-AA02-DFA0A04FC94B}">
-              <ma14:wrappingTextBoxFlag xmlns:ma14="http://schemas.microsoft.com/office/mac/drawingml/2011/main" xmlns:a14="http://schemas.microsoft.com/office/drawing/2010/main" xmlns:m="http://schemas.openxmlformats.org/officeDocument/2006/math" xmlns="" val="1"/>
+              <ma14:wrappingTextBoxFlag xmlns="" xmlns:m="http://schemas.openxmlformats.org/officeDocument/2006/math" xmlns:a14="http://schemas.microsoft.com/office/drawing/2010/main" xmlns:ma14="http://schemas.microsoft.com/office/mac/drawingml/2011/main" val="1"/>
             </a:ext>
           </a:extLst>
         </p:spPr>
@@ -7836,7 +7836,7 @@
           </a:ln>
           <a:extLst>
             <a:ext uri="{C572A759-6A51-4108-AA02-DFA0A04FC94B}">
-              <ma14:wrappingTextBoxFlag xmlns:ma14="http://schemas.microsoft.com/office/mac/drawingml/2011/main" xmlns:a14="http://schemas.microsoft.com/office/drawing/2010/main" xmlns:m="http://schemas.openxmlformats.org/officeDocument/2006/math" xmlns="" val="1"/>
+              <ma14:wrappingTextBoxFlag xmlns="" xmlns:m="http://schemas.openxmlformats.org/officeDocument/2006/math" xmlns:a14="http://schemas.microsoft.com/office/drawing/2010/main" xmlns:ma14="http://schemas.microsoft.com/office/mac/drawingml/2011/main" val="1"/>
             </a:ext>
           </a:extLst>
         </p:spPr>
@@ -7950,7 +7950,7 @@
           </a:ln>
           <a:extLst>
             <a:ext uri="{C572A759-6A51-4108-AA02-DFA0A04FC94B}">
-              <ma14:wrappingTextBoxFlag xmlns:ma14="http://schemas.microsoft.com/office/mac/drawingml/2011/main" xmlns:a14="http://schemas.microsoft.com/office/drawing/2010/main" xmlns:m="http://schemas.openxmlformats.org/officeDocument/2006/math" xmlns="" val="1"/>
+              <ma14:wrappingTextBoxFlag xmlns="" xmlns:m="http://schemas.openxmlformats.org/officeDocument/2006/math" xmlns:a14="http://schemas.microsoft.com/office/drawing/2010/main" xmlns:ma14="http://schemas.microsoft.com/office/mac/drawingml/2011/main" val="1"/>
             </a:ext>
           </a:extLst>
         </p:spPr>
@@ -8064,7 +8064,7 @@
           </a:ln>
           <a:extLst>
             <a:ext uri="{C572A759-6A51-4108-AA02-DFA0A04FC94B}">
-              <ma14:wrappingTextBoxFlag xmlns:ma14="http://schemas.microsoft.com/office/mac/drawingml/2011/main" xmlns:a14="http://schemas.microsoft.com/office/drawing/2010/main" xmlns:m="http://schemas.openxmlformats.org/officeDocument/2006/math" xmlns="" val="1"/>
+              <ma14:wrappingTextBoxFlag xmlns="" xmlns:m="http://schemas.openxmlformats.org/officeDocument/2006/math" xmlns:a14="http://schemas.microsoft.com/office/drawing/2010/main" xmlns:ma14="http://schemas.microsoft.com/office/mac/drawingml/2011/main" val="1"/>
             </a:ext>
           </a:extLst>
         </p:spPr>
@@ -8190,7 +8190,7 @@
           </a:ln>
           <a:extLst>
             <a:ext uri="{C572A759-6A51-4108-AA02-DFA0A04FC94B}">
-              <ma14:wrappingTextBoxFlag xmlns:ma14="http://schemas.microsoft.com/office/mac/drawingml/2011/main" xmlns:a14="http://schemas.microsoft.com/office/drawing/2010/main" xmlns:m="http://schemas.openxmlformats.org/officeDocument/2006/math" xmlns="" val="1"/>
+              <ma14:wrappingTextBoxFlag xmlns="" xmlns:m="http://schemas.openxmlformats.org/officeDocument/2006/math" xmlns:a14="http://schemas.microsoft.com/office/drawing/2010/main" xmlns:ma14="http://schemas.microsoft.com/office/mac/drawingml/2011/main" val="1"/>
             </a:ext>
           </a:extLst>
         </p:spPr>
@@ -8564,7 +8564,7 @@
           </a:ln>
           <a:extLst>
             <a:ext uri="{C572A759-6A51-4108-AA02-DFA0A04FC94B}">
-              <ma14:wrappingTextBoxFlag xmlns:ma14="http://schemas.microsoft.com/office/mac/drawingml/2011/main" xmlns:a14="http://schemas.microsoft.com/office/drawing/2010/main" xmlns:m="http://schemas.openxmlformats.org/officeDocument/2006/math" xmlns="" val="1"/>
+              <ma14:wrappingTextBoxFlag xmlns="" xmlns:m="http://schemas.openxmlformats.org/officeDocument/2006/math" xmlns:a14="http://schemas.microsoft.com/office/drawing/2010/main" xmlns:ma14="http://schemas.microsoft.com/office/mac/drawingml/2011/main" val="1"/>
             </a:ext>
           </a:extLst>
         </p:spPr>
@@ -8614,7 +8614,7 @@
           </a:ln>
           <a:extLst>
             <a:ext uri="{C572A759-6A51-4108-AA02-DFA0A04FC94B}">
-              <ma14:wrappingTextBoxFlag xmlns:ma14="http://schemas.microsoft.com/office/mac/drawingml/2011/main" xmlns:a14="http://schemas.microsoft.com/office/drawing/2010/main" xmlns:m="http://schemas.openxmlformats.org/officeDocument/2006/math" xmlns="" val="1"/>
+              <ma14:wrappingTextBoxFlag xmlns="" xmlns:m="http://schemas.openxmlformats.org/officeDocument/2006/math" xmlns:a14="http://schemas.microsoft.com/office/drawing/2010/main" xmlns:ma14="http://schemas.microsoft.com/office/mac/drawingml/2011/main" val="1"/>
             </a:ext>
           </a:extLst>
         </p:spPr>
@@ -8722,7 +8722,7 @@
           </a:ln>
           <a:extLst>
             <a:ext uri="{C572A759-6A51-4108-AA02-DFA0A04FC94B}">
-              <ma14:wrappingTextBoxFlag xmlns:ma14="http://schemas.microsoft.com/office/mac/drawingml/2011/main" xmlns:a14="http://schemas.microsoft.com/office/drawing/2010/main" xmlns:m="http://schemas.openxmlformats.org/officeDocument/2006/math" xmlns="" val="1"/>
+              <ma14:wrappingTextBoxFlag xmlns="" xmlns:m="http://schemas.openxmlformats.org/officeDocument/2006/math" xmlns:a14="http://schemas.microsoft.com/office/drawing/2010/main" xmlns:ma14="http://schemas.microsoft.com/office/mac/drawingml/2011/main" val="1"/>
             </a:ext>
           </a:extLst>
         </p:spPr>
@@ -8791,7 +8791,7 @@
           </a:ln>
           <a:extLst>
             <a:ext uri="{C572A759-6A51-4108-AA02-DFA0A04FC94B}">
-              <ma14:wrappingTextBoxFlag xmlns:ma14="http://schemas.microsoft.com/office/mac/drawingml/2011/main" xmlns:a14="http://schemas.microsoft.com/office/drawing/2010/main" xmlns:m="http://schemas.openxmlformats.org/officeDocument/2006/math" xmlns="" val="1"/>
+              <ma14:wrappingTextBoxFlag xmlns="" xmlns:m="http://schemas.openxmlformats.org/officeDocument/2006/math" xmlns:a14="http://schemas.microsoft.com/office/drawing/2010/main" xmlns:ma14="http://schemas.microsoft.com/office/mac/drawingml/2011/main" val="1"/>
             </a:ext>
           </a:extLst>
         </p:spPr>
@@ -9241,7 +9241,7 @@
           </a:ln>
           <a:extLst>
             <a:ext uri="{C572A759-6A51-4108-AA02-DFA0A04FC94B}">
-              <ma14:wrappingTextBoxFlag xmlns:ma14="http://schemas.microsoft.com/office/mac/drawingml/2011/main" xmlns:a14="http://schemas.microsoft.com/office/drawing/2010/main" xmlns:m="http://schemas.openxmlformats.org/officeDocument/2006/math" xmlns="" val="1"/>
+              <ma14:wrappingTextBoxFlag xmlns="" xmlns:m="http://schemas.openxmlformats.org/officeDocument/2006/math" xmlns:a14="http://schemas.microsoft.com/office/drawing/2010/main" xmlns:ma14="http://schemas.microsoft.com/office/mac/drawingml/2011/main" val="1"/>
             </a:ext>
           </a:extLst>
         </p:spPr>
@@ -9286,7 +9286,7 @@
           </a:ln>
           <a:extLst>
             <a:ext uri="{C572A759-6A51-4108-AA02-DFA0A04FC94B}">
-              <ma14:wrappingTextBoxFlag xmlns:ma14="http://schemas.microsoft.com/office/mac/drawingml/2011/main" xmlns:a14="http://schemas.microsoft.com/office/drawing/2010/main" xmlns:m="http://schemas.openxmlformats.org/officeDocument/2006/math" xmlns="" val="1"/>
+              <ma14:wrappingTextBoxFlag xmlns="" xmlns:m="http://schemas.openxmlformats.org/officeDocument/2006/math" xmlns:a14="http://schemas.microsoft.com/office/drawing/2010/main" xmlns:ma14="http://schemas.microsoft.com/office/mac/drawingml/2011/main" val="1"/>
             </a:ext>
           </a:extLst>
         </p:spPr>
@@ -9746,7 +9746,7 @@
           </a:ln>
           <a:extLst>
             <a:ext uri="{C572A759-6A51-4108-AA02-DFA0A04FC94B}">
-              <ma14:wrappingTextBoxFlag xmlns:ma14="http://schemas.microsoft.com/office/mac/drawingml/2011/main" xmlns:a14="http://schemas.microsoft.com/office/drawing/2010/main" xmlns:m="http://schemas.openxmlformats.org/officeDocument/2006/math" xmlns="" val="1"/>
+              <ma14:wrappingTextBoxFlag xmlns="" xmlns:m="http://schemas.openxmlformats.org/officeDocument/2006/math" xmlns:a14="http://schemas.microsoft.com/office/drawing/2010/main" xmlns:ma14="http://schemas.microsoft.com/office/mac/drawingml/2011/main" val="1"/>
             </a:ext>
           </a:extLst>
         </p:spPr>
@@ -9828,7 +9828,7 @@
           </a:ln>
           <a:extLst>
             <a:ext uri="{C572A759-6A51-4108-AA02-DFA0A04FC94B}">
-              <ma14:wrappingTextBoxFlag xmlns:ma14="http://schemas.microsoft.com/office/mac/drawingml/2011/main" xmlns:a14="http://schemas.microsoft.com/office/drawing/2010/main" xmlns:m="http://schemas.openxmlformats.org/officeDocument/2006/math" xmlns="" val="1"/>
+              <ma14:wrappingTextBoxFlag xmlns="" xmlns:m="http://schemas.openxmlformats.org/officeDocument/2006/math" xmlns:a14="http://schemas.microsoft.com/office/drawing/2010/main" xmlns:ma14="http://schemas.microsoft.com/office/mac/drawingml/2011/main" val="1"/>
             </a:ext>
           </a:extLst>
         </p:spPr>
@@ -10295,7 +10295,7 @@
           </a:ln>
           <a:extLst>
             <a:ext uri="{C572A759-6A51-4108-AA02-DFA0A04FC94B}">
-              <ma14:wrappingTextBoxFlag xmlns:ma14="http://schemas.microsoft.com/office/mac/drawingml/2011/main" xmlns:a14="http://schemas.microsoft.com/office/drawing/2010/main" xmlns:m="http://schemas.openxmlformats.org/officeDocument/2006/math" xmlns="" val="1"/>
+              <ma14:wrappingTextBoxFlag xmlns="" xmlns:m="http://schemas.openxmlformats.org/officeDocument/2006/math" xmlns:a14="http://schemas.microsoft.com/office/drawing/2010/main" xmlns:ma14="http://schemas.microsoft.com/office/mac/drawingml/2011/main" val="1"/>
             </a:ext>
           </a:extLst>
         </p:spPr>
@@ -10344,7 +10344,7 @@
           </a:ln>
           <a:extLst>
             <a:ext uri="{C572A759-6A51-4108-AA02-DFA0A04FC94B}">
-              <ma14:wrappingTextBoxFlag xmlns:ma14="http://schemas.microsoft.com/office/mac/drawingml/2011/main" xmlns:a14="http://schemas.microsoft.com/office/drawing/2010/main" xmlns:m="http://schemas.openxmlformats.org/officeDocument/2006/math" xmlns="" val="1"/>
+              <ma14:wrappingTextBoxFlag xmlns="" xmlns:m="http://schemas.openxmlformats.org/officeDocument/2006/math" xmlns:a14="http://schemas.microsoft.com/office/drawing/2010/main" xmlns:ma14="http://schemas.microsoft.com/office/mac/drawingml/2011/main" val="1"/>
             </a:ext>
           </a:extLst>
         </p:spPr>
@@ -10685,7 +10685,7 @@
           </a:ln>
           <a:extLst>
             <a:ext uri="{C572A759-6A51-4108-AA02-DFA0A04FC94B}">
-              <ma14:wrappingTextBoxFlag xmlns:ma14="http://schemas.microsoft.com/office/mac/drawingml/2011/main" xmlns:a14="http://schemas.microsoft.com/office/drawing/2010/main" xmlns:m="http://schemas.openxmlformats.org/officeDocument/2006/math" xmlns="" val="1"/>
+              <ma14:wrappingTextBoxFlag xmlns="" xmlns:m="http://schemas.openxmlformats.org/officeDocument/2006/math" xmlns:a14="http://schemas.microsoft.com/office/drawing/2010/main" xmlns:ma14="http://schemas.microsoft.com/office/mac/drawingml/2011/main" val="1"/>
             </a:ext>
           </a:extLst>
         </p:spPr>
@@ -10961,7 +10961,7 @@
           </a:ln>
           <a:extLst>
             <a:ext uri="{C572A759-6A51-4108-AA02-DFA0A04FC94B}">
-              <ma14:wrappingTextBoxFlag xmlns:ma14="http://schemas.microsoft.com/office/mac/drawingml/2011/main" xmlns:a14="http://schemas.microsoft.com/office/drawing/2010/main" xmlns:m="http://schemas.openxmlformats.org/officeDocument/2006/math" xmlns="" val="1"/>
+              <ma14:wrappingTextBoxFlag xmlns="" xmlns:m="http://schemas.openxmlformats.org/officeDocument/2006/math" xmlns:a14="http://schemas.microsoft.com/office/drawing/2010/main" xmlns:ma14="http://schemas.microsoft.com/office/mac/drawingml/2011/main" val="1"/>
             </a:ext>
           </a:extLst>
         </p:spPr>
@@ -11088,7 +11088,7 @@
           </a:ln>
           <a:extLst>
             <a:ext uri="{C572A759-6A51-4108-AA02-DFA0A04FC94B}">
-              <ma14:wrappingTextBoxFlag xmlns:ma14="http://schemas.microsoft.com/office/mac/drawingml/2011/main" xmlns:a14="http://schemas.microsoft.com/office/drawing/2010/main" xmlns:m="http://schemas.openxmlformats.org/officeDocument/2006/math" xmlns="" val="1"/>
+              <ma14:wrappingTextBoxFlag xmlns="" xmlns:m="http://schemas.openxmlformats.org/officeDocument/2006/math" xmlns:a14="http://schemas.microsoft.com/office/drawing/2010/main" xmlns:ma14="http://schemas.microsoft.com/office/mac/drawingml/2011/main" val="1"/>
             </a:ext>
           </a:extLst>
         </p:spPr>
@@ -22968,7 +22968,7 @@
           </a:ln>
           <a:extLst>
             <a:ext uri="{C572A759-6A51-4108-AA02-DFA0A04FC94B}">
-              <ma14:wrappingTextBoxFlag xmlns:ma14="http://schemas.microsoft.com/office/mac/drawingml/2011/main" xmlns:a14="http://schemas.microsoft.com/office/drawing/2010/main" xmlns:m="http://schemas.openxmlformats.org/officeDocument/2006/math" xmlns="" val="1"/>
+              <ma14:wrappingTextBoxFlag xmlns="" xmlns:m="http://schemas.openxmlformats.org/officeDocument/2006/math" xmlns:a14="http://schemas.microsoft.com/office/drawing/2010/main" xmlns:ma14="http://schemas.microsoft.com/office/mac/drawingml/2011/main" val="1"/>
             </a:ext>
           </a:extLst>
         </p:spPr>
@@ -23877,7 +23877,7 @@
           </a:ln>
           <a:extLst>
             <a:ext uri="{C572A759-6A51-4108-AA02-DFA0A04FC94B}">
-              <ma14:wrappingTextBoxFlag xmlns:ma14="http://schemas.microsoft.com/office/mac/drawingml/2011/main" xmlns:a14="http://schemas.microsoft.com/office/drawing/2010/main" xmlns:m="http://schemas.openxmlformats.org/officeDocument/2006/math" xmlns="" val="1"/>
+              <ma14:wrappingTextBoxFlag xmlns="" xmlns:m="http://schemas.openxmlformats.org/officeDocument/2006/math" xmlns:a14="http://schemas.microsoft.com/office/drawing/2010/main" xmlns:ma14="http://schemas.microsoft.com/office/mac/drawingml/2011/main" val="1"/>
             </a:ext>
           </a:extLst>
         </p:spPr>
@@ -26086,7 +26086,7 @@
           </a:ln>
           <a:extLst>
             <a:ext uri="{C572A759-6A51-4108-AA02-DFA0A04FC94B}">
-              <ma14:wrappingTextBoxFlag xmlns:ma14="http://schemas.microsoft.com/office/mac/drawingml/2011/main" xmlns:a14="http://schemas.microsoft.com/office/drawing/2010/main" xmlns:m="http://schemas.openxmlformats.org/officeDocument/2006/math" xmlns="" val="1"/>
+              <ma14:wrappingTextBoxFlag xmlns="" xmlns:m="http://schemas.openxmlformats.org/officeDocument/2006/math" xmlns:a14="http://schemas.microsoft.com/office/drawing/2010/main" xmlns:ma14="http://schemas.microsoft.com/office/mac/drawingml/2011/main" val="1"/>
             </a:ext>
           </a:extLst>
         </p:spPr>
@@ -26215,7 +26215,7 @@
           </a:ln>
           <a:extLst>
             <a:ext uri="{C572A759-6A51-4108-AA02-DFA0A04FC94B}">
-              <ma14:wrappingTextBoxFlag xmlns:ma14="http://schemas.microsoft.com/office/mac/drawingml/2011/main" xmlns:a14="http://schemas.microsoft.com/office/drawing/2010/main" xmlns:m="http://schemas.openxmlformats.org/officeDocument/2006/math" xmlns="" val="1"/>
+              <ma14:wrappingTextBoxFlag xmlns="" xmlns:m="http://schemas.openxmlformats.org/officeDocument/2006/math" xmlns:a14="http://schemas.microsoft.com/office/drawing/2010/main" xmlns:ma14="http://schemas.microsoft.com/office/mac/drawingml/2011/main" val="1"/>
             </a:ext>
           </a:extLst>
         </p:spPr>
@@ -26255,7 +26255,7 @@
         <p:spPr>
           <a:xfrm>
             <a:off x="323996" y="1203306"/>
-            <a:ext cx="1864293" cy="184666"/>
+            <a:ext cx="1752083" cy="184666"/>
           </a:xfrm>
           <a:prstGeom prst="rect">
             <a:avLst/>
@@ -26265,7 +26265,7 @@
           </a:ln>
           <a:extLst>
             <a:ext uri="{C572A759-6A51-4108-AA02-DFA0A04FC94B}">
-              <ma14:wrappingTextBoxFlag xmlns:ma14="http://schemas.microsoft.com/office/mac/drawingml/2011/main" xmlns:a14="http://schemas.microsoft.com/office/drawing/2010/main" xmlns:m="http://schemas.openxmlformats.org/officeDocument/2006/math" xmlns="" val="1"/>
+              <ma14:wrappingTextBoxFlag xmlns="" xmlns:m="http://schemas.openxmlformats.org/officeDocument/2006/math" xmlns:a14="http://schemas.microsoft.com/office/drawing/2010/main" xmlns:ma14="http://schemas.microsoft.com/office/mac/drawingml/2011/main" val="1"/>
             </a:ext>
           </a:extLst>
         </p:spPr>
@@ -26283,10 +26283,6 @@
                 <a:sym typeface="Source Sans Pro Bold"/>
               </a:defRPr>
             </a:pPr>
-            <a:r>
-              <a:rPr dirty="0"/>
-              <a:t>T</a:t>
-            </a:r>
             <a:r>
               <a:rPr lang="pt-BR" dirty="0"/>
               <a:t>PARA USAR COM </a:t>
@@ -26392,7 +26388,7 @@
             <a:effectLst/>
             <a:extLst>
               <a:ext uri="{C572A759-6A51-4108-AA02-DFA0A04FC94B}">
-                <ma14:wrappingTextBoxFlag xmlns:ma14="http://schemas.microsoft.com/office/mac/drawingml/2011/main" xmlns:a14="http://schemas.microsoft.com/office/drawing/2010/main" xmlns:m="http://schemas.openxmlformats.org/officeDocument/2006/math" xmlns="" val="1"/>
+                <ma14:wrappingTextBoxFlag xmlns="" xmlns:m="http://schemas.openxmlformats.org/officeDocument/2006/math" xmlns:a14="http://schemas.microsoft.com/office/drawing/2010/main" xmlns:ma14="http://schemas.microsoft.com/office/mac/drawingml/2011/main" val="1"/>
               </a:ext>
             </a:extLst>
           </p:spPr>
@@ -26448,7 +26444,7 @@
           </a:ln>
           <a:extLst>
             <a:ext uri="{C572A759-6A51-4108-AA02-DFA0A04FC94B}">
-              <ma14:wrappingTextBoxFlag xmlns:ma14="http://schemas.microsoft.com/office/mac/drawingml/2011/main" xmlns:a14="http://schemas.microsoft.com/office/drawing/2010/main" xmlns:m="http://schemas.openxmlformats.org/officeDocument/2006/math" xmlns="" val="1"/>
+              <ma14:wrappingTextBoxFlag xmlns="" xmlns:m="http://schemas.openxmlformats.org/officeDocument/2006/math" xmlns:a14="http://schemas.microsoft.com/office/drawing/2010/main" xmlns:ma14="http://schemas.microsoft.com/office/mac/drawingml/2011/main" val="1"/>
             </a:ext>
           </a:extLst>
         </p:spPr>
@@ -26527,7 +26523,7 @@
           </a:ln>
           <a:extLst>
             <a:ext uri="{C572A759-6A51-4108-AA02-DFA0A04FC94B}">
-              <ma14:wrappingTextBoxFlag xmlns:ma14="http://schemas.microsoft.com/office/mac/drawingml/2011/main" xmlns:a14="http://schemas.microsoft.com/office/drawing/2010/main" xmlns:m="http://schemas.openxmlformats.org/officeDocument/2006/math" xmlns="" val="1"/>
+              <ma14:wrappingTextBoxFlag xmlns="" xmlns:m="http://schemas.openxmlformats.org/officeDocument/2006/math" xmlns:a14="http://schemas.microsoft.com/office/drawing/2010/main" xmlns:ma14="http://schemas.microsoft.com/office/mac/drawingml/2011/main" val="1"/>
             </a:ext>
           </a:extLst>
         </p:spPr>
@@ -26575,7 +26571,7 @@
           </a:ln>
           <a:extLst>
             <a:ext uri="{C572A759-6A51-4108-AA02-DFA0A04FC94B}">
-              <ma14:wrappingTextBoxFlag xmlns:ma14="http://schemas.microsoft.com/office/mac/drawingml/2011/main" xmlns:a14="http://schemas.microsoft.com/office/drawing/2010/main" xmlns:m="http://schemas.openxmlformats.org/officeDocument/2006/math" xmlns="" val="1"/>
+              <ma14:wrappingTextBoxFlag xmlns="" xmlns:m="http://schemas.openxmlformats.org/officeDocument/2006/math" xmlns:a14="http://schemas.microsoft.com/office/drawing/2010/main" xmlns:ma14="http://schemas.microsoft.com/office/mac/drawingml/2011/main" val="1"/>
             </a:ext>
           </a:extLst>
         </p:spPr>
@@ -26672,7 +26668,7 @@
           </a:ln>
           <a:extLst>
             <a:ext uri="{C572A759-6A51-4108-AA02-DFA0A04FC94B}">
-              <ma14:wrappingTextBoxFlag xmlns:ma14="http://schemas.microsoft.com/office/mac/drawingml/2011/main" xmlns:a14="http://schemas.microsoft.com/office/drawing/2010/main" xmlns:m="http://schemas.openxmlformats.org/officeDocument/2006/math" xmlns="" val="1"/>
+              <ma14:wrappingTextBoxFlag xmlns="" xmlns:m="http://schemas.openxmlformats.org/officeDocument/2006/math" xmlns:a14="http://schemas.microsoft.com/office/drawing/2010/main" xmlns:ma14="http://schemas.microsoft.com/office/mac/drawingml/2011/main" val="1"/>
             </a:ext>
           </a:extLst>
         </p:spPr>
@@ -28079,7 +28075,7 @@
           </a:ln>
           <a:extLst>
             <a:ext uri="{C572A759-6A51-4108-AA02-DFA0A04FC94B}">
-              <ma14:wrappingTextBoxFlag xmlns:ma14="http://schemas.microsoft.com/office/mac/drawingml/2011/main" xmlns:a14="http://schemas.microsoft.com/office/drawing/2010/main" xmlns:m="http://schemas.openxmlformats.org/officeDocument/2006/math" xmlns="" val="1"/>
+              <ma14:wrappingTextBoxFlag xmlns="" xmlns:m="http://schemas.openxmlformats.org/officeDocument/2006/math" xmlns:a14="http://schemas.microsoft.com/office/drawing/2010/main" xmlns:ma14="http://schemas.microsoft.com/office/mac/drawingml/2011/main" val="1"/>
             </a:ext>
           </a:extLst>
         </p:spPr>
@@ -28158,7 +28154,7 @@
           </a:ln>
           <a:extLst>
             <a:ext uri="{C572A759-6A51-4108-AA02-DFA0A04FC94B}">
-              <ma14:wrappingTextBoxFlag xmlns:ma14="http://schemas.microsoft.com/office/mac/drawingml/2011/main" xmlns:a14="http://schemas.microsoft.com/office/drawing/2010/main" xmlns:m="http://schemas.openxmlformats.org/officeDocument/2006/math" xmlns="" val="1"/>
+              <ma14:wrappingTextBoxFlag xmlns="" xmlns:m="http://schemas.openxmlformats.org/officeDocument/2006/math" xmlns:a14="http://schemas.microsoft.com/office/drawing/2010/main" xmlns:ma14="http://schemas.microsoft.com/office/mac/drawingml/2011/main" val="1"/>
             </a:ext>
           </a:extLst>
         </p:spPr>
@@ -28228,7 +28224,7 @@
           </a:ln>
           <a:extLst>
             <a:ext uri="{C572A759-6A51-4108-AA02-DFA0A04FC94B}">
-              <ma14:wrappingTextBoxFlag xmlns:ma14="http://schemas.microsoft.com/office/mac/drawingml/2011/main" xmlns:a14="http://schemas.microsoft.com/office/drawing/2010/main" xmlns:m="http://schemas.openxmlformats.org/officeDocument/2006/math" xmlns="" val="1"/>
+              <ma14:wrappingTextBoxFlag xmlns="" xmlns:m="http://schemas.openxmlformats.org/officeDocument/2006/math" xmlns:a14="http://schemas.microsoft.com/office/drawing/2010/main" xmlns:ma14="http://schemas.microsoft.com/office/mac/drawingml/2011/main" val="1"/>
             </a:ext>
           </a:extLst>
         </p:spPr>
@@ -28377,7 +28373,7 @@
           </a:ln>
           <a:extLst>
             <a:ext uri="{C572A759-6A51-4108-AA02-DFA0A04FC94B}">
-              <ma14:wrappingTextBoxFlag xmlns:ma14="http://schemas.microsoft.com/office/mac/drawingml/2011/main" xmlns:a14="http://schemas.microsoft.com/office/drawing/2010/main" xmlns:m="http://schemas.openxmlformats.org/officeDocument/2006/math" xmlns="" val="1"/>
+              <ma14:wrappingTextBoxFlag xmlns="" xmlns:m="http://schemas.openxmlformats.org/officeDocument/2006/math" xmlns:a14="http://schemas.microsoft.com/office/drawing/2010/main" xmlns:ma14="http://schemas.microsoft.com/office/mac/drawingml/2011/main" val="1"/>
             </a:ext>
           </a:extLst>
         </p:spPr>
@@ -28744,7 +28740,7 @@
             <a:effectLst/>
             <a:extLst>
               <a:ext uri="{C572A759-6A51-4108-AA02-DFA0A04FC94B}">
-                <ma14:wrappingTextBoxFlag xmlns:ma14="http://schemas.microsoft.com/office/mac/drawingml/2011/main" xmlns:a14="http://schemas.microsoft.com/office/drawing/2010/main" xmlns:m="http://schemas.openxmlformats.org/officeDocument/2006/math" xmlns="" val="1"/>
+                <ma14:wrappingTextBoxFlag xmlns="" xmlns:m="http://schemas.openxmlformats.org/officeDocument/2006/math" xmlns:a14="http://schemas.microsoft.com/office/drawing/2010/main" xmlns:ma14="http://schemas.microsoft.com/office/mac/drawingml/2011/main" val="1"/>
               </a:ext>
             </a:extLst>
           </p:spPr>
@@ -28800,7 +28796,7 @@
           </a:ln>
           <a:extLst>
             <a:ext uri="{C572A759-6A51-4108-AA02-DFA0A04FC94B}">
-              <ma14:wrappingTextBoxFlag xmlns:ma14="http://schemas.microsoft.com/office/mac/drawingml/2011/main" xmlns:a14="http://schemas.microsoft.com/office/drawing/2010/main" xmlns:m="http://schemas.openxmlformats.org/officeDocument/2006/math" xmlns="" val="1"/>
+              <ma14:wrappingTextBoxFlag xmlns="" xmlns:m="http://schemas.openxmlformats.org/officeDocument/2006/math" xmlns:a14="http://schemas.microsoft.com/office/drawing/2010/main" xmlns:ma14="http://schemas.microsoft.com/office/mac/drawingml/2011/main" val="1"/>
             </a:ext>
           </a:extLst>
         </p:spPr>
@@ -28936,7 +28932,7 @@
           </a:ln>
           <a:extLst>
             <a:ext uri="{C572A759-6A51-4108-AA02-DFA0A04FC94B}">
-              <ma14:wrappingTextBoxFlag xmlns:ma14="http://schemas.microsoft.com/office/mac/drawingml/2011/main" xmlns:a14="http://schemas.microsoft.com/office/drawing/2010/main" xmlns:m="http://schemas.openxmlformats.org/officeDocument/2006/math" xmlns="" val="1"/>
+              <ma14:wrappingTextBoxFlag xmlns="" xmlns:m="http://schemas.openxmlformats.org/officeDocument/2006/math" xmlns:a14="http://schemas.microsoft.com/office/drawing/2010/main" xmlns:ma14="http://schemas.microsoft.com/office/mac/drawingml/2011/main" val="1"/>
             </a:ext>
           </a:extLst>
         </p:spPr>
@@ -29015,7 +29011,7 @@
           </a:ln>
           <a:extLst>
             <a:ext uri="{C572A759-6A51-4108-AA02-DFA0A04FC94B}">
-              <ma14:wrappingTextBoxFlag xmlns:ma14="http://schemas.microsoft.com/office/mac/drawingml/2011/main" xmlns:a14="http://schemas.microsoft.com/office/drawing/2010/main" xmlns:m="http://schemas.openxmlformats.org/officeDocument/2006/math" xmlns="" val="1"/>
+              <ma14:wrappingTextBoxFlag xmlns="" xmlns:m="http://schemas.openxmlformats.org/officeDocument/2006/math" xmlns:a14="http://schemas.microsoft.com/office/drawing/2010/main" xmlns:ma14="http://schemas.microsoft.com/office/mac/drawingml/2011/main" val="1"/>
             </a:ext>
           </a:extLst>
         </p:spPr>
@@ -29060,7 +29056,7 @@
           </a:ln>
           <a:extLst>
             <a:ext uri="{C572A759-6A51-4108-AA02-DFA0A04FC94B}">
-              <ma14:wrappingTextBoxFlag xmlns:ma14="http://schemas.microsoft.com/office/mac/drawingml/2011/main" xmlns:a14="http://schemas.microsoft.com/office/drawing/2010/main" xmlns:m="http://schemas.openxmlformats.org/officeDocument/2006/math" xmlns="" val="1"/>
+              <ma14:wrappingTextBoxFlag xmlns="" xmlns:m="http://schemas.openxmlformats.org/officeDocument/2006/math" xmlns:a14="http://schemas.microsoft.com/office/drawing/2010/main" xmlns:ma14="http://schemas.microsoft.com/office/mac/drawingml/2011/main" val="1"/>
             </a:ext>
           </a:extLst>
         </p:spPr>
@@ -29105,7 +29101,7 @@
           </a:ln>
           <a:extLst>
             <a:ext uri="{C572A759-6A51-4108-AA02-DFA0A04FC94B}">
-              <ma14:wrappingTextBoxFlag xmlns:ma14="http://schemas.microsoft.com/office/mac/drawingml/2011/main" xmlns:a14="http://schemas.microsoft.com/office/drawing/2010/main" xmlns:m="http://schemas.openxmlformats.org/officeDocument/2006/math" xmlns="" val="1"/>
+              <ma14:wrappingTextBoxFlag xmlns="" xmlns:m="http://schemas.openxmlformats.org/officeDocument/2006/math" xmlns:a14="http://schemas.microsoft.com/office/drawing/2010/main" xmlns:ma14="http://schemas.microsoft.com/office/mac/drawingml/2011/main" val="1"/>
             </a:ext>
           </a:extLst>
         </p:spPr>
@@ -29274,7 +29270,7 @@
           </a:ln>
           <a:extLst>
             <a:ext uri="{C572A759-6A51-4108-AA02-DFA0A04FC94B}">
-              <ma14:wrappingTextBoxFlag xmlns:ma14="http://schemas.microsoft.com/office/mac/drawingml/2011/main" xmlns:a14="http://schemas.microsoft.com/office/drawing/2010/main" xmlns:m="http://schemas.openxmlformats.org/officeDocument/2006/math" xmlns="" val="1"/>
+              <ma14:wrappingTextBoxFlag xmlns="" xmlns:m="http://schemas.openxmlformats.org/officeDocument/2006/math" xmlns:a14="http://schemas.microsoft.com/office/drawing/2010/main" xmlns:ma14="http://schemas.microsoft.com/office/mac/drawingml/2011/main" val="1"/>
             </a:ext>
           </a:extLst>
         </p:spPr>
@@ -29768,7 +29764,7 @@
           </a:ln>
           <a:extLst>
             <a:ext uri="{C572A759-6A51-4108-AA02-DFA0A04FC94B}">
-              <ma14:wrappingTextBoxFlag xmlns:ma14="http://schemas.microsoft.com/office/mac/drawingml/2011/main" xmlns:a14="http://schemas.microsoft.com/office/drawing/2010/main" xmlns:m="http://schemas.openxmlformats.org/officeDocument/2006/math" xmlns="" val="1"/>
+              <ma14:wrappingTextBoxFlag xmlns="" xmlns:m="http://schemas.openxmlformats.org/officeDocument/2006/math" xmlns:a14="http://schemas.microsoft.com/office/drawing/2010/main" xmlns:ma14="http://schemas.microsoft.com/office/mac/drawingml/2011/main" val="1"/>
             </a:ext>
           </a:extLst>
         </p:spPr>
@@ -30108,7 +30104,7 @@
           </a:ln>
           <a:extLst>
             <a:ext uri="{C572A759-6A51-4108-AA02-DFA0A04FC94B}">
-              <ma14:wrappingTextBoxFlag xmlns:ma14="http://schemas.microsoft.com/office/mac/drawingml/2011/main" xmlns:a14="http://schemas.microsoft.com/office/drawing/2010/main" xmlns:m="http://schemas.openxmlformats.org/officeDocument/2006/math" xmlns="" val="1"/>
+              <ma14:wrappingTextBoxFlag xmlns="" xmlns:m="http://schemas.openxmlformats.org/officeDocument/2006/math" xmlns:a14="http://schemas.microsoft.com/office/drawing/2010/main" xmlns:ma14="http://schemas.microsoft.com/office/mac/drawingml/2011/main" val="1"/>
             </a:ext>
           </a:extLst>
         </p:spPr>
@@ -30183,7 +30179,7 @@
           </a:ln>
           <a:extLst>
             <a:ext uri="{C572A759-6A51-4108-AA02-DFA0A04FC94B}">
-              <ma14:wrappingTextBoxFlag xmlns:ma14="http://schemas.microsoft.com/office/mac/drawingml/2011/main" xmlns:a14="http://schemas.microsoft.com/office/drawing/2010/main" xmlns:m="http://schemas.openxmlformats.org/officeDocument/2006/math" xmlns="" val="1"/>
+              <ma14:wrappingTextBoxFlag xmlns="" xmlns:m="http://schemas.openxmlformats.org/officeDocument/2006/math" xmlns:a14="http://schemas.microsoft.com/office/drawing/2010/main" xmlns:ma14="http://schemas.microsoft.com/office/mac/drawingml/2011/main" val="1"/>
             </a:ext>
           </a:extLst>
         </p:spPr>
@@ -32045,7 +32041,7 @@
             <a:effectLst/>
             <a:extLst>
               <a:ext uri="{C572A759-6A51-4108-AA02-DFA0A04FC94B}">
-                <ma14:wrappingTextBoxFlag xmlns:ma14="http://schemas.microsoft.com/office/mac/drawingml/2011/main" xmlns:a14="http://schemas.microsoft.com/office/drawing/2010/main" xmlns:m="http://schemas.openxmlformats.org/officeDocument/2006/math" xmlns="" val="1"/>
+                <ma14:wrappingTextBoxFlag xmlns="" xmlns:m="http://schemas.openxmlformats.org/officeDocument/2006/math" xmlns:a14="http://schemas.microsoft.com/office/drawing/2010/main" xmlns:ma14="http://schemas.microsoft.com/office/mac/drawingml/2011/main" val="1"/>
               </a:ext>
             </a:extLst>
           </p:spPr>
@@ -32097,7 +32093,7 @@
             <a:effectLst/>
             <a:extLst>
               <a:ext uri="{C572A759-6A51-4108-AA02-DFA0A04FC94B}">
-                <ma14:wrappingTextBoxFlag xmlns:ma14="http://schemas.microsoft.com/office/mac/drawingml/2011/main" xmlns:a14="http://schemas.microsoft.com/office/drawing/2010/main" xmlns:m="http://schemas.openxmlformats.org/officeDocument/2006/math" xmlns="" val="1"/>
+                <ma14:wrappingTextBoxFlag xmlns="" xmlns:m="http://schemas.openxmlformats.org/officeDocument/2006/math" xmlns:a14="http://schemas.microsoft.com/office/drawing/2010/main" xmlns:ma14="http://schemas.microsoft.com/office/mac/drawingml/2011/main" val="1"/>
               </a:ext>
             </a:extLst>
           </p:spPr>
@@ -32861,7 +32857,7 @@
             <a:effectLst/>
             <a:extLst>
               <a:ext uri="{C572A759-6A51-4108-AA02-DFA0A04FC94B}">
-                <ma14:wrappingTextBoxFlag xmlns:ma14="http://schemas.microsoft.com/office/mac/drawingml/2011/main" xmlns:a14="http://schemas.microsoft.com/office/drawing/2010/main" xmlns:m="http://schemas.openxmlformats.org/officeDocument/2006/math" xmlns="" val="1"/>
+                <ma14:wrappingTextBoxFlag xmlns="" xmlns:m="http://schemas.openxmlformats.org/officeDocument/2006/math" xmlns:a14="http://schemas.microsoft.com/office/drawing/2010/main" xmlns:ma14="http://schemas.microsoft.com/office/mac/drawingml/2011/main" val="1"/>
               </a:ext>
             </a:extLst>
           </p:spPr>
@@ -32917,7 +32913,7 @@
             <a:effectLst/>
             <a:extLst>
               <a:ext uri="{C572A759-6A51-4108-AA02-DFA0A04FC94B}">
-                <ma14:wrappingTextBoxFlag xmlns:ma14="http://schemas.microsoft.com/office/mac/drawingml/2011/main" xmlns:a14="http://schemas.microsoft.com/office/drawing/2010/main" xmlns:m="http://schemas.openxmlformats.org/officeDocument/2006/math" xmlns="" val="1"/>
+                <ma14:wrappingTextBoxFlag xmlns="" xmlns:m="http://schemas.openxmlformats.org/officeDocument/2006/math" xmlns:a14="http://schemas.microsoft.com/office/drawing/2010/main" xmlns:ma14="http://schemas.microsoft.com/office/mac/drawingml/2011/main" val="1"/>
               </a:ext>
             </a:extLst>
           </p:spPr>
@@ -36876,7 +36872,7 @@
             <a:effectLst/>
             <a:extLst>
               <a:ext uri="{C572A759-6A51-4108-AA02-DFA0A04FC94B}">
-                <ma14:wrappingTextBoxFlag xmlns:ma14="http://schemas.microsoft.com/office/mac/drawingml/2011/main" xmlns:a14="http://schemas.microsoft.com/office/drawing/2010/main" xmlns:m="http://schemas.openxmlformats.org/officeDocument/2006/math" xmlns="" val="1"/>
+                <ma14:wrappingTextBoxFlag xmlns="" xmlns:m="http://schemas.openxmlformats.org/officeDocument/2006/math" xmlns:a14="http://schemas.microsoft.com/office/drawing/2010/main" xmlns:ma14="http://schemas.microsoft.com/office/mac/drawingml/2011/main" val="1"/>
               </a:ext>
             </a:extLst>
           </p:spPr>
@@ -36928,7 +36924,7 @@
             <a:effectLst/>
             <a:extLst>
               <a:ext uri="{C572A759-6A51-4108-AA02-DFA0A04FC94B}">
-                <ma14:wrappingTextBoxFlag xmlns:ma14="http://schemas.microsoft.com/office/mac/drawingml/2011/main" xmlns:a14="http://schemas.microsoft.com/office/drawing/2010/main" xmlns:m="http://schemas.openxmlformats.org/officeDocument/2006/math" xmlns="" val="1"/>
+                <ma14:wrappingTextBoxFlag xmlns="" xmlns:m="http://schemas.openxmlformats.org/officeDocument/2006/math" xmlns:a14="http://schemas.microsoft.com/office/drawing/2010/main" xmlns:ma14="http://schemas.microsoft.com/office/mac/drawingml/2011/main" val="1"/>
               </a:ext>
             </a:extLst>
           </p:spPr>
@@ -37552,7 +37548,7 @@
             <a:effectLst/>
             <a:extLst>
               <a:ext uri="{C572A759-6A51-4108-AA02-DFA0A04FC94B}">
-                <ma14:wrappingTextBoxFlag xmlns:ma14="http://schemas.microsoft.com/office/mac/drawingml/2011/main" xmlns:a14="http://schemas.microsoft.com/office/drawing/2010/main" xmlns:m="http://schemas.openxmlformats.org/officeDocument/2006/math" xmlns="" val="1"/>
+                <ma14:wrappingTextBoxFlag xmlns="" xmlns:m="http://schemas.openxmlformats.org/officeDocument/2006/math" xmlns:a14="http://schemas.microsoft.com/office/drawing/2010/main" xmlns:ma14="http://schemas.microsoft.com/office/mac/drawingml/2011/main" val="1"/>
               </a:ext>
             </a:extLst>
           </p:spPr>
@@ -38181,7 +38177,7 @@
           </a:ln>
           <a:extLst>
             <a:ext uri="{C572A759-6A51-4108-AA02-DFA0A04FC94B}">
-              <ma14:wrappingTextBoxFlag xmlns:ma14="http://schemas.microsoft.com/office/mac/drawingml/2011/main" xmlns:a14="http://schemas.microsoft.com/office/drawing/2010/main" xmlns:m="http://schemas.openxmlformats.org/officeDocument/2006/math" xmlns="" val="1"/>
+              <ma14:wrappingTextBoxFlag xmlns="" xmlns:m="http://schemas.openxmlformats.org/officeDocument/2006/math" xmlns:a14="http://schemas.microsoft.com/office/drawing/2010/main" xmlns:ma14="http://schemas.microsoft.com/office/mac/drawingml/2011/main" val="1"/>
             </a:ext>
           </a:extLst>
         </p:spPr>
@@ -38260,7 +38256,7 @@
           </a:ln>
           <a:extLst>
             <a:ext uri="{C572A759-6A51-4108-AA02-DFA0A04FC94B}">
-              <ma14:wrappingTextBoxFlag xmlns:ma14="http://schemas.microsoft.com/office/mac/drawingml/2011/main" xmlns:a14="http://schemas.microsoft.com/office/drawing/2010/main" xmlns:m="http://schemas.openxmlformats.org/officeDocument/2006/math" xmlns="" val="1"/>
+              <ma14:wrappingTextBoxFlag xmlns="" xmlns:m="http://schemas.openxmlformats.org/officeDocument/2006/math" xmlns:a14="http://schemas.microsoft.com/office/drawing/2010/main" xmlns:ma14="http://schemas.microsoft.com/office/mac/drawingml/2011/main" val="1"/>
             </a:ext>
           </a:extLst>
         </p:spPr>
@@ -39448,7 +39444,7 @@
             <a:effectLst/>
             <a:extLst>
               <a:ext uri="{C572A759-6A51-4108-AA02-DFA0A04FC94B}">
-                <ma14:wrappingTextBoxFlag xmlns:ma14="http://schemas.microsoft.com/office/mac/drawingml/2011/main" xmlns:a14="http://schemas.microsoft.com/office/drawing/2010/main" xmlns:m="http://schemas.openxmlformats.org/officeDocument/2006/math" xmlns="" val="1"/>
+                <ma14:wrappingTextBoxFlag xmlns="" xmlns:m="http://schemas.openxmlformats.org/officeDocument/2006/math" xmlns:a14="http://schemas.microsoft.com/office/drawing/2010/main" xmlns:ma14="http://schemas.microsoft.com/office/mac/drawingml/2011/main" val="1"/>
               </a:ext>
             </a:extLst>
           </p:spPr>
@@ -39500,7 +39496,7 @@
             <a:effectLst/>
             <a:extLst>
               <a:ext uri="{C572A759-6A51-4108-AA02-DFA0A04FC94B}">
-                <ma14:wrappingTextBoxFlag xmlns:ma14="http://schemas.microsoft.com/office/mac/drawingml/2011/main" xmlns:a14="http://schemas.microsoft.com/office/drawing/2010/main" xmlns:m="http://schemas.openxmlformats.org/officeDocument/2006/math" xmlns="" val="1"/>
+                <ma14:wrappingTextBoxFlag xmlns="" xmlns:m="http://schemas.openxmlformats.org/officeDocument/2006/math" xmlns:a14="http://schemas.microsoft.com/office/drawing/2010/main" xmlns:ma14="http://schemas.microsoft.com/office/mac/drawingml/2011/main" val="1"/>
               </a:ext>
             </a:extLst>
           </p:spPr>
@@ -40264,7 +40260,7 @@
             <a:effectLst/>
             <a:extLst>
               <a:ext uri="{C572A759-6A51-4108-AA02-DFA0A04FC94B}">
-                <ma14:wrappingTextBoxFlag xmlns:ma14="http://schemas.microsoft.com/office/mac/drawingml/2011/main" xmlns:a14="http://schemas.microsoft.com/office/drawing/2010/main" xmlns:m="http://schemas.openxmlformats.org/officeDocument/2006/math" xmlns="" val="1"/>
+                <ma14:wrappingTextBoxFlag xmlns="" xmlns:m="http://schemas.openxmlformats.org/officeDocument/2006/math" xmlns:a14="http://schemas.microsoft.com/office/drawing/2010/main" xmlns:ma14="http://schemas.microsoft.com/office/mac/drawingml/2011/main" val="1"/>
               </a:ext>
             </a:extLst>
           </p:spPr>
@@ -40321,7 +40317,7 @@
             <a:effectLst/>
             <a:extLst>
               <a:ext uri="{C572A759-6A51-4108-AA02-DFA0A04FC94B}">
-                <ma14:wrappingTextBoxFlag xmlns:ma14="http://schemas.microsoft.com/office/mac/drawingml/2011/main" xmlns:a14="http://schemas.microsoft.com/office/drawing/2010/main" xmlns:m="http://schemas.openxmlformats.org/officeDocument/2006/math" xmlns="" val="1"/>
+                <ma14:wrappingTextBoxFlag xmlns="" xmlns:m="http://schemas.openxmlformats.org/officeDocument/2006/math" xmlns:a14="http://schemas.microsoft.com/office/drawing/2010/main" xmlns:ma14="http://schemas.microsoft.com/office/mac/drawingml/2011/main" val="1"/>
               </a:ext>
             </a:extLst>
           </p:spPr>
@@ -40867,7 +40863,7 @@
           </a:ln>
           <a:extLst>
             <a:ext uri="{C572A759-6A51-4108-AA02-DFA0A04FC94B}">
-              <ma14:wrappingTextBoxFlag xmlns:ma14="http://schemas.microsoft.com/office/mac/drawingml/2011/main" xmlns:a14="http://schemas.microsoft.com/office/drawing/2010/main" xmlns:m="http://schemas.openxmlformats.org/officeDocument/2006/math" xmlns="" val="1"/>
+              <ma14:wrappingTextBoxFlag xmlns="" xmlns:m="http://schemas.openxmlformats.org/officeDocument/2006/math" xmlns:a14="http://schemas.microsoft.com/office/drawing/2010/main" xmlns:ma14="http://schemas.microsoft.com/office/mac/drawingml/2011/main" val="1"/>
             </a:ext>
           </a:extLst>
         </p:spPr>
@@ -40964,7 +40960,7 @@
           </a:ln>
           <a:extLst>
             <a:ext uri="{C572A759-6A51-4108-AA02-DFA0A04FC94B}">
-              <ma14:wrappingTextBoxFlag xmlns:ma14="http://schemas.microsoft.com/office/mac/drawingml/2011/main" xmlns:a14="http://schemas.microsoft.com/office/drawing/2010/main" xmlns:m="http://schemas.openxmlformats.org/officeDocument/2006/math" xmlns="" val="1"/>
+              <ma14:wrappingTextBoxFlag xmlns="" xmlns:m="http://schemas.openxmlformats.org/officeDocument/2006/math" xmlns:a14="http://schemas.microsoft.com/office/drawing/2010/main" xmlns:ma14="http://schemas.microsoft.com/office/mac/drawingml/2011/main" val="1"/>
             </a:ext>
           </a:extLst>
         </p:spPr>
@@ -41007,7 +41003,7 @@
           </a:ln>
           <a:extLst>
             <a:ext uri="{C572A759-6A51-4108-AA02-DFA0A04FC94B}">
-              <ma14:wrappingTextBoxFlag xmlns:ma14="http://schemas.microsoft.com/office/mac/drawingml/2011/main" xmlns:a14="http://schemas.microsoft.com/office/drawing/2010/main" xmlns:m="http://schemas.openxmlformats.org/officeDocument/2006/math" xmlns="" val="1"/>
+              <ma14:wrappingTextBoxFlag xmlns="" xmlns:m="http://schemas.openxmlformats.org/officeDocument/2006/math" xmlns:a14="http://schemas.microsoft.com/office/drawing/2010/main" xmlns:ma14="http://schemas.microsoft.com/office/mac/drawingml/2011/main" val="1"/>
             </a:ext>
           </a:extLst>
         </p:spPr>
@@ -41124,7 +41120,7 @@
           </a:ln>
           <a:extLst>
             <a:ext uri="{C572A759-6A51-4108-AA02-DFA0A04FC94B}">
-              <ma14:wrappingTextBoxFlag xmlns:ma14="http://schemas.microsoft.com/office/mac/drawingml/2011/main" xmlns:a14="http://schemas.microsoft.com/office/drawing/2010/main" xmlns:m="http://schemas.openxmlformats.org/officeDocument/2006/math" xmlns="" val="1"/>
+              <ma14:wrappingTextBoxFlag xmlns="" xmlns:m="http://schemas.openxmlformats.org/officeDocument/2006/math" xmlns:a14="http://schemas.microsoft.com/office/drawing/2010/main" xmlns:ma14="http://schemas.microsoft.com/office/mac/drawingml/2011/main" val="1"/>
             </a:ext>
           </a:extLst>
         </p:spPr>
@@ -41200,7 +41196,7 @@
           </a:ln>
           <a:extLst>
             <a:ext uri="{C572A759-6A51-4108-AA02-DFA0A04FC94B}">
-              <ma14:wrappingTextBoxFlag xmlns:ma14="http://schemas.microsoft.com/office/mac/drawingml/2011/main" xmlns:a14="http://schemas.microsoft.com/office/drawing/2010/main" xmlns:m="http://schemas.openxmlformats.org/officeDocument/2006/math" xmlns="" val="1"/>
+              <ma14:wrappingTextBoxFlag xmlns="" xmlns:m="http://schemas.openxmlformats.org/officeDocument/2006/math" xmlns:a14="http://schemas.microsoft.com/office/drawing/2010/main" xmlns:ma14="http://schemas.microsoft.com/office/mac/drawingml/2011/main" val="1"/>
             </a:ext>
           </a:extLst>
         </p:spPr>
@@ -41245,7 +41241,7 @@
           </a:ln>
           <a:extLst>
             <a:ext uri="{C572A759-6A51-4108-AA02-DFA0A04FC94B}">
-              <ma14:wrappingTextBoxFlag xmlns:ma14="http://schemas.microsoft.com/office/mac/drawingml/2011/main" xmlns:a14="http://schemas.microsoft.com/office/drawing/2010/main" xmlns:m="http://schemas.openxmlformats.org/officeDocument/2006/math" xmlns="" val="1"/>
+              <ma14:wrappingTextBoxFlag xmlns="" xmlns:m="http://schemas.openxmlformats.org/officeDocument/2006/math" xmlns:a14="http://schemas.microsoft.com/office/drawing/2010/main" xmlns:ma14="http://schemas.microsoft.com/office/mac/drawingml/2011/main" val="1"/>
             </a:ext>
           </a:extLst>
         </p:spPr>
@@ -41730,7 +41726,7 @@
           </a:ln>
           <a:extLst>
             <a:ext uri="{C572A759-6A51-4108-AA02-DFA0A04FC94B}">
-              <ma14:wrappingTextBoxFlag xmlns:ma14="http://schemas.microsoft.com/office/mac/drawingml/2011/main" xmlns:a14="http://schemas.microsoft.com/office/drawing/2010/main" xmlns:m="http://schemas.openxmlformats.org/officeDocument/2006/math" xmlns="" val="1"/>
+              <ma14:wrappingTextBoxFlag xmlns="" xmlns:m="http://schemas.openxmlformats.org/officeDocument/2006/math" xmlns:a14="http://schemas.microsoft.com/office/drawing/2010/main" xmlns:ma14="http://schemas.microsoft.com/office/mac/drawingml/2011/main" val="1"/>
             </a:ext>
           </a:extLst>
         </p:spPr>
@@ -41878,7 +41874,7 @@
           </a:ln>
           <a:extLst>
             <a:ext uri="{C572A759-6A51-4108-AA02-DFA0A04FC94B}">
-              <ma14:wrappingTextBoxFlag xmlns:ma14="http://schemas.microsoft.com/office/mac/drawingml/2011/main" xmlns:a14="http://schemas.microsoft.com/office/drawing/2010/main" xmlns:m="http://schemas.openxmlformats.org/officeDocument/2006/math" xmlns="" val="1"/>
+              <ma14:wrappingTextBoxFlag xmlns="" xmlns:m="http://schemas.openxmlformats.org/officeDocument/2006/math" xmlns:a14="http://schemas.microsoft.com/office/drawing/2010/main" xmlns:ma14="http://schemas.microsoft.com/office/mac/drawingml/2011/main" val="1"/>
             </a:ext>
           </a:extLst>
         </p:spPr>

</xml_diff>

<commit_message>
Fixed lag() typo and Relational Data title
</commit_message>
<xml_diff>
--- a/translations/portuguese/data-transformation_pt_br.pptx
+++ b/translations/portuguese/data-transformation_pt_br.pptx
@@ -2187,7 +2187,7 @@
           </a:ln>
           <a:extLst>
             <a:ext uri="{C572A759-6A51-4108-AA02-DFA0A04FC94B}">
-              <ma14:wrappingTextBoxFlag xmlns="" xmlns:m="http://schemas.openxmlformats.org/officeDocument/2006/math" xmlns:a14="http://schemas.microsoft.com/office/drawing/2010/main" xmlns:ma14="http://schemas.microsoft.com/office/mac/drawingml/2011/main" val="1"/>
+              <ma14:wrappingTextBoxFlag xmlns:ma14="http://schemas.microsoft.com/office/mac/drawingml/2011/main" xmlns:a14="http://schemas.microsoft.com/office/drawing/2010/main" xmlns:m="http://schemas.openxmlformats.org/officeDocument/2006/math" xmlns="" val="1"/>
             </a:ext>
           </a:extLst>
         </p:spPr>
@@ -2226,7 +2226,7 @@
           </a:ln>
           <a:extLst>
             <a:ext uri="{C572A759-6A51-4108-AA02-DFA0A04FC94B}">
-              <ma14:wrappingTextBoxFlag xmlns="" xmlns:m="http://schemas.openxmlformats.org/officeDocument/2006/math" xmlns:a14="http://schemas.microsoft.com/office/drawing/2010/main" xmlns:ma14="http://schemas.microsoft.com/office/mac/drawingml/2011/main" val="1"/>
+              <ma14:wrappingTextBoxFlag xmlns:ma14="http://schemas.microsoft.com/office/mac/drawingml/2011/main" xmlns:a14="http://schemas.microsoft.com/office/drawing/2010/main" xmlns:m="http://schemas.openxmlformats.org/officeDocument/2006/math" xmlns="" val="1"/>
             </a:ext>
           </a:extLst>
         </p:spPr>
@@ -4713,7 +4713,7 @@
           </a:ln>
           <a:extLst>
             <a:ext uri="{C572A759-6A51-4108-AA02-DFA0A04FC94B}">
-              <ma14:wrappingTextBoxFlag xmlns="" xmlns:m="http://schemas.openxmlformats.org/officeDocument/2006/math" xmlns:a14="http://schemas.microsoft.com/office/drawing/2010/main" xmlns:ma14="http://schemas.microsoft.com/office/mac/drawingml/2011/main" val="1"/>
+              <ma14:wrappingTextBoxFlag xmlns:ma14="http://schemas.microsoft.com/office/mac/drawingml/2011/main" xmlns:a14="http://schemas.microsoft.com/office/drawing/2010/main" xmlns:m="http://schemas.openxmlformats.org/officeDocument/2006/math" xmlns="" val="1"/>
             </a:ext>
           </a:extLst>
         </p:spPr>
@@ -4763,7 +4763,7 @@
           </a:ln>
           <a:extLst>
             <a:ext uri="{C572A759-6A51-4108-AA02-DFA0A04FC94B}">
-              <ma14:wrappingTextBoxFlag xmlns="" xmlns:m="http://schemas.openxmlformats.org/officeDocument/2006/math" xmlns:a14="http://schemas.microsoft.com/office/drawing/2010/main" xmlns:ma14="http://schemas.microsoft.com/office/mac/drawingml/2011/main" val="1"/>
+              <ma14:wrappingTextBoxFlag xmlns:ma14="http://schemas.microsoft.com/office/mac/drawingml/2011/main" xmlns:a14="http://schemas.microsoft.com/office/drawing/2010/main" xmlns:m="http://schemas.openxmlformats.org/officeDocument/2006/math" xmlns="" val="1"/>
             </a:ext>
           </a:extLst>
         </p:spPr>
@@ -4936,7 +4936,7 @@
           </a:ln>
           <a:extLst>
             <a:ext uri="{C572A759-6A51-4108-AA02-DFA0A04FC94B}">
-              <ma14:wrappingTextBoxFlag xmlns="" xmlns:m="http://schemas.openxmlformats.org/officeDocument/2006/math" xmlns:a14="http://schemas.microsoft.com/office/drawing/2010/main" xmlns:ma14="http://schemas.microsoft.com/office/mac/drawingml/2011/main" val="1"/>
+              <ma14:wrappingTextBoxFlag xmlns:ma14="http://schemas.microsoft.com/office/mac/drawingml/2011/main" xmlns:a14="http://schemas.microsoft.com/office/drawing/2010/main" xmlns:m="http://schemas.openxmlformats.org/officeDocument/2006/math" xmlns="" val="1"/>
             </a:ext>
           </a:extLst>
         </p:spPr>
@@ -5047,7 +5047,7 @@
           </a:ln>
           <a:extLst>
             <a:ext uri="{C572A759-6A51-4108-AA02-DFA0A04FC94B}">
-              <ma14:wrappingTextBoxFlag xmlns="" xmlns:m="http://schemas.openxmlformats.org/officeDocument/2006/math" xmlns:a14="http://schemas.microsoft.com/office/drawing/2010/main" xmlns:ma14="http://schemas.microsoft.com/office/mac/drawingml/2011/main" val="1"/>
+              <ma14:wrappingTextBoxFlag xmlns:ma14="http://schemas.microsoft.com/office/mac/drawingml/2011/main" xmlns:a14="http://schemas.microsoft.com/office/drawing/2010/main" xmlns:m="http://schemas.openxmlformats.org/officeDocument/2006/math" xmlns="" val="1"/>
             </a:ext>
           </a:extLst>
         </p:spPr>
@@ -5157,7 +5157,7 @@
           </a:ln>
           <a:extLst>
             <a:ext uri="{C572A759-6A51-4108-AA02-DFA0A04FC94B}">
-              <ma14:wrappingTextBoxFlag xmlns="" xmlns:m="http://schemas.openxmlformats.org/officeDocument/2006/math" xmlns:a14="http://schemas.microsoft.com/office/drawing/2010/main" xmlns:ma14="http://schemas.microsoft.com/office/mac/drawingml/2011/main" val="1"/>
+              <ma14:wrappingTextBoxFlag xmlns:ma14="http://schemas.microsoft.com/office/mac/drawingml/2011/main" xmlns:a14="http://schemas.microsoft.com/office/drawing/2010/main" xmlns:m="http://schemas.openxmlformats.org/officeDocument/2006/math" xmlns="" val="1"/>
             </a:ext>
           </a:extLst>
         </p:spPr>
@@ -5483,7 +5483,7 @@
           </a:ln>
           <a:extLst>
             <a:ext uri="{C572A759-6A51-4108-AA02-DFA0A04FC94B}">
-              <ma14:wrappingTextBoxFlag xmlns="" xmlns:m="http://schemas.openxmlformats.org/officeDocument/2006/math" xmlns:a14="http://schemas.microsoft.com/office/drawing/2010/main" xmlns:ma14="http://schemas.microsoft.com/office/mac/drawingml/2011/main" val="1"/>
+              <ma14:wrappingTextBoxFlag xmlns:ma14="http://schemas.microsoft.com/office/mac/drawingml/2011/main" xmlns:a14="http://schemas.microsoft.com/office/drawing/2010/main" xmlns:m="http://schemas.openxmlformats.org/officeDocument/2006/math" xmlns="" val="1"/>
             </a:ext>
           </a:extLst>
         </p:spPr>
@@ -5616,7 +5616,7 @@
           </a:ln>
           <a:extLst>
             <a:ext uri="{C572A759-6A51-4108-AA02-DFA0A04FC94B}">
-              <ma14:wrappingTextBoxFlag xmlns="" xmlns:m="http://schemas.openxmlformats.org/officeDocument/2006/math" xmlns:a14="http://schemas.microsoft.com/office/drawing/2010/main" xmlns:ma14="http://schemas.microsoft.com/office/mac/drawingml/2011/main" val="1"/>
+              <ma14:wrappingTextBoxFlag xmlns:ma14="http://schemas.microsoft.com/office/mac/drawingml/2011/main" xmlns:a14="http://schemas.microsoft.com/office/drawing/2010/main" xmlns:m="http://schemas.openxmlformats.org/officeDocument/2006/math" xmlns="" val="1"/>
             </a:ext>
           </a:extLst>
         </p:spPr>
@@ -5671,7 +5671,7 @@
           </a:ln>
           <a:extLst>
             <a:ext uri="{C572A759-6A51-4108-AA02-DFA0A04FC94B}">
-              <ma14:wrappingTextBoxFlag xmlns="" xmlns:m="http://schemas.openxmlformats.org/officeDocument/2006/math" xmlns:a14="http://schemas.microsoft.com/office/drawing/2010/main" xmlns:ma14="http://schemas.microsoft.com/office/mac/drawingml/2011/main" val="1"/>
+              <ma14:wrappingTextBoxFlag xmlns:ma14="http://schemas.microsoft.com/office/mac/drawingml/2011/main" xmlns:a14="http://schemas.microsoft.com/office/drawing/2010/main" xmlns:m="http://schemas.openxmlformats.org/officeDocument/2006/math" xmlns="" val="1"/>
             </a:ext>
           </a:extLst>
         </p:spPr>
@@ -5726,7 +5726,7 @@
           </a:ln>
           <a:extLst>
             <a:ext uri="{C572A759-6A51-4108-AA02-DFA0A04FC94B}">
-              <ma14:wrappingTextBoxFlag xmlns="" xmlns:m="http://schemas.openxmlformats.org/officeDocument/2006/math" xmlns:a14="http://schemas.microsoft.com/office/drawing/2010/main" xmlns:ma14="http://schemas.microsoft.com/office/mac/drawingml/2011/main" val="1"/>
+              <ma14:wrappingTextBoxFlag xmlns:ma14="http://schemas.microsoft.com/office/mac/drawingml/2011/main" xmlns:a14="http://schemas.microsoft.com/office/drawing/2010/main" xmlns:m="http://schemas.openxmlformats.org/officeDocument/2006/math" xmlns="" val="1"/>
             </a:ext>
           </a:extLst>
         </p:spPr>
@@ -5774,7 +5774,7 @@
           </a:ln>
           <a:extLst>
             <a:ext uri="{C572A759-6A51-4108-AA02-DFA0A04FC94B}">
-              <ma14:wrappingTextBoxFlag xmlns="" xmlns:m="http://schemas.openxmlformats.org/officeDocument/2006/math" xmlns:a14="http://schemas.microsoft.com/office/drawing/2010/main" xmlns:ma14="http://schemas.microsoft.com/office/mac/drawingml/2011/main" val="1"/>
+              <ma14:wrappingTextBoxFlag xmlns:ma14="http://schemas.microsoft.com/office/mac/drawingml/2011/main" xmlns:a14="http://schemas.microsoft.com/office/drawing/2010/main" xmlns:m="http://schemas.openxmlformats.org/officeDocument/2006/math" xmlns="" val="1"/>
             </a:ext>
           </a:extLst>
         </p:spPr>
@@ -5817,7 +5817,7 @@
                 <a:cs typeface="+mj-cs"/>
                 <a:sym typeface="Source Sans Pro Regular"/>
               </a:rPr>
-              <a:t>dyplr</a:t>
+              <a:t>dplyr</a:t>
             </a:r>
             <a:r>
               <a:rPr lang="pt-BR" dirty="0">
@@ -5896,7 +5896,7 @@
           </a:ln>
           <a:extLst>
             <a:ext uri="{C572A759-6A51-4108-AA02-DFA0A04FC94B}">
-              <ma14:wrappingTextBoxFlag xmlns="" xmlns:m="http://schemas.openxmlformats.org/officeDocument/2006/math" xmlns:a14="http://schemas.microsoft.com/office/drawing/2010/main" xmlns:ma14="http://schemas.microsoft.com/office/mac/drawingml/2011/main" val="1"/>
+              <ma14:wrappingTextBoxFlag xmlns:ma14="http://schemas.microsoft.com/office/mac/drawingml/2011/main" xmlns:a14="http://schemas.microsoft.com/office/drawing/2010/main" xmlns:m="http://schemas.openxmlformats.org/officeDocument/2006/math" xmlns="" val="1"/>
             </a:ext>
           </a:extLst>
         </p:spPr>
@@ -5951,7 +5951,7 @@
           </a:ln>
           <a:extLst>
             <a:ext uri="{C572A759-6A51-4108-AA02-DFA0A04FC94B}">
-              <ma14:wrappingTextBoxFlag xmlns="" xmlns:m="http://schemas.openxmlformats.org/officeDocument/2006/math" xmlns:a14="http://schemas.microsoft.com/office/drawing/2010/main" xmlns:ma14="http://schemas.microsoft.com/office/mac/drawingml/2011/main" val="1"/>
+              <ma14:wrappingTextBoxFlag xmlns:ma14="http://schemas.microsoft.com/office/mac/drawingml/2011/main" xmlns:a14="http://schemas.microsoft.com/office/drawing/2010/main" xmlns:m="http://schemas.openxmlformats.org/officeDocument/2006/math" xmlns="" val="1"/>
             </a:ext>
           </a:extLst>
         </p:spPr>
@@ -6088,7 +6088,7 @@
           </a:ln>
           <a:extLst>
             <a:ext uri="{C572A759-6A51-4108-AA02-DFA0A04FC94B}">
-              <ma14:wrappingTextBoxFlag xmlns="" xmlns:m="http://schemas.openxmlformats.org/officeDocument/2006/math" xmlns:a14="http://schemas.microsoft.com/office/drawing/2010/main" xmlns:ma14="http://schemas.microsoft.com/office/mac/drawingml/2011/main" val="1"/>
+              <ma14:wrappingTextBoxFlag xmlns:ma14="http://schemas.microsoft.com/office/mac/drawingml/2011/main" xmlns:a14="http://schemas.microsoft.com/office/drawing/2010/main" xmlns:m="http://schemas.openxmlformats.org/officeDocument/2006/math" xmlns="" val="1"/>
             </a:ext>
           </a:extLst>
         </p:spPr>
@@ -6943,7 +6943,7 @@
           </a:ln>
           <a:extLst>
             <a:ext uri="{C572A759-6A51-4108-AA02-DFA0A04FC94B}">
-              <ma14:wrappingTextBoxFlag xmlns="" xmlns:m="http://schemas.openxmlformats.org/officeDocument/2006/math" xmlns:a14="http://schemas.microsoft.com/office/drawing/2010/main" xmlns:ma14="http://schemas.microsoft.com/office/mac/drawingml/2011/main" val="1"/>
+              <ma14:wrappingTextBoxFlag xmlns:ma14="http://schemas.microsoft.com/office/mac/drawingml/2011/main" xmlns:a14="http://schemas.microsoft.com/office/drawing/2010/main" xmlns:m="http://schemas.openxmlformats.org/officeDocument/2006/math" xmlns="" val="1"/>
             </a:ext>
           </a:extLst>
         </p:spPr>
@@ -6997,7 +6997,7 @@
           </a:ln>
           <a:extLst>
             <a:ext uri="{C572A759-6A51-4108-AA02-DFA0A04FC94B}">
-              <ma14:wrappingTextBoxFlag xmlns="" xmlns:m="http://schemas.openxmlformats.org/officeDocument/2006/math" xmlns:a14="http://schemas.microsoft.com/office/drawing/2010/main" xmlns:ma14="http://schemas.microsoft.com/office/mac/drawingml/2011/main" val="1"/>
+              <ma14:wrappingTextBoxFlag xmlns:ma14="http://schemas.microsoft.com/office/mac/drawingml/2011/main" xmlns:a14="http://schemas.microsoft.com/office/drawing/2010/main" xmlns:m="http://schemas.openxmlformats.org/officeDocument/2006/math" xmlns="" val="1"/>
             </a:ext>
           </a:extLst>
         </p:spPr>
@@ -7088,7 +7088,7 @@
           </a:ln>
           <a:extLst>
             <a:ext uri="{C572A759-6A51-4108-AA02-DFA0A04FC94B}">
-              <ma14:wrappingTextBoxFlag xmlns="" xmlns:m="http://schemas.openxmlformats.org/officeDocument/2006/math" xmlns:a14="http://schemas.microsoft.com/office/drawing/2010/main" xmlns:ma14="http://schemas.microsoft.com/office/mac/drawingml/2011/main" val="1"/>
+              <ma14:wrappingTextBoxFlag xmlns:ma14="http://schemas.microsoft.com/office/mac/drawingml/2011/main" xmlns:a14="http://schemas.microsoft.com/office/drawing/2010/main" xmlns:m="http://schemas.openxmlformats.org/officeDocument/2006/math" xmlns="" val="1"/>
             </a:ext>
           </a:extLst>
         </p:spPr>
@@ -7273,7 +7273,7 @@
           </a:ln>
           <a:extLst>
             <a:ext uri="{C572A759-6A51-4108-AA02-DFA0A04FC94B}">
-              <ma14:wrappingTextBoxFlag xmlns="" xmlns:m="http://schemas.openxmlformats.org/officeDocument/2006/math" xmlns:a14="http://schemas.microsoft.com/office/drawing/2010/main" xmlns:ma14="http://schemas.microsoft.com/office/mac/drawingml/2011/main" val="1"/>
+              <ma14:wrappingTextBoxFlag xmlns:ma14="http://schemas.microsoft.com/office/mac/drawingml/2011/main" xmlns:a14="http://schemas.microsoft.com/office/drawing/2010/main" xmlns:m="http://schemas.openxmlformats.org/officeDocument/2006/math" xmlns="" val="1"/>
             </a:ext>
           </a:extLst>
         </p:spPr>
@@ -7414,7 +7414,7 @@
           </a:ln>
           <a:extLst>
             <a:ext uri="{C572A759-6A51-4108-AA02-DFA0A04FC94B}">
-              <ma14:wrappingTextBoxFlag xmlns="" xmlns:m="http://schemas.openxmlformats.org/officeDocument/2006/math" xmlns:a14="http://schemas.microsoft.com/office/drawing/2010/main" xmlns:ma14="http://schemas.microsoft.com/office/mac/drawingml/2011/main" val="1"/>
+              <ma14:wrappingTextBoxFlag xmlns:ma14="http://schemas.microsoft.com/office/mac/drawingml/2011/main" xmlns:a14="http://schemas.microsoft.com/office/drawing/2010/main" xmlns:m="http://schemas.openxmlformats.org/officeDocument/2006/math" xmlns="" val="1"/>
             </a:ext>
           </a:extLst>
         </p:spPr>
@@ -7464,7 +7464,7 @@
           </a:ln>
           <a:extLst>
             <a:ext uri="{C572A759-6A51-4108-AA02-DFA0A04FC94B}">
-              <ma14:wrappingTextBoxFlag xmlns="" xmlns:m="http://schemas.openxmlformats.org/officeDocument/2006/math" xmlns:a14="http://schemas.microsoft.com/office/drawing/2010/main" xmlns:ma14="http://schemas.microsoft.com/office/mac/drawingml/2011/main" val="1"/>
+              <ma14:wrappingTextBoxFlag xmlns:ma14="http://schemas.microsoft.com/office/mac/drawingml/2011/main" xmlns:a14="http://schemas.microsoft.com/office/drawing/2010/main" xmlns:m="http://schemas.openxmlformats.org/officeDocument/2006/math" xmlns="" val="1"/>
             </a:ext>
           </a:extLst>
         </p:spPr>
@@ -7514,7 +7514,7 @@
           </a:ln>
           <a:extLst>
             <a:ext uri="{C572A759-6A51-4108-AA02-DFA0A04FC94B}">
-              <ma14:wrappingTextBoxFlag xmlns="" xmlns:m="http://schemas.openxmlformats.org/officeDocument/2006/math" xmlns:a14="http://schemas.microsoft.com/office/drawing/2010/main" xmlns:ma14="http://schemas.microsoft.com/office/mac/drawingml/2011/main" val="1"/>
+              <ma14:wrappingTextBoxFlag xmlns:ma14="http://schemas.microsoft.com/office/mac/drawingml/2011/main" xmlns:a14="http://schemas.microsoft.com/office/drawing/2010/main" xmlns:m="http://schemas.openxmlformats.org/officeDocument/2006/math" xmlns="" val="1"/>
             </a:ext>
           </a:extLst>
         </p:spPr>
@@ -7559,7 +7559,7 @@
           </a:ln>
           <a:extLst>
             <a:ext uri="{C572A759-6A51-4108-AA02-DFA0A04FC94B}">
-              <ma14:wrappingTextBoxFlag xmlns="" xmlns:m="http://schemas.openxmlformats.org/officeDocument/2006/math" xmlns:a14="http://schemas.microsoft.com/office/drawing/2010/main" xmlns:ma14="http://schemas.microsoft.com/office/mac/drawingml/2011/main" val="1"/>
+              <ma14:wrappingTextBoxFlag xmlns:ma14="http://schemas.microsoft.com/office/mac/drawingml/2011/main" xmlns:a14="http://schemas.microsoft.com/office/drawing/2010/main" xmlns:m="http://schemas.openxmlformats.org/officeDocument/2006/math" xmlns="" val="1"/>
             </a:ext>
           </a:extLst>
         </p:spPr>
@@ -7614,7 +7614,7 @@
           </a:ln>
           <a:extLst>
             <a:ext uri="{C572A759-6A51-4108-AA02-DFA0A04FC94B}">
-              <ma14:wrappingTextBoxFlag xmlns="" xmlns:m="http://schemas.openxmlformats.org/officeDocument/2006/math" xmlns:a14="http://schemas.microsoft.com/office/drawing/2010/main" xmlns:ma14="http://schemas.microsoft.com/office/mac/drawingml/2011/main" val="1"/>
+              <ma14:wrappingTextBoxFlag xmlns:ma14="http://schemas.microsoft.com/office/mac/drawingml/2011/main" xmlns:a14="http://schemas.microsoft.com/office/drawing/2010/main" xmlns:m="http://schemas.openxmlformats.org/officeDocument/2006/math" xmlns="" val="1"/>
             </a:ext>
           </a:extLst>
         </p:spPr>
@@ -7663,7 +7663,7 @@
           </a:ln>
           <a:extLst>
             <a:ext uri="{C572A759-6A51-4108-AA02-DFA0A04FC94B}">
-              <ma14:wrappingTextBoxFlag xmlns="" xmlns:m="http://schemas.openxmlformats.org/officeDocument/2006/math" xmlns:a14="http://schemas.microsoft.com/office/drawing/2010/main" xmlns:ma14="http://schemas.microsoft.com/office/mac/drawingml/2011/main" val="1"/>
+              <ma14:wrappingTextBoxFlag xmlns:ma14="http://schemas.microsoft.com/office/mac/drawingml/2011/main" xmlns:a14="http://schemas.microsoft.com/office/drawing/2010/main" xmlns:m="http://schemas.openxmlformats.org/officeDocument/2006/math" xmlns="" val="1"/>
             </a:ext>
           </a:extLst>
         </p:spPr>
@@ -7782,7 +7782,7 @@
           </a:ln>
           <a:extLst>
             <a:ext uri="{C572A759-6A51-4108-AA02-DFA0A04FC94B}">
-              <ma14:wrappingTextBoxFlag xmlns="" xmlns:m="http://schemas.openxmlformats.org/officeDocument/2006/math" xmlns:a14="http://schemas.microsoft.com/office/drawing/2010/main" xmlns:ma14="http://schemas.microsoft.com/office/mac/drawingml/2011/main" val="1"/>
+              <ma14:wrappingTextBoxFlag xmlns:ma14="http://schemas.microsoft.com/office/mac/drawingml/2011/main" xmlns:a14="http://schemas.microsoft.com/office/drawing/2010/main" xmlns:m="http://schemas.openxmlformats.org/officeDocument/2006/math" xmlns="" val="1"/>
             </a:ext>
           </a:extLst>
         </p:spPr>
@@ -7836,7 +7836,7 @@
           </a:ln>
           <a:extLst>
             <a:ext uri="{C572A759-6A51-4108-AA02-DFA0A04FC94B}">
-              <ma14:wrappingTextBoxFlag xmlns="" xmlns:m="http://schemas.openxmlformats.org/officeDocument/2006/math" xmlns:a14="http://schemas.microsoft.com/office/drawing/2010/main" xmlns:ma14="http://schemas.microsoft.com/office/mac/drawingml/2011/main" val="1"/>
+              <ma14:wrappingTextBoxFlag xmlns:ma14="http://schemas.microsoft.com/office/mac/drawingml/2011/main" xmlns:a14="http://schemas.microsoft.com/office/drawing/2010/main" xmlns:m="http://schemas.openxmlformats.org/officeDocument/2006/math" xmlns="" val="1"/>
             </a:ext>
           </a:extLst>
         </p:spPr>
@@ -7950,7 +7950,7 @@
           </a:ln>
           <a:extLst>
             <a:ext uri="{C572A759-6A51-4108-AA02-DFA0A04FC94B}">
-              <ma14:wrappingTextBoxFlag xmlns="" xmlns:m="http://schemas.openxmlformats.org/officeDocument/2006/math" xmlns:a14="http://schemas.microsoft.com/office/drawing/2010/main" xmlns:ma14="http://schemas.microsoft.com/office/mac/drawingml/2011/main" val="1"/>
+              <ma14:wrappingTextBoxFlag xmlns:ma14="http://schemas.microsoft.com/office/mac/drawingml/2011/main" xmlns:a14="http://schemas.microsoft.com/office/drawing/2010/main" xmlns:m="http://schemas.openxmlformats.org/officeDocument/2006/math" xmlns="" val="1"/>
             </a:ext>
           </a:extLst>
         </p:spPr>
@@ -8064,7 +8064,7 @@
           </a:ln>
           <a:extLst>
             <a:ext uri="{C572A759-6A51-4108-AA02-DFA0A04FC94B}">
-              <ma14:wrappingTextBoxFlag xmlns="" xmlns:m="http://schemas.openxmlformats.org/officeDocument/2006/math" xmlns:a14="http://schemas.microsoft.com/office/drawing/2010/main" xmlns:ma14="http://schemas.microsoft.com/office/mac/drawingml/2011/main" val="1"/>
+              <ma14:wrappingTextBoxFlag xmlns:ma14="http://schemas.microsoft.com/office/mac/drawingml/2011/main" xmlns:a14="http://schemas.microsoft.com/office/drawing/2010/main" xmlns:m="http://schemas.openxmlformats.org/officeDocument/2006/math" xmlns="" val="1"/>
             </a:ext>
           </a:extLst>
         </p:spPr>
@@ -8190,7 +8190,7 @@
           </a:ln>
           <a:extLst>
             <a:ext uri="{C572A759-6A51-4108-AA02-DFA0A04FC94B}">
-              <ma14:wrappingTextBoxFlag xmlns="" xmlns:m="http://schemas.openxmlformats.org/officeDocument/2006/math" xmlns:a14="http://schemas.microsoft.com/office/drawing/2010/main" xmlns:ma14="http://schemas.microsoft.com/office/mac/drawingml/2011/main" val="1"/>
+              <ma14:wrappingTextBoxFlag xmlns:ma14="http://schemas.microsoft.com/office/mac/drawingml/2011/main" xmlns:a14="http://schemas.microsoft.com/office/drawing/2010/main" xmlns:m="http://schemas.openxmlformats.org/officeDocument/2006/math" xmlns="" val="1"/>
             </a:ext>
           </a:extLst>
         </p:spPr>
@@ -8564,7 +8564,7 @@
           </a:ln>
           <a:extLst>
             <a:ext uri="{C572A759-6A51-4108-AA02-DFA0A04FC94B}">
-              <ma14:wrappingTextBoxFlag xmlns="" xmlns:m="http://schemas.openxmlformats.org/officeDocument/2006/math" xmlns:a14="http://schemas.microsoft.com/office/drawing/2010/main" xmlns:ma14="http://schemas.microsoft.com/office/mac/drawingml/2011/main" val="1"/>
+              <ma14:wrappingTextBoxFlag xmlns:ma14="http://schemas.microsoft.com/office/mac/drawingml/2011/main" xmlns:a14="http://schemas.microsoft.com/office/drawing/2010/main" xmlns:m="http://schemas.openxmlformats.org/officeDocument/2006/math" xmlns="" val="1"/>
             </a:ext>
           </a:extLst>
         </p:spPr>
@@ -8614,7 +8614,7 @@
           </a:ln>
           <a:extLst>
             <a:ext uri="{C572A759-6A51-4108-AA02-DFA0A04FC94B}">
-              <ma14:wrappingTextBoxFlag xmlns="" xmlns:m="http://schemas.openxmlformats.org/officeDocument/2006/math" xmlns:a14="http://schemas.microsoft.com/office/drawing/2010/main" xmlns:ma14="http://schemas.microsoft.com/office/mac/drawingml/2011/main" val="1"/>
+              <ma14:wrappingTextBoxFlag xmlns:ma14="http://schemas.microsoft.com/office/mac/drawingml/2011/main" xmlns:a14="http://schemas.microsoft.com/office/drawing/2010/main" xmlns:m="http://schemas.openxmlformats.org/officeDocument/2006/math" xmlns="" val="1"/>
             </a:ext>
           </a:extLst>
         </p:spPr>
@@ -8722,7 +8722,7 @@
           </a:ln>
           <a:extLst>
             <a:ext uri="{C572A759-6A51-4108-AA02-DFA0A04FC94B}">
-              <ma14:wrappingTextBoxFlag xmlns="" xmlns:m="http://schemas.openxmlformats.org/officeDocument/2006/math" xmlns:a14="http://schemas.microsoft.com/office/drawing/2010/main" xmlns:ma14="http://schemas.microsoft.com/office/mac/drawingml/2011/main" val="1"/>
+              <ma14:wrappingTextBoxFlag xmlns:ma14="http://schemas.microsoft.com/office/mac/drawingml/2011/main" xmlns:a14="http://schemas.microsoft.com/office/drawing/2010/main" xmlns:m="http://schemas.openxmlformats.org/officeDocument/2006/math" xmlns="" val="1"/>
             </a:ext>
           </a:extLst>
         </p:spPr>
@@ -8791,7 +8791,7 @@
           </a:ln>
           <a:extLst>
             <a:ext uri="{C572A759-6A51-4108-AA02-DFA0A04FC94B}">
-              <ma14:wrappingTextBoxFlag xmlns="" xmlns:m="http://schemas.openxmlformats.org/officeDocument/2006/math" xmlns:a14="http://schemas.microsoft.com/office/drawing/2010/main" xmlns:ma14="http://schemas.microsoft.com/office/mac/drawingml/2011/main" val="1"/>
+              <ma14:wrappingTextBoxFlag xmlns:ma14="http://schemas.microsoft.com/office/mac/drawingml/2011/main" xmlns:a14="http://schemas.microsoft.com/office/drawing/2010/main" xmlns:m="http://schemas.openxmlformats.org/officeDocument/2006/math" xmlns="" val="1"/>
             </a:ext>
           </a:extLst>
         </p:spPr>
@@ -9241,7 +9241,7 @@
           </a:ln>
           <a:extLst>
             <a:ext uri="{C572A759-6A51-4108-AA02-DFA0A04FC94B}">
-              <ma14:wrappingTextBoxFlag xmlns="" xmlns:m="http://schemas.openxmlformats.org/officeDocument/2006/math" xmlns:a14="http://schemas.microsoft.com/office/drawing/2010/main" xmlns:ma14="http://schemas.microsoft.com/office/mac/drawingml/2011/main" val="1"/>
+              <ma14:wrappingTextBoxFlag xmlns:ma14="http://schemas.microsoft.com/office/mac/drawingml/2011/main" xmlns:a14="http://schemas.microsoft.com/office/drawing/2010/main" xmlns:m="http://schemas.openxmlformats.org/officeDocument/2006/math" xmlns="" val="1"/>
             </a:ext>
           </a:extLst>
         </p:spPr>
@@ -9286,7 +9286,7 @@
           </a:ln>
           <a:extLst>
             <a:ext uri="{C572A759-6A51-4108-AA02-DFA0A04FC94B}">
-              <ma14:wrappingTextBoxFlag xmlns="" xmlns:m="http://schemas.openxmlformats.org/officeDocument/2006/math" xmlns:a14="http://schemas.microsoft.com/office/drawing/2010/main" xmlns:ma14="http://schemas.microsoft.com/office/mac/drawingml/2011/main" val="1"/>
+              <ma14:wrappingTextBoxFlag xmlns:ma14="http://schemas.microsoft.com/office/mac/drawingml/2011/main" xmlns:a14="http://schemas.microsoft.com/office/drawing/2010/main" xmlns:m="http://schemas.openxmlformats.org/officeDocument/2006/math" xmlns="" val="1"/>
             </a:ext>
           </a:extLst>
         </p:spPr>
@@ -9746,7 +9746,7 @@
           </a:ln>
           <a:extLst>
             <a:ext uri="{C572A759-6A51-4108-AA02-DFA0A04FC94B}">
-              <ma14:wrappingTextBoxFlag xmlns="" xmlns:m="http://schemas.openxmlformats.org/officeDocument/2006/math" xmlns:a14="http://schemas.microsoft.com/office/drawing/2010/main" xmlns:ma14="http://schemas.microsoft.com/office/mac/drawingml/2011/main" val="1"/>
+              <ma14:wrappingTextBoxFlag xmlns:ma14="http://schemas.microsoft.com/office/mac/drawingml/2011/main" xmlns:a14="http://schemas.microsoft.com/office/drawing/2010/main" xmlns:m="http://schemas.openxmlformats.org/officeDocument/2006/math" xmlns="" val="1"/>
             </a:ext>
           </a:extLst>
         </p:spPr>
@@ -9828,7 +9828,7 @@
           </a:ln>
           <a:extLst>
             <a:ext uri="{C572A759-6A51-4108-AA02-DFA0A04FC94B}">
-              <ma14:wrappingTextBoxFlag xmlns="" xmlns:m="http://schemas.openxmlformats.org/officeDocument/2006/math" xmlns:a14="http://schemas.microsoft.com/office/drawing/2010/main" xmlns:ma14="http://schemas.microsoft.com/office/mac/drawingml/2011/main" val="1"/>
+              <ma14:wrappingTextBoxFlag xmlns:ma14="http://schemas.microsoft.com/office/mac/drawingml/2011/main" xmlns:a14="http://schemas.microsoft.com/office/drawing/2010/main" xmlns:m="http://schemas.openxmlformats.org/officeDocument/2006/math" xmlns="" val="1"/>
             </a:ext>
           </a:extLst>
         </p:spPr>
@@ -9951,10 +9951,10 @@
         </p:nvGrpSpPr>
         <p:grpSpPr>
           <a:xfrm>
-            <a:off x="1691693" y="2003916"/>
-            <a:ext cx="342906" cy="232054"/>
-            <a:chOff x="-1" y="-1"/>
-            <a:chExt cx="342905" cy="232053"/>
+            <a:off x="1691692" y="2003915"/>
+            <a:ext cx="342907" cy="232056"/>
+            <a:chOff x="-2" y="-2"/>
+            <a:chExt cx="342906" cy="232055"/>
           </a:xfrm>
         </p:grpSpPr>
         <p:sp>
@@ -10295,7 +10295,7 @@
           </a:ln>
           <a:extLst>
             <a:ext uri="{C572A759-6A51-4108-AA02-DFA0A04FC94B}">
-              <ma14:wrappingTextBoxFlag xmlns="" xmlns:m="http://schemas.openxmlformats.org/officeDocument/2006/math" xmlns:a14="http://schemas.microsoft.com/office/drawing/2010/main" xmlns:ma14="http://schemas.microsoft.com/office/mac/drawingml/2011/main" val="1"/>
+              <ma14:wrappingTextBoxFlag xmlns:ma14="http://schemas.microsoft.com/office/mac/drawingml/2011/main" xmlns:a14="http://schemas.microsoft.com/office/drawing/2010/main" xmlns:m="http://schemas.openxmlformats.org/officeDocument/2006/math" xmlns="" val="1"/>
             </a:ext>
           </a:extLst>
         </p:spPr>
@@ -10344,7 +10344,7 @@
           </a:ln>
           <a:extLst>
             <a:ext uri="{C572A759-6A51-4108-AA02-DFA0A04FC94B}">
-              <ma14:wrappingTextBoxFlag xmlns="" xmlns:m="http://schemas.openxmlformats.org/officeDocument/2006/math" xmlns:a14="http://schemas.microsoft.com/office/drawing/2010/main" xmlns:ma14="http://schemas.microsoft.com/office/mac/drawingml/2011/main" val="1"/>
+              <ma14:wrappingTextBoxFlag xmlns:ma14="http://schemas.microsoft.com/office/mac/drawingml/2011/main" xmlns:a14="http://schemas.microsoft.com/office/drawing/2010/main" xmlns:m="http://schemas.openxmlformats.org/officeDocument/2006/math" xmlns="" val="1"/>
             </a:ext>
           </a:extLst>
         </p:spPr>
@@ -10685,7 +10685,7 @@
           </a:ln>
           <a:extLst>
             <a:ext uri="{C572A759-6A51-4108-AA02-DFA0A04FC94B}">
-              <ma14:wrappingTextBoxFlag xmlns="" xmlns:m="http://schemas.openxmlformats.org/officeDocument/2006/math" xmlns:a14="http://schemas.microsoft.com/office/drawing/2010/main" xmlns:ma14="http://schemas.microsoft.com/office/mac/drawingml/2011/main" val="1"/>
+              <ma14:wrappingTextBoxFlag xmlns:ma14="http://schemas.microsoft.com/office/mac/drawingml/2011/main" xmlns:a14="http://schemas.microsoft.com/office/drawing/2010/main" xmlns:m="http://schemas.openxmlformats.org/officeDocument/2006/math" xmlns="" val="1"/>
             </a:ext>
           </a:extLst>
         </p:spPr>
@@ -10961,7 +10961,7 @@
           </a:ln>
           <a:extLst>
             <a:ext uri="{C572A759-6A51-4108-AA02-DFA0A04FC94B}">
-              <ma14:wrappingTextBoxFlag xmlns="" xmlns:m="http://schemas.openxmlformats.org/officeDocument/2006/math" xmlns:a14="http://schemas.microsoft.com/office/drawing/2010/main" xmlns:ma14="http://schemas.microsoft.com/office/mac/drawingml/2011/main" val="1"/>
+              <ma14:wrappingTextBoxFlag xmlns:ma14="http://schemas.microsoft.com/office/mac/drawingml/2011/main" xmlns:a14="http://schemas.microsoft.com/office/drawing/2010/main" xmlns:m="http://schemas.openxmlformats.org/officeDocument/2006/math" xmlns="" val="1"/>
             </a:ext>
           </a:extLst>
         </p:spPr>
@@ -11088,7 +11088,7 @@
           </a:ln>
           <a:extLst>
             <a:ext uri="{C572A759-6A51-4108-AA02-DFA0A04FC94B}">
-              <ma14:wrappingTextBoxFlag xmlns="" xmlns:m="http://schemas.openxmlformats.org/officeDocument/2006/math" xmlns:a14="http://schemas.microsoft.com/office/drawing/2010/main" xmlns:ma14="http://schemas.microsoft.com/office/mac/drawingml/2011/main" val="1"/>
+              <ma14:wrappingTextBoxFlag xmlns:ma14="http://schemas.microsoft.com/office/mac/drawingml/2011/main" xmlns:a14="http://schemas.microsoft.com/office/drawing/2010/main" xmlns:m="http://schemas.openxmlformats.org/officeDocument/2006/math" xmlns="" val="1"/>
             </a:ext>
           </a:extLst>
         </p:spPr>
@@ -22968,7 +22968,7 @@
           </a:ln>
           <a:extLst>
             <a:ext uri="{C572A759-6A51-4108-AA02-DFA0A04FC94B}">
-              <ma14:wrappingTextBoxFlag xmlns="" xmlns:m="http://schemas.openxmlformats.org/officeDocument/2006/math" xmlns:a14="http://schemas.microsoft.com/office/drawing/2010/main" xmlns:ma14="http://schemas.microsoft.com/office/mac/drawingml/2011/main" val="1"/>
+              <ma14:wrappingTextBoxFlag xmlns:ma14="http://schemas.microsoft.com/office/mac/drawingml/2011/main" xmlns:a14="http://schemas.microsoft.com/office/drawing/2010/main" xmlns:m="http://schemas.openxmlformats.org/officeDocument/2006/math" xmlns="" val="1"/>
             </a:ext>
           </a:extLst>
         </p:spPr>
@@ -23877,7 +23877,7 @@
           </a:ln>
           <a:extLst>
             <a:ext uri="{C572A759-6A51-4108-AA02-DFA0A04FC94B}">
-              <ma14:wrappingTextBoxFlag xmlns="" xmlns:m="http://schemas.openxmlformats.org/officeDocument/2006/math" xmlns:a14="http://schemas.microsoft.com/office/drawing/2010/main" xmlns:ma14="http://schemas.microsoft.com/office/mac/drawingml/2011/main" val="1"/>
+              <ma14:wrappingTextBoxFlag xmlns:ma14="http://schemas.microsoft.com/office/mac/drawingml/2011/main" xmlns:a14="http://schemas.microsoft.com/office/drawing/2010/main" xmlns:m="http://schemas.openxmlformats.org/officeDocument/2006/math" xmlns="" val="1"/>
             </a:ext>
           </a:extLst>
         </p:spPr>
@@ -23967,14 +23967,11 @@
               </a:rPr>
               <a:t>desloca elementos em 1</a:t>
             </a:r>
-            <a:r>
-              <a:rPr dirty="0">
-                <a:solidFill>
-                  <a:srgbClr val="000000"/>
-                </a:solidFill>
-              </a:rPr>
-              <a:t>1</a:t>
-            </a:r>
+            <a:endParaRPr dirty="0">
+              <a:solidFill>
+                <a:srgbClr val="000000"/>
+              </a:solidFill>
+            </a:endParaRPr>
           </a:p>
           <a:p>
             <a:pPr>
@@ -26087,7 +26084,7 @@
           </a:ln>
           <a:extLst>
             <a:ext uri="{C572A759-6A51-4108-AA02-DFA0A04FC94B}">
-              <ma14:wrappingTextBoxFlag xmlns="" xmlns:m="http://schemas.openxmlformats.org/officeDocument/2006/math" xmlns:a14="http://schemas.microsoft.com/office/drawing/2010/main" xmlns:ma14="http://schemas.microsoft.com/office/mac/drawingml/2011/main" val="1"/>
+              <ma14:wrappingTextBoxFlag xmlns:ma14="http://schemas.microsoft.com/office/mac/drawingml/2011/main" xmlns:a14="http://schemas.microsoft.com/office/drawing/2010/main" xmlns:m="http://schemas.openxmlformats.org/officeDocument/2006/math" xmlns="" val="1"/>
             </a:ext>
           </a:extLst>
         </p:spPr>
@@ -26216,7 +26213,7 @@
           </a:ln>
           <a:extLst>
             <a:ext uri="{C572A759-6A51-4108-AA02-DFA0A04FC94B}">
-              <ma14:wrappingTextBoxFlag xmlns="" xmlns:m="http://schemas.openxmlformats.org/officeDocument/2006/math" xmlns:a14="http://schemas.microsoft.com/office/drawing/2010/main" xmlns:ma14="http://schemas.microsoft.com/office/mac/drawingml/2011/main" val="1"/>
+              <ma14:wrappingTextBoxFlag xmlns:ma14="http://schemas.microsoft.com/office/mac/drawingml/2011/main" xmlns:a14="http://schemas.microsoft.com/office/drawing/2010/main" xmlns:m="http://schemas.openxmlformats.org/officeDocument/2006/math" xmlns="" val="1"/>
             </a:ext>
           </a:extLst>
         </p:spPr>
@@ -26266,7 +26263,7 @@
           </a:ln>
           <a:extLst>
             <a:ext uri="{C572A759-6A51-4108-AA02-DFA0A04FC94B}">
-              <ma14:wrappingTextBoxFlag xmlns="" xmlns:m="http://schemas.openxmlformats.org/officeDocument/2006/math" xmlns:a14="http://schemas.microsoft.com/office/drawing/2010/main" xmlns:ma14="http://schemas.microsoft.com/office/mac/drawingml/2011/main" val="1"/>
+              <ma14:wrappingTextBoxFlag xmlns:ma14="http://schemas.microsoft.com/office/mac/drawingml/2011/main" xmlns:a14="http://schemas.microsoft.com/office/drawing/2010/main" xmlns:m="http://schemas.openxmlformats.org/officeDocument/2006/math" xmlns="" val="1"/>
             </a:ext>
           </a:extLst>
         </p:spPr>
@@ -26389,7 +26386,7 @@
             <a:effectLst/>
             <a:extLst>
               <a:ext uri="{C572A759-6A51-4108-AA02-DFA0A04FC94B}">
-                <ma14:wrappingTextBoxFlag xmlns="" xmlns:m="http://schemas.openxmlformats.org/officeDocument/2006/math" xmlns:a14="http://schemas.microsoft.com/office/drawing/2010/main" xmlns:ma14="http://schemas.microsoft.com/office/mac/drawingml/2011/main" val="1"/>
+                <ma14:wrappingTextBoxFlag xmlns:ma14="http://schemas.microsoft.com/office/mac/drawingml/2011/main" xmlns:a14="http://schemas.microsoft.com/office/drawing/2010/main" xmlns:m="http://schemas.openxmlformats.org/officeDocument/2006/math" xmlns="" val="1"/>
               </a:ext>
             </a:extLst>
           </p:spPr>
@@ -26445,7 +26442,7 @@
           </a:ln>
           <a:extLst>
             <a:ext uri="{C572A759-6A51-4108-AA02-DFA0A04FC94B}">
-              <ma14:wrappingTextBoxFlag xmlns="" xmlns:m="http://schemas.openxmlformats.org/officeDocument/2006/math" xmlns:a14="http://schemas.microsoft.com/office/drawing/2010/main" xmlns:ma14="http://schemas.microsoft.com/office/mac/drawingml/2011/main" val="1"/>
+              <ma14:wrappingTextBoxFlag xmlns:ma14="http://schemas.microsoft.com/office/mac/drawingml/2011/main" xmlns:a14="http://schemas.microsoft.com/office/drawing/2010/main" xmlns:m="http://schemas.openxmlformats.org/officeDocument/2006/math" xmlns="" val="1"/>
             </a:ext>
           </a:extLst>
         </p:spPr>
@@ -26524,7 +26521,7 @@
           </a:ln>
           <a:extLst>
             <a:ext uri="{C572A759-6A51-4108-AA02-DFA0A04FC94B}">
-              <ma14:wrappingTextBoxFlag xmlns="" xmlns:m="http://schemas.openxmlformats.org/officeDocument/2006/math" xmlns:a14="http://schemas.microsoft.com/office/drawing/2010/main" xmlns:ma14="http://schemas.microsoft.com/office/mac/drawingml/2011/main" val="1"/>
+              <ma14:wrappingTextBoxFlag xmlns:ma14="http://schemas.microsoft.com/office/mac/drawingml/2011/main" xmlns:a14="http://schemas.microsoft.com/office/drawing/2010/main" xmlns:m="http://schemas.openxmlformats.org/officeDocument/2006/math" xmlns="" val="1"/>
             </a:ext>
           </a:extLst>
         </p:spPr>
@@ -26572,7 +26569,7 @@
           </a:ln>
           <a:extLst>
             <a:ext uri="{C572A759-6A51-4108-AA02-DFA0A04FC94B}">
-              <ma14:wrappingTextBoxFlag xmlns="" xmlns:m="http://schemas.openxmlformats.org/officeDocument/2006/math" xmlns:a14="http://schemas.microsoft.com/office/drawing/2010/main" xmlns:ma14="http://schemas.microsoft.com/office/mac/drawingml/2011/main" val="1"/>
+              <ma14:wrappingTextBoxFlag xmlns:ma14="http://schemas.microsoft.com/office/mac/drawingml/2011/main" xmlns:a14="http://schemas.microsoft.com/office/drawing/2010/main" xmlns:m="http://schemas.openxmlformats.org/officeDocument/2006/math" xmlns="" val="1"/>
             </a:ext>
           </a:extLst>
         </p:spPr>
@@ -26669,7 +26666,7 @@
           </a:ln>
           <a:extLst>
             <a:ext uri="{C572A759-6A51-4108-AA02-DFA0A04FC94B}">
-              <ma14:wrappingTextBoxFlag xmlns="" xmlns:m="http://schemas.openxmlformats.org/officeDocument/2006/math" xmlns:a14="http://schemas.microsoft.com/office/drawing/2010/main" xmlns:ma14="http://schemas.microsoft.com/office/mac/drawingml/2011/main" val="1"/>
+              <ma14:wrappingTextBoxFlag xmlns:ma14="http://schemas.microsoft.com/office/mac/drawingml/2011/main" xmlns:a14="http://schemas.microsoft.com/office/drawing/2010/main" xmlns:m="http://schemas.openxmlformats.org/officeDocument/2006/math" xmlns="" val="1"/>
             </a:ext>
           </a:extLst>
         </p:spPr>
@@ -28076,7 +28073,7 @@
           </a:ln>
           <a:extLst>
             <a:ext uri="{C572A759-6A51-4108-AA02-DFA0A04FC94B}">
-              <ma14:wrappingTextBoxFlag xmlns="" xmlns:m="http://schemas.openxmlformats.org/officeDocument/2006/math" xmlns:a14="http://schemas.microsoft.com/office/drawing/2010/main" xmlns:ma14="http://schemas.microsoft.com/office/mac/drawingml/2011/main" val="1"/>
+              <ma14:wrappingTextBoxFlag xmlns:ma14="http://schemas.microsoft.com/office/mac/drawingml/2011/main" xmlns:a14="http://schemas.microsoft.com/office/drawing/2010/main" xmlns:m="http://schemas.openxmlformats.org/officeDocument/2006/math" xmlns="" val="1"/>
             </a:ext>
           </a:extLst>
         </p:spPr>
@@ -28155,7 +28152,7 @@
           </a:ln>
           <a:extLst>
             <a:ext uri="{C572A759-6A51-4108-AA02-DFA0A04FC94B}">
-              <ma14:wrappingTextBoxFlag xmlns="" xmlns:m="http://schemas.openxmlformats.org/officeDocument/2006/math" xmlns:a14="http://schemas.microsoft.com/office/drawing/2010/main" xmlns:ma14="http://schemas.microsoft.com/office/mac/drawingml/2011/main" val="1"/>
+              <ma14:wrappingTextBoxFlag xmlns:ma14="http://schemas.microsoft.com/office/mac/drawingml/2011/main" xmlns:a14="http://schemas.microsoft.com/office/drawing/2010/main" xmlns:m="http://schemas.openxmlformats.org/officeDocument/2006/math" xmlns="" val="1"/>
             </a:ext>
           </a:extLst>
         </p:spPr>
@@ -28225,7 +28222,7 @@
           </a:ln>
           <a:extLst>
             <a:ext uri="{C572A759-6A51-4108-AA02-DFA0A04FC94B}">
-              <ma14:wrappingTextBoxFlag xmlns="" xmlns:m="http://schemas.openxmlformats.org/officeDocument/2006/math" xmlns:a14="http://schemas.microsoft.com/office/drawing/2010/main" xmlns:ma14="http://schemas.microsoft.com/office/mac/drawingml/2011/main" val="1"/>
+              <ma14:wrappingTextBoxFlag xmlns:ma14="http://schemas.microsoft.com/office/mac/drawingml/2011/main" xmlns:a14="http://schemas.microsoft.com/office/drawing/2010/main" xmlns:m="http://schemas.openxmlformats.org/officeDocument/2006/math" xmlns="" val="1"/>
             </a:ext>
           </a:extLst>
         </p:spPr>
@@ -28374,7 +28371,7 @@
           </a:ln>
           <a:extLst>
             <a:ext uri="{C572A759-6A51-4108-AA02-DFA0A04FC94B}">
-              <ma14:wrappingTextBoxFlag xmlns="" xmlns:m="http://schemas.openxmlformats.org/officeDocument/2006/math" xmlns:a14="http://schemas.microsoft.com/office/drawing/2010/main" xmlns:ma14="http://schemas.microsoft.com/office/mac/drawingml/2011/main" val="1"/>
+              <ma14:wrappingTextBoxFlag xmlns:ma14="http://schemas.microsoft.com/office/mac/drawingml/2011/main" xmlns:a14="http://schemas.microsoft.com/office/drawing/2010/main" xmlns:m="http://schemas.openxmlformats.org/officeDocument/2006/math" xmlns="" val="1"/>
             </a:ext>
           </a:extLst>
         </p:spPr>
@@ -28741,7 +28738,7 @@
             <a:effectLst/>
             <a:extLst>
               <a:ext uri="{C572A759-6A51-4108-AA02-DFA0A04FC94B}">
-                <ma14:wrappingTextBoxFlag xmlns="" xmlns:m="http://schemas.openxmlformats.org/officeDocument/2006/math" xmlns:a14="http://schemas.microsoft.com/office/drawing/2010/main" xmlns:ma14="http://schemas.microsoft.com/office/mac/drawingml/2011/main" val="1"/>
+                <ma14:wrappingTextBoxFlag xmlns:ma14="http://schemas.microsoft.com/office/mac/drawingml/2011/main" xmlns:a14="http://schemas.microsoft.com/office/drawing/2010/main" xmlns:m="http://schemas.openxmlformats.org/officeDocument/2006/math" xmlns="" val="1"/>
               </a:ext>
             </a:extLst>
           </p:spPr>
@@ -28797,7 +28794,7 @@
           </a:ln>
           <a:extLst>
             <a:ext uri="{C572A759-6A51-4108-AA02-DFA0A04FC94B}">
-              <ma14:wrappingTextBoxFlag xmlns="" xmlns:m="http://schemas.openxmlformats.org/officeDocument/2006/math" xmlns:a14="http://schemas.microsoft.com/office/drawing/2010/main" xmlns:ma14="http://schemas.microsoft.com/office/mac/drawingml/2011/main" val="1"/>
+              <ma14:wrappingTextBoxFlag xmlns:ma14="http://schemas.microsoft.com/office/mac/drawingml/2011/main" xmlns:a14="http://schemas.microsoft.com/office/drawing/2010/main" xmlns:m="http://schemas.openxmlformats.org/officeDocument/2006/math" xmlns="" val="1"/>
             </a:ext>
           </a:extLst>
         </p:spPr>
@@ -28933,7 +28930,7 @@
           </a:ln>
           <a:extLst>
             <a:ext uri="{C572A759-6A51-4108-AA02-DFA0A04FC94B}">
-              <ma14:wrappingTextBoxFlag xmlns="" xmlns:m="http://schemas.openxmlformats.org/officeDocument/2006/math" xmlns:a14="http://schemas.microsoft.com/office/drawing/2010/main" xmlns:ma14="http://schemas.microsoft.com/office/mac/drawingml/2011/main" val="1"/>
+              <ma14:wrappingTextBoxFlag xmlns:ma14="http://schemas.microsoft.com/office/mac/drawingml/2011/main" xmlns:a14="http://schemas.microsoft.com/office/drawing/2010/main" xmlns:m="http://schemas.openxmlformats.org/officeDocument/2006/math" xmlns="" val="1"/>
             </a:ext>
           </a:extLst>
         </p:spPr>
@@ -29012,7 +29009,7 @@
           </a:ln>
           <a:extLst>
             <a:ext uri="{C572A759-6A51-4108-AA02-DFA0A04FC94B}">
-              <ma14:wrappingTextBoxFlag xmlns="" xmlns:m="http://schemas.openxmlformats.org/officeDocument/2006/math" xmlns:a14="http://schemas.microsoft.com/office/drawing/2010/main" xmlns:ma14="http://schemas.microsoft.com/office/mac/drawingml/2011/main" val="1"/>
+              <ma14:wrappingTextBoxFlag xmlns:ma14="http://schemas.microsoft.com/office/mac/drawingml/2011/main" xmlns:a14="http://schemas.microsoft.com/office/drawing/2010/main" xmlns:m="http://schemas.openxmlformats.org/officeDocument/2006/math" xmlns="" val="1"/>
             </a:ext>
           </a:extLst>
         </p:spPr>
@@ -29057,7 +29054,7 @@
           </a:ln>
           <a:extLst>
             <a:ext uri="{C572A759-6A51-4108-AA02-DFA0A04FC94B}">
-              <ma14:wrappingTextBoxFlag xmlns="" xmlns:m="http://schemas.openxmlformats.org/officeDocument/2006/math" xmlns:a14="http://schemas.microsoft.com/office/drawing/2010/main" xmlns:ma14="http://schemas.microsoft.com/office/mac/drawingml/2011/main" val="1"/>
+              <ma14:wrappingTextBoxFlag xmlns:ma14="http://schemas.microsoft.com/office/mac/drawingml/2011/main" xmlns:a14="http://schemas.microsoft.com/office/drawing/2010/main" xmlns:m="http://schemas.openxmlformats.org/officeDocument/2006/math" xmlns="" val="1"/>
             </a:ext>
           </a:extLst>
         </p:spPr>
@@ -29102,7 +29099,7 @@
           </a:ln>
           <a:extLst>
             <a:ext uri="{C572A759-6A51-4108-AA02-DFA0A04FC94B}">
-              <ma14:wrappingTextBoxFlag xmlns="" xmlns:m="http://schemas.openxmlformats.org/officeDocument/2006/math" xmlns:a14="http://schemas.microsoft.com/office/drawing/2010/main" xmlns:ma14="http://schemas.microsoft.com/office/mac/drawingml/2011/main" val="1"/>
+              <ma14:wrappingTextBoxFlag xmlns:ma14="http://schemas.microsoft.com/office/mac/drawingml/2011/main" xmlns:a14="http://schemas.microsoft.com/office/drawing/2010/main" xmlns:m="http://schemas.openxmlformats.org/officeDocument/2006/math" xmlns="" val="1"/>
             </a:ext>
           </a:extLst>
         </p:spPr>
@@ -29271,7 +29268,7 @@
           </a:ln>
           <a:extLst>
             <a:ext uri="{C572A759-6A51-4108-AA02-DFA0A04FC94B}">
-              <ma14:wrappingTextBoxFlag xmlns="" xmlns:m="http://schemas.openxmlformats.org/officeDocument/2006/math" xmlns:a14="http://schemas.microsoft.com/office/drawing/2010/main" xmlns:ma14="http://schemas.microsoft.com/office/mac/drawingml/2011/main" val="1"/>
+              <ma14:wrappingTextBoxFlag xmlns:ma14="http://schemas.microsoft.com/office/mac/drawingml/2011/main" xmlns:a14="http://schemas.microsoft.com/office/drawing/2010/main" xmlns:m="http://schemas.openxmlformats.org/officeDocument/2006/math" xmlns="" val="1"/>
             </a:ext>
           </a:extLst>
         </p:spPr>
@@ -29765,7 +29762,7 @@
           </a:ln>
           <a:extLst>
             <a:ext uri="{C572A759-6A51-4108-AA02-DFA0A04FC94B}">
-              <ma14:wrappingTextBoxFlag xmlns="" xmlns:m="http://schemas.openxmlformats.org/officeDocument/2006/math" xmlns:a14="http://schemas.microsoft.com/office/drawing/2010/main" xmlns:ma14="http://schemas.microsoft.com/office/mac/drawingml/2011/main" val="1"/>
+              <ma14:wrappingTextBoxFlag xmlns:ma14="http://schemas.microsoft.com/office/mac/drawingml/2011/main" xmlns:a14="http://schemas.microsoft.com/office/drawing/2010/main" xmlns:m="http://schemas.openxmlformats.org/officeDocument/2006/math" xmlns="" val="1"/>
             </a:ext>
           </a:extLst>
         </p:spPr>
@@ -30105,7 +30102,7 @@
           </a:ln>
           <a:extLst>
             <a:ext uri="{C572A759-6A51-4108-AA02-DFA0A04FC94B}">
-              <ma14:wrappingTextBoxFlag xmlns="" xmlns:m="http://schemas.openxmlformats.org/officeDocument/2006/math" xmlns:a14="http://schemas.microsoft.com/office/drawing/2010/main" xmlns:ma14="http://schemas.microsoft.com/office/mac/drawingml/2011/main" val="1"/>
+              <ma14:wrappingTextBoxFlag xmlns:ma14="http://schemas.microsoft.com/office/mac/drawingml/2011/main" xmlns:a14="http://schemas.microsoft.com/office/drawing/2010/main" xmlns:m="http://schemas.openxmlformats.org/officeDocument/2006/math" xmlns="" val="1"/>
             </a:ext>
           </a:extLst>
         </p:spPr>
@@ -30180,7 +30177,7 @@
           </a:ln>
           <a:extLst>
             <a:ext uri="{C572A759-6A51-4108-AA02-DFA0A04FC94B}">
-              <ma14:wrappingTextBoxFlag xmlns="" xmlns:m="http://schemas.openxmlformats.org/officeDocument/2006/math" xmlns:a14="http://schemas.microsoft.com/office/drawing/2010/main" xmlns:ma14="http://schemas.microsoft.com/office/mac/drawingml/2011/main" val="1"/>
+              <ma14:wrappingTextBoxFlag xmlns:ma14="http://schemas.microsoft.com/office/mac/drawingml/2011/main" xmlns:a14="http://schemas.microsoft.com/office/drawing/2010/main" xmlns:m="http://schemas.openxmlformats.org/officeDocument/2006/math" xmlns="" val="1"/>
             </a:ext>
           </a:extLst>
         </p:spPr>
@@ -32042,7 +32039,7 @@
             <a:effectLst/>
             <a:extLst>
               <a:ext uri="{C572A759-6A51-4108-AA02-DFA0A04FC94B}">
-                <ma14:wrappingTextBoxFlag xmlns="" xmlns:m="http://schemas.openxmlformats.org/officeDocument/2006/math" xmlns:a14="http://schemas.microsoft.com/office/drawing/2010/main" xmlns:ma14="http://schemas.microsoft.com/office/mac/drawingml/2011/main" val="1"/>
+                <ma14:wrappingTextBoxFlag xmlns:ma14="http://schemas.microsoft.com/office/mac/drawingml/2011/main" xmlns:a14="http://schemas.microsoft.com/office/drawing/2010/main" xmlns:m="http://schemas.openxmlformats.org/officeDocument/2006/math" xmlns="" val="1"/>
               </a:ext>
             </a:extLst>
           </p:spPr>
@@ -32094,7 +32091,7 @@
             <a:effectLst/>
             <a:extLst>
               <a:ext uri="{C572A759-6A51-4108-AA02-DFA0A04FC94B}">
-                <ma14:wrappingTextBoxFlag xmlns="" xmlns:m="http://schemas.openxmlformats.org/officeDocument/2006/math" xmlns:a14="http://schemas.microsoft.com/office/drawing/2010/main" xmlns:ma14="http://schemas.microsoft.com/office/mac/drawingml/2011/main" val="1"/>
+                <ma14:wrappingTextBoxFlag xmlns:ma14="http://schemas.microsoft.com/office/mac/drawingml/2011/main" xmlns:a14="http://schemas.microsoft.com/office/drawing/2010/main" xmlns:m="http://schemas.openxmlformats.org/officeDocument/2006/math" xmlns="" val="1"/>
               </a:ext>
             </a:extLst>
           </p:spPr>
@@ -32858,7 +32855,7 @@
             <a:effectLst/>
             <a:extLst>
               <a:ext uri="{C572A759-6A51-4108-AA02-DFA0A04FC94B}">
-                <ma14:wrappingTextBoxFlag xmlns="" xmlns:m="http://schemas.openxmlformats.org/officeDocument/2006/math" xmlns:a14="http://schemas.microsoft.com/office/drawing/2010/main" xmlns:ma14="http://schemas.microsoft.com/office/mac/drawingml/2011/main" val="1"/>
+                <ma14:wrappingTextBoxFlag xmlns:ma14="http://schemas.microsoft.com/office/mac/drawingml/2011/main" xmlns:a14="http://schemas.microsoft.com/office/drawing/2010/main" xmlns:m="http://schemas.openxmlformats.org/officeDocument/2006/math" xmlns="" val="1"/>
               </a:ext>
             </a:extLst>
           </p:spPr>
@@ -32914,7 +32911,7 @@
             <a:effectLst/>
             <a:extLst>
               <a:ext uri="{C572A759-6A51-4108-AA02-DFA0A04FC94B}">
-                <ma14:wrappingTextBoxFlag xmlns="" xmlns:m="http://schemas.openxmlformats.org/officeDocument/2006/math" xmlns:a14="http://schemas.microsoft.com/office/drawing/2010/main" xmlns:ma14="http://schemas.microsoft.com/office/mac/drawingml/2011/main" val="1"/>
+                <ma14:wrappingTextBoxFlag xmlns:ma14="http://schemas.microsoft.com/office/mac/drawingml/2011/main" xmlns:a14="http://schemas.microsoft.com/office/drawing/2010/main" xmlns:m="http://schemas.openxmlformats.org/officeDocument/2006/math" xmlns="" val="1"/>
               </a:ext>
             </a:extLst>
           </p:spPr>
@@ -36845,10 +36842,10 @@
         </p:nvGrpSpPr>
         <p:grpSpPr>
           <a:xfrm>
-            <a:off x="10583035" y="1512067"/>
-            <a:ext cx="1649765" cy="1978256"/>
-            <a:chOff x="0" y="0"/>
-            <a:chExt cx="1649764" cy="1978254"/>
+            <a:off x="10544934" y="1512067"/>
+            <a:ext cx="1687866" cy="1978256"/>
+            <a:chOff x="-38101" y="0"/>
+            <a:chExt cx="1687865" cy="1978254"/>
           </a:xfrm>
         </p:grpSpPr>
         <p:sp>
@@ -36873,7 +36870,7 @@
             <a:effectLst/>
             <a:extLst>
               <a:ext uri="{C572A759-6A51-4108-AA02-DFA0A04FC94B}">
-                <ma14:wrappingTextBoxFlag xmlns="" xmlns:m="http://schemas.openxmlformats.org/officeDocument/2006/math" xmlns:a14="http://schemas.microsoft.com/office/drawing/2010/main" xmlns:ma14="http://schemas.microsoft.com/office/mac/drawingml/2011/main" val="1"/>
+                <ma14:wrappingTextBoxFlag xmlns:ma14="http://schemas.microsoft.com/office/mac/drawingml/2011/main" xmlns:a14="http://schemas.microsoft.com/office/drawing/2010/main" xmlns:m="http://schemas.openxmlformats.org/officeDocument/2006/math" xmlns="" val="1"/>
               </a:ext>
             </a:extLst>
           </p:spPr>
@@ -36925,7 +36922,7 @@
             <a:effectLst/>
             <a:extLst>
               <a:ext uri="{C572A759-6A51-4108-AA02-DFA0A04FC94B}">
-                <ma14:wrappingTextBoxFlag xmlns="" xmlns:m="http://schemas.openxmlformats.org/officeDocument/2006/math" xmlns:a14="http://schemas.microsoft.com/office/drawing/2010/main" xmlns:ma14="http://schemas.microsoft.com/office/mac/drawingml/2011/main" val="1"/>
+                <ma14:wrappingTextBoxFlag xmlns:ma14="http://schemas.microsoft.com/office/mac/drawingml/2011/main" xmlns:a14="http://schemas.microsoft.com/office/drawing/2010/main" xmlns:m="http://schemas.openxmlformats.org/officeDocument/2006/math" xmlns="" val="1"/>
               </a:ext>
             </a:extLst>
           </p:spPr>
@@ -37549,7 +37546,7 @@
             <a:effectLst/>
             <a:extLst>
               <a:ext uri="{C572A759-6A51-4108-AA02-DFA0A04FC94B}">
-                <ma14:wrappingTextBoxFlag xmlns="" xmlns:m="http://schemas.openxmlformats.org/officeDocument/2006/math" xmlns:a14="http://schemas.microsoft.com/office/drawing/2010/main" xmlns:ma14="http://schemas.microsoft.com/office/mac/drawingml/2011/main" val="1"/>
+                <ma14:wrappingTextBoxFlag xmlns:ma14="http://schemas.microsoft.com/office/mac/drawingml/2011/main" xmlns:a14="http://schemas.microsoft.com/office/drawing/2010/main" xmlns:m="http://schemas.openxmlformats.org/officeDocument/2006/math" xmlns="" val="1"/>
               </a:ext>
             </a:extLst>
           </p:spPr>
@@ -37591,8 +37588,8 @@
           </p:nvSpPr>
           <p:spPr>
             <a:xfrm>
-              <a:off x="0" y="877451"/>
-              <a:ext cx="880223" cy="3"/>
+              <a:off x="-38101" y="829826"/>
+              <a:ext cx="1001338" cy="7023"/>
             </a:xfrm>
             <a:prstGeom prst="line">
               <a:avLst/>
@@ -38178,7 +38175,7 @@
           </a:ln>
           <a:extLst>
             <a:ext uri="{C572A759-6A51-4108-AA02-DFA0A04FC94B}">
-              <ma14:wrappingTextBoxFlag xmlns="" xmlns:m="http://schemas.openxmlformats.org/officeDocument/2006/math" xmlns:a14="http://schemas.microsoft.com/office/drawing/2010/main" xmlns:ma14="http://schemas.microsoft.com/office/mac/drawingml/2011/main" val="1"/>
+              <ma14:wrappingTextBoxFlag xmlns:ma14="http://schemas.microsoft.com/office/mac/drawingml/2011/main" xmlns:a14="http://schemas.microsoft.com/office/drawing/2010/main" xmlns:m="http://schemas.openxmlformats.org/officeDocument/2006/math" xmlns="" val="1"/>
             </a:ext>
           </a:extLst>
         </p:spPr>
@@ -38257,7 +38254,7 @@
           </a:ln>
           <a:extLst>
             <a:ext uri="{C572A759-6A51-4108-AA02-DFA0A04FC94B}">
-              <ma14:wrappingTextBoxFlag xmlns="" xmlns:m="http://schemas.openxmlformats.org/officeDocument/2006/math" xmlns:a14="http://schemas.microsoft.com/office/drawing/2010/main" xmlns:ma14="http://schemas.microsoft.com/office/mac/drawingml/2011/main" val="1"/>
+              <ma14:wrappingTextBoxFlag xmlns:ma14="http://schemas.microsoft.com/office/mac/drawingml/2011/main" xmlns:a14="http://schemas.microsoft.com/office/drawing/2010/main" xmlns:m="http://schemas.openxmlformats.org/officeDocument/2006/math" xmlns="" val="1"/>
             </a:ext>
           </a:extLst>
         </p:spPr>
@@ -39445,7 +39442,7 @@
             <a:effectLst/>
             <a:extLst>
               <a:ext uri="{C572A759-6A51-4108-AA02-DFA0A04FC94B}">
-                <ma14:wrappingTextBoxFlag xmlns="" xmlns:m="http://schemas.openxmlformats.org/officeDocument/2006/math" xmlns:a14="http://schemas.microsoft.com/office/drawing/2010/main" xmlns:ma14="http://schemas.microsoft.com/office/mac/drawingml/2011/main" val="1"/>
+                <ma14:wrappingTextBoxFlag xmlns:ma14="http://schemas.microsoft.com/office/mac/drawingml/2011/main" xmlns:a14="http://schemas.microsoft.com/office/drawing/2010/main" xmlns:m="http://schemas.openxmlformats.org/officeDocument/2006/math" xmlns="" val="1"/>
               </a:ext>
             </a:extLst>
           </p:spPr>
@@ -39497,7 +39494,7 @@
             <a:effectLst/>
             <a:extLst>
               <a:ext uri="{C572A759-6A51-4108-AA02-DFA0A04FC94B}">
-                <ma14:wrappingTextBoxFlag xmlns="" xmlns:m="http://schemas.openxmlformats.org/officeDocument/2006/math" xmlns:a14="http://schemas.microsoft.com/office/drawing/2010/main" xmlns:ma14="http://schemas.microsoft.com/office/mac/drawingml/2011/main" val="1"/>
+                <ma14:wrappingTextBoxFlag xmlns:ma14="http://schemas.microsoft.com/office/mac/drawingml/2011/main" xmlns:a14="http://schemas.microsoft.com/office/drawing/2010/main" xmlns:m="http://schemas.openxmlformats.org/officeDocument/2006/math" xmlns="" val="1"/>
               </a:ext>
             </a:extLst>
           </p:spPr>
@@ -40261,7 +40258,7 @@
             <a:effectLst/>
             <a:extLst>
               <a:ext uri="{C572A759-6A51-4108-AA02-DFA0A04FC94B}">
-                <ma14:wrappingTextBoxFlag xmlns="" xmlns:m="http://schemas.openxmlformats.org/officeDocument/2006/math" xmlns:a14="http://schemas.microsoft.com/office/drawing/2010/main" xmlns:ma14="http://schemas.microsoft.com/office/mac/drawingml/2011/main" val="1"/>
+                <ma14:wrappingTextBoxFlag xmlns:ma14="http://schemas.microsoft.com/office/mac/drawingml/2011/main" xmlns:a14="http://schemas.microsoft.com/office/drawing/2010/main" xmlns:m="http://schemas.openxmlformats.org/officeDocument/2006/math" xmlns="" val="1"/>
               </a:ext>
             </a:extLst>
           </p:spPr>
@@ -40318,7 +40315,7 @@
             <a:effectLst/>
             <a:extLst>
               <a:ext uri="{C572A759-6A51-4108-AA02-DFA0A04FC94B}">
-                <ma14:wrappingTextBoxFlag xmlns="" xmlns:m="http://schemas.openxmlformats.org/officeDocument/2006/math" xmlns:a14="http://schemas.microsoft.com/office/drawing/2010/main" xmlns:ma14="http://schemas.microsoft.com/office/mac/drawingml/2011/main" val="1"/>
+                <ma14:wrappingTextBoxFlag xmlns:ma14="http://schemas.microsoft.com/office/mac/drawingml/2011/main" xmlns:a14="http://schemas.microsoft.com/office/drawing/2010/main" xmlns:m="http://schemas.openxmlformats.org/officeDocument/2006/math" xmlns="" val="1"/>
               </a:ext>
             </a:extLst>
           </p:spPr>
@@ -40864,7 +40861,7 @@
           </a:ln>
           <a:extLst>
             <a:ext uri="{C572A759-6A51-4108-AA02-DFA0A04FC94B}">
-              <ma14:wrappingTextBoxFlag xmlns="" xmlns:m="http://schemas.openxmlformats.org/officeDocument/2006/math" xmlns:a14="http://schemas.microsoft.com/office/drawing/2010/main" xmlns:ma14="http://schemas.microsoft.com/office/mac/drawingml/2011/main" val="1"/>
+              <ma14:wrappingTextBoxFlag xmlns:ma14="http://schemas.microsoft.com/office/mac/drawingml/2011/main" xmlns:a14="http://schemas.microsoft.com/office/drawing/2010/main" xmlns:m="http://schemas.openxmlformats.org/officeDocument/2006/math" xmlns="" val="1"/>
             </a:ext>
           </a:extLst>
         </p:spPr>
@@ -40950,8 +40947,8 @@
         </p:nvSpPr>
         <p:spPr>
           <a:xfrm>
-            <a:off x="7111868" y="3282977"/>
-            <a:ext cx="1214222" cy="190501"/>
+            <a:off x="7111868" y="3285894"/>
+            <a:ext cx="1526059" cy="184666"/>
           </a:xfrm>
           <a:prstGeom prst="rect">
             <a:avLst/>
@@ -40961,7 +40958,7 @@
           </a:ln>
           <a:extLst>
             <a:ext uri="{C572A759-6A51-4108-AA02-DFA0A04FC94B}">
-              <ma14:wrappingTextBoxFlag xmlns="" xmlns:m="http://schemas.openxmlformats.org/officeDocument/2006/math" xmlns:a14="http://schemas.microsoft.com/office/drawing/2010/main" xmlns:ma14="http://schemas.microsoft.com/office/mac/drawingml/2011/main" val="1"/>
+              <ma14:wrappingTextBoxFlag xmlns:ma14="http://schemas.microsoft.com/office/mac/drawingml/2011/main" xmlns:a14="http://schemas.microsoft.com/office/drawing/2010/main" xmlns:m="http://schemas.openxmlformats.org/officeDocument/2006/math" xmlns="" val="1"/>
             </a:ext>
           </a:extLst>
         </p:spPr>
@@ -40980,8 +40977,10 @@
               </a:defRPr>
             </a:pPr>
             <a:r>
-              <a:t>RELATIONAL DATA</a:t>
-            </a:r>
+              <a:rPr lang="pt-BR" dirty="0"/>
+              <a:t>RELACIONANDO DADOS</a:t>
+            </a:r>
+            <a:endParaRPr dirty="0"/>
           </a:p>
         </p:txBody>
       </p:sp>
@@ -41004,7 +41003,7 @@
           </a:ln>
           <a:extLst>
             <a:ext uri="{C572A759-6A51-4108-AA02-DFA0A04FC94B}">
-              <ma14:wrappingTextBoxFlag xmlns="" xmlns:m="http://schemas.openxmlformats.org/officeDocument/2006/math" xmlns:a14="http://schemas.microsoft.com/office/drawing/2010/main" xmlns:ma14="http://schemas.microsoft.com/office/mac/drawingml/2011/main" val="1"/>
+              <ma14:wrappingTextBoxFlag xmlns:ma14="http://schemas.microsoft.com/office/mac/drawingml/2011/main" xmlns:a14="http://schemas.microsoft.com/office/drawing/2010/main" xmlns:m="http://schemas.openxmlformats.org/officeDocument/2006/math" xmlns="" val="1"/>
             </a:ext>
           </a:extLst>
         </p:spPr>
@@ -41121,7 +41120,7 @@
           </a:ln>
           <a:extLst>
             <a:ext uri="{C572A759-6A51-4108-AA02-DFA0A04FC94B}">
-              <ma14:wrappingTextBoxFlag xmlns="" xmlns:m="http://schemas.openxmlformats.org/officeDocument/2006/math" xmlns:a14="http://schemas.microsoft.com/office/drawing/2010/main" xmlns:ma14="http://schemas.microsoft.com/office/mac/drawingml/2011/main" val="1"/>
+              <ma14:wrappingTextBoxFlag xmlns:ma14="http://schemas.microsoft.com/office/mac/drawingml/2011/main" xmlns:a14="http://schemas.microsoft.com/office/drawing/2010/main" xmlns:m="http://schemas.openxmlformats.org/officeDocument/2006/math" xmlns="" val="1"/>
             </a:ext>
           </a:extLst>
         </p:spPr>
@@ -41197,7 +41196,7 @@
           </a:ln>
           <a:extLst>
             <a:ext uri="{C572A759-6A51-4108-AA02-DFA0A04FC94B}">
-              <ma14:wrappingTextBoxFlag xmlns="" xmlns:m="http://schemas.openxmlformats.org/officeDocument/2006/math" xmlns:a14="http://schemas.microsoft.com/office/drawing/2010/main" xmlns:ma14="http://schemas.microsoft.com/office/mac/drawingml/2011/main" val="1"/>
+              <ma14:wrappingTextBoxFlag xmlns:ma14="http://schemas.microsoft.com/office/mac/drawingml/2011/main" xmlns:a14="http://schemas.microsoft.com/office/drawing/2010/main" xmlns:m="http://schemas.openxmlformats.org/officeDocument/2006/math" xmlns="" val="1"/>
             </a:ext>
           </a:extLst>
         </p:spPr>
@@ -41242,7 +41241,7 @@
           </a:ln>
           <a:extLst>
             <a:ext uri="{C572A759-6A51-4108-AA02-DFA0A04FC94B}">
-              <ma14:wrappingTextBoxFlag xmlns="" xmlns:m="http://schemas.openxmlformats.org/officeDocument/2006/math" xmlns:a14="http://schemas.microsoft.com/office/drawing/2010/main" xmlns:ma14="http://schemas.microsoft.com/office/mac/drawingml/2011/main" val="1"/>
+              <ma14:wrappingTextBoxFlag xmlns:ma14="http://schemas.microsoft.com/office/mac/drawingml/2011/main" xmlns:a14="http://schemas.microsoft.com/office/drawing/2010/main" xmlns:m="http://schemas.openxmlformats.org/officeDocument/2006/math" xmlns="" val="1"/>
             </a:ext>
           </a:extLst>
         </p:spPr>
@@ -41727,7 +41726,7 @@
           </a:ln>
           <a:extLst>
             <a:ext uri="{C572A759-6A51-4108-AA02-DFA0A04FC94B}">
-              <ma14:wrappingTextBoxFlag xmlns="" xmlns:m="http://schemas.openxmlformats.org/officeDocument/2006/math" xmlns:a14="http://schemas.microsoft.com/office/drawing/2010/main" xmlns:ma14="http://schemas.microsoft.com/office/mac/drawingml/2011/main" val="1"/>
+              <ma14:wrappingTextBoxFlag xmlns:ma14="http://schemas.microsoft.com/office/mac/drawingml/2011/main" xmlns:a14="http://schemas.microsoft.com/office/drawing/2010/main" xmlns:m="http://schemas.openxmlformats.org/officeDocument/2006/math" xmlns="" val="1"/>
             </a:ext>
           </a:extLst>
         </p:spPr>
@@ -41875,7 +41874,7 @@
           </a:ln>
           <a:extLst>
             <a:ext uri="{C572A759-6A51-4108-AA02-DFA0A04FC94B}">
-              <ma14:wrappingTextBoxFlag xmlns="" xmlns:m="http://schemas.openxmlformats.org/officeDocument/2006/math" xmlns:a14="http://schemas.microsoft.com/office/drawing/2010/main" xmlns:ma14="http://schemas.microsoft.com/office/mac/drawingml/2011/main" val="1"/>
+              <ma14:wrappingTextBoxFlag xmlns:ma14="http://schemas.microsoft.com/office/mac/drawingml/2011/main" xmlns:a14="http://schemas.microsoft.com/office/drawing/2010/main" xmlns:m="http://schemas.openxmlformats.org/officeDocument/2006/math" xmlns="" val="1"/>
             </a:ext>
           </a:extLst>
         </p:spPr>

</xml_diff>